<commit_message>
Added Saga desging pattern and Kafka example
</commit_message>
<xml_diff>
--- a/Micro services Design Pattern.pptx
+++ b/Micro services Design Pattern.pptx
@@ -5,7 +5,7 @@
     <p:sldMasterId id="2147483648" r:id="rId1"/>
   </p:sldMasterIdLst>
   <p:notesMasterIdLst>
-    <p:notesMasterId r:id="rId60"/>
+    <p:notesMasterId r:id="rId65"/>
   </p:notesMasterIdLst>
   <p:sldIdLst>
     <p:sldId id="256" r:id="rId2"/>
@@ -56,16 +56,21 @@
     <p:sldId id="290" r:id="rId47"/>
     <p:sldId id="291" r:id="rId48"/>
     <p:sldId id="292" r:id="rId49"/>
-    <p:sldId id="272" r:id="rId50"/>
-    <p:sldId id="273" r:id="rId51"/>
-    <p:sldId id="274" r:id="rId52"/>
-    <p:sldId id="275" r:id="rId53"/>
-    <p:sldId id="276" r:id="rId54"/>
-    <p:sldId id="277" r:id="rId55"/>
-    <p:sldId id="278" r:id="rId56"/>
-    <p:sldId id="279" r:id="rId57"/>
-    <p:sldId id="280" r:id="rId58"/>
-    <p:sldId id="281" r:id="rId59"/>
+    <p:sldId id="314" r:id="rId50"/>
+    <p:sldId id="315" r:id="rId51"/>
+    <p:sldId id="316" r:id="rId52"/>
+    <p:sldId id="317" r:id="rId53"/>
+    <p:sldId id="318" r:id="rId54"/>
+    <p:sldId id="272" r:id="rId55"/>
+    <p:sldId id="273" r:id="rId56"/>
+    <p:sldId id="274" r:id="rId57"/>
+    <p:sldId id="275" r:id="rId58"/>
+    <p:sldId id="276" r:id="rId59"/>
+    <p:sldId id="277" r:id="rId60"/>
+    <p:sldId id="278" r:id="rId61"/>
+    <p:sldId id="279" r:id="rId62"/>
+    <p:sldId id="280" r:id="rId63"/>
+    <p:sldId id="281" r:id="rId64"/>
   </p:sldIdLst>
   <p:sldSz cx="9144000" cy="6858000" type="screen4x3"/>
   <p:notesSz cx="6858000" cy="9144000"/>
@@ -17885,7 +17890,13 @@
       </p:grpSpPr>
       <p:sp>
         <p:nvSpPr>
-          <p:cNvPr id="2" name="Title 1"/>
+          <p:cNvPr id="2" name="Title 1">
+            <a:extLst>
+              <a:ext uri="{FF2B5EF4-FFF2-40B4-BE49-F238E27FC236}">
+                <a16:creationId xmlns:a16="http://schemas.microsoft.com/office/drawing/2014/main" id="{56AD51D9-444F-D0C0-C54D-5DFBC5D242D7}"/>
+              </a:ext>
+            </a:extLst>
+          </p:cNvPr>
           <p:cNvSpPr>
             <a:spLocks noGrp="1"/>
           </p:cNvSpPr>
@@ -17901,19 +17912,37 @@
           <a:lstStyle/>
           <a:p>
             <a:r>
-              <a:rPr lang="en-US" b="1" dirty="0"/>
-              <a:t>Observability Patterns</a:t>
+              <a:rPr lang="en-IN" b="1" i="0" dirty="0">
+                <a:solidFill>
+                  <a:srgbClr val="3A3A3A"/>
+                </a:solidFill>
+                <a:effectLst/>
+                <a:latin typeface="Catamaran-SemiBold"/>
+              </a:rPr>
+              <a:t>Scatter Gather Pattern</a:t>
             </a:r>
             <a:br>
-              <a:rPr lang="en-US" b="1" dirty="0"/>
+              <a:rPr lang="en-IN" b="0" i="0" dirty="0">
+                <a:solidFill>
+                  <a:srgbClr val="3A3A3A"/>
+                </a:solidFill>
+                <a:effectLst/>
+                <a:latin typeface="Catamaran-Regular"/>
+              </a:rPr>
             </a:br>
-            <a:endParaRPr lang="en-US" dirty="0"/>
-          </a:p>
-        </p:txBody>
-      </p:sp>
-      <p:sp>
-        <p:nvSpPr>
-          <p:cNvPr id="3" name="Content Placeholder 2"/>
+            <a:endParaRPr lang="en-IN" dirty="0"/>
+          </a:p>
+        </p:txBody>
+      </p:sp>
+      <p:sp>
+        <p:nvSpPr>
+          <p:cNvPr id="3" name="Content Placeholder 2">
+            <a:extLst>
+              <a:ext uri="{FF2B5EF4-FFF2-40B4-BE49-F238E27FC236}">
+                <a16:creationId xmlns:a16="http://schemas.microsoft.com/office/drawing/2014/main" id="{074D5021-408C-E6B9-E539-85BE96DB0EB7}"/>
+              </a:ext>
+            </a:extLst>
+          </p:cNvPr>
           <p:cNvSpPr>
             <a:spLocks noGrp="1"/>
           </p:cNvSpPr>
@@ -17923,38 +17952,99 @@
         </p:nvSpPr>
         <p:spPr/>
         <p:txBody>
-          <a:bodyPr/>
+          <a:bodyPr>
+            <a:normAutofit/>
+          </a:bodyPr>
           <a:lstStyle/>
           <a:p>
-            <a:r>
-              <a:rPr lang="en-US" b="1" dirty="0"/>
-              <a:t>Log Aggregation</a:t>
-            </a:r>
-          </a:p>
-          <a:p>
-            <a:r>
-              <a:rPr lang="en-US" b="1" dirty="0"/>
-              <a:t>Performance Metrics</a:t>
-            </a:r>
-          </a:p>
-          <a:p>
-            <a:r>
-              <a:rPr lang="en-US" b="1" dirty="0"/>
-              <a:t>Distributed Tracing</a:t>
-            </a:r>
-          </a:p>
-          <a:p>
-            <a:r>
-              <a:rPr lang="en-US" b="1" dirty="0"/>
-              <a:t>Health Check</a:t>
-            </a:r>
-          </a:p>
-          <a:p>
-            <a:endParaRPr lang="en-US" dirty="0"/>
-          </a:p>
-        </p:txBody>
-      </p:sp>
+            <a:pPr marL="0" indent="0">
+              <a:buNone/>
+            </a:pPr>
+            <a:r>
+              <a:rPr lang="en-US" sz="1800" dirty="0"/>
+              <a:t>Let’s consider an application in which we need to do a set of tasks to complete the business workflow. </a:t>
+            </a:r>
+          </a:p>
+          <a:p>
+            <a:pPr marL="0" indent="0">
+              <a:buNone/>
+            </a:pPr>
+            <a:r>
+              <a:rPr lang="en-US" sz="1800" dirty="0"/>
+              <a:t>If these tasks do not depend on each other, then it does not make sense to do them sequentially. We can do these tasks in parallel.</a:t>
+            </a:r>
+          </a:p>
+          <a:p>
+            <a:pPr marL="0" indent="0">
+              <a:buNone/>
+            </a:pPr>
+            <a:r>
+              <a:rPr lang="en-US" sz="1800" b="1" dirty="0"/>
+              <a:t>Scatter Gather Pattern </a:t>
+            </a:r>
+            <a:r>
+              <a:rPr lang="en-US" sz="1800" dirty="0"/>
+              <a:t>helps us to distribute these tasks to achieve parallel processing of tasks/messages/events &amp; finally aggregate the responses as a single response as shown above.</a:t>
+            </a:r>
+          </a:p>
+          <a:p>
+            <a:endParaRPr lang="en-IN" sz="1800" dirty="0"/>
+          </a:p>
+        </p:txBody>
+      </p:sp>
+      <p:pic>
+        <p:nvPicPr>
+          <p:cNvPr id="1026" name="Picture 2" descr="scatter gather pattern">
+            <a:extLst>
+              <a:ext uri="{FF2B5EF4-FFF2-40B4-BE49-F238E27FC236}">
+                <a16:creationId xmlns:a16="http://schemas.microsoft.com/office/drawing/2014/main" id="{AC55C566-4A9E-B85C-3C94-2DB3F6C2906C}"/>
+              </a:ext>
+            </a:extLst>
+          </p:cNvPr>
+          <p:cNvPicPr>
+            <a:picLocks noChangeAspect="1" noChangeArrowheads="1"/>
+          </p:cNvPicPr>
+          <p:nvPr/>
+        </p:nvPicPr>
+        <p:blipFill>
+          <a:blip r:embed="rId2">
+            <a:extLst>
+              <a:ext uri="{28A0092B-C50C-407E-A947-70E740481C1C}">
+                <a14:useLocalDpi xmlns:a14="http://schemas.microsoft.com/office/drawing/2010/main" val="0"/>
+              </a:ext>
+            </a:extLst>
+          </a:blip>
+          <a:srcRect/>
+          <a:stretch>
+            <a:fillRect/>
+          </a:stretch>
+        </p:blipFill>
+        <p:spPr bwMode="auto">
+          <a:xfrm>
+            <a:off x="1475656" y="3723320"/>
+            <a:ext cx="5847111" cy="3068960"/>
+          </a:xfrm>
+          <a:prstGeom prst="rect">
+            <a:avLst/>
+          </a:prstGeom>
+          <a:noFill/>
+          <a:extLst>
+            <a:ext uri="{909E8E84-426E-40DD-AFC4-6F175D3DCCD1}">
+              <a14:hiddenFill xmlns:a14="http://schemas.microsoft.com/office/drawing/2010/main">
+                <a:solidFill>
+                  <a:srgbClr val="FFFFFF"/>
+                </a:solidFill>
+              </a14:hiddenFill>
+            </a:ext>
+          </a:extLst>
+        </p:spPr>
+      </p:pic>
     </p:spTree>
+    <p:extLst>
+      <p:ext uri="{BB962C8B-B14F-4D97-AF65-F5344CB8AC3E}">
+        <p14:creationId xmlns:p14="http://schemas.microsoft.com/office/powerpoint/2010/main" val="2835261730"/>
+      </p:ext>
+    </p:extLst>
   </p:cSld>
   <p:clrMapOvr>
     <a:masterClrMapping/>
@@ -18166,7 +18256,13 @@
       </p:grpSpPr>
       <p:sp>
         <p:nvSpPr>
-          <p:cNvPr id="2" name="Title 1"/>
+          <p:cNvPr id="2" name="Title 1">
+            <a:extLst>
+              <a:ext uri="{FF2B5EF4-FFF2-40B4-BE49-F238E27FC236}">
+                <a16:creationId xmlns:a16="http://schemas.microsoft.com/office/drawing/2014/main" id="{B1DC4EC9-F97C-24A3-4DE7-49F0B54B1EC5}"/>
+              </a:ext>
+            </a:extLst>
+          </p:cNvPr>
           <p:cNvSpPr>
             <a:spLocks noGrp="1"/>
           </p:cNvSpPr>
@@ -18182,19 +18278,37 @@
           <a:lstStyle/>
           <a:p>
             <a:r>
-              <a:rPr lang="en-US" b="1" dirty="0"/>
-              <a:t>Log Aggregation</a:t>
+              <a:rPr lang="en-IN" b="1" i="0" dirty="0">
+                <a:solidFill>
+                  <a:srgbClr val="3A3A3A"/>
+                </a:solidFill>
+                <a:effectLst/>
+                <a:latin typeface="Catamaran-SemiBold"/>
+              </a:rPr>
+              <a:t>Scatter Gather Pattern</a:t>
             </a:r>
             <a:br>
-              <a:rPr lang="en-US" b="1" dirty="0"/>
+              <a:rPr lang="en-IN" b="0" i="0" dirty="0">
+                <a:solidFill>
+                  <a:srgbClr val="3A3A3A"/>
+                </a:solidFill>
+                <a:effectLst/>
+                <a:latin typeface="Catamaran-Regular"/>
+              </a:rPr>
             </a:br>
-            <a:endParaRPr lang="en-US" dirty="0"/>
-          </a:p>
-        </p:txBody>
-      </p:sp>
-      <p:sp>
-        <p:nvSpPr>
-          <p:cNvPr id="3" name="Content Placeholder 2"/>
+            <a:endParaRPr lang="en-IN" dirty="0"/>
+          </a:p>
+        </p:txBody>
+      </p:sp>
+      <p:sp>
+        <p:nvSpPr>
+          <p:cNvPr id="3" name="Content Placeholder 2">
+            <a:extLst>
+              <a:ext uri="{FF2B5EF4-FFF2-40B4-BE49-F238E27FC236}">
+                <a16:creationId xmlns:a16="http://schemas.microsoft.com/office/drawing/2014/main" id="{CC5D9D8C-BCD7-922B-917F-E7E95E208476}"/>
+              </a:ext>
+            </a:extLst>
+          </p:cNvPr>
           <p:cNvSpPr>
             <a:spLocks noGrp="1"/>
           </p:cNvSpPr>
@@ -18205,61 +18319,142 @@
         <p:spPr/>
         <p:txBody>
           <a:bodyPr>
-            <a:normAutofit fontScale="70000" lnSpcReduction="20000"/>
+            <a:normAutofit fontScale="47500" lnSpcReduction="20000"/>
           </a:bodyPr>
           <a:lstStyle/>
           <a:p>
-            <a:pPr>
-              <a:buNone/>
-            </a:pPr>
-            <a:r>
-              <a:rPr lang="en-US" b="1" dirty="0"/>
-              <a:t>Problem</a:t>
-            </a:r>
-          </a:p>
-          <a:p>
+            <a:pPr marL="0" indent="0">
+              <a:buNone/>
+            </a:pPr>
+            <a:r>
+              <a:rPr lang="en-IN" dirty="0"/>
+              <a:t>DEMO</a:t>
+            </a:r>
+          </a:p>
+          <a:p>
+            <a:pPr marL="0" indent="0">
+              <a:buNone/>
+            </a:pPr>
             <a:r>
               <a:rPr lang="en-US" dirty="0"/>
-              <a:t>Consider a use case where an application consists of multiple service instances that are running on multiple machines. Requests often span multiple service instances. Each service instance generates a log file in a standardized format. How can we understand the application behavior through logs for a particular request?</a:t>
-            </a:r>
-          </a:p>
-          <a:p>
-            <a:pPr>
-              <a:buNone/>
-            </a:pPr>
-            <a:r>
-              <a:rPr lang="en-US" b="1" dirty="0"/>
-              <a:t>Solution</a:t>
-            </a:r>
-          </a:p>
-          <a:p>
+              <a:t>Let’s consider a flight booking application in which user searches for flight deals. The application sends the information to all the airlines, find their fares and then responds back.</a:t>
+            </a:r>
+          </a:p>
+          <a:p>
+            <a:pPr marL="0" indent="0">
+              <a:buNone/>
+            </a:pPr>
+            <a:endParaRPr lang="en-US" dirty="0"/>
+          </a:p>
+          <a:p>
+            <a:pPr marL="0" indent="0">
+              <a:buNone/>
+            </a:pPr>
             <a:r>
               <a:rPr lang="en-US" dirty="0"/>
-              <a:t>We need a centralized logging service that aggregates logs from each service instance. Users can search and analyze the logs. They can configure alerts that are triggered when certain messages appear in the logs. For example, PCF does have </a:t>
-            </a:r>
-            <a:r>
-              <a:rPr lang="en-US" dirty="0" err="1"/>
-              <a:t>Loggeregator</a:t>
-            </a:r>
+              <a:t>As our application depends on 3rd party APIs and we need to provide best user experience to our user, we will publish the user request to all airlines and whichever responds within specific timeout period, we will collect all results and show the top 5 deals to our users.</a:t>
+            </a:r>
+          </a:p>
+          <a:p>
+            <a:endParaRPr lang="en-US" dirty="0"/>
+          </a:p>
+          <a:p>
+            <a:endParaRPr lang="en-US" dirty="0"/>
+          </a:p>
+          <a:p>
+            <a:endParaRPr lang="en-US" dirty="0"/>
+          </a:p>
+          <a:p>
+            <a:endParaRPr lang="en-US" dirty="0"/>
+          </a:p>
+          <a:p>
+            <a:endParaRPr lang="en-US" dirty="0"/>
+          </a:p>
+          <a:p>
+            <a:endParaRPr lang="en-US" dirty="0"/>
+          </a:p>
+          <a:p>
+            <a:endParaRPr lang="en-US" dirty="0"/>
+          </a:p>
+          <a:p>
+            <a:endParaRPr lang="en-US" dirty="0"/>
+          </a:p>
+          <a:p>
+            <a:endParaRPr lang="en-US" dirty="0"/>
+          </a:p>
+          <a:p>
+            <a:endParaRPr lang="en-US" dirty="0"/>
+          </a:p>
+          <a:p>
+            <a:endParaRPr lang="en-US" dirty="0"/>
+          </a:p>
+          <a:p>
             <a:r>
               <a:rPr lang="en-US" dirty="0"/>
-              <a:t>, which collects logs from each component (router, controller, </a:t>
-            </a:r>
-            <a:r>
-              <a:rPr lang="en-US" dirty="0" err="1"/>
-              <a:t>diego</a:t>
-            </a:r>
-            <a:r>
-              <a:rPr lang="en-US" dirty="0"/>
-              <a:t>, etc...) of the PCF platform along with applications. AWS Cloud Watch also does the same.</a:t>
-            </a:r>
-          </a:p>
-          <a:p>
-            <a:endParaRPr lang="en-US" dirty="0"/>
-          </a:p>
-        </p:txBody>
-      </p:sp>
+              <a:t>The main application does not even know how many airlines are listening to the requests. Even if some of the airlines services are not be up and running, it is not going to affect our flight-app.</a:t>
+            </a:r>
+          </a:p>
+          <a:p>
+            <a:pPr marL="0" indent="0">
+              <a:buNone/>
+            </a:pPr>
+            <a:endParaRPr lang="en-IN" dirty="0"/>
+          </a:p>
+        </p:txBody>
+      </p:sp>
+      <p:pic>
+        <p:nvPicPr>
+          <p:cNvPr id="2053" name="Picture 5" descr="scatter gather pattern">
+            <a:extLst>
+              <a:ext uri="{FF2B5EF4-FFF2-40B4-BE49-F238E27FC236}">
+                <a16:creationId xmlns:a16="http://schemas.microsoft.com/office/drawing/2014/main" id="{7299B820-16B5-2D8E-CF66-78145592C1F0}"/>
+              </a:ext>
+            </a:extLst>
+          </p:cNvPr>
+          <p:cNvPicPr>
+            <a:picLocks noChangeAspect="1" noChangeArrowheads="1"/>
+          </p:cNvPicPr>
+          <p:nvPr/>
+        </p:nvPicPr>
+        <p:blipFill>
+          <a:blip r:embed="rId3">
+            <a:extLst>
+              <a:ext uri="{28A0092B-C50C-407E-A947-70E740481C1C}">
+                <a14:useLocalDpi xmlns:a14="http://schemas.microsoft.com/office/drawing/2010/main" val="0"/>
+              </a:ext>
+            </a:extLst>
+          </a:blip>
+          <a:srcRect/>
+          <a:stretch>
+            <a:fillRect/>
+          </a:stretch>
+        </p:blipFill>
+        <p:spPr bwMode="auto">
+          <a:xfrm>
+            <a:off x="2033972" y="3212976"/>
+            <a:ext cx="5076056" cy="2170543"/>
+          </a:xfrm>
+          <a:prstGeom prst="rect">
+            <a:avLst/>
+          </a:prstGeom>
+          <a:noFill/>
+          <a:extLst>
+            <a:ext uri="{909E8E84-426E-40DD-AFC4-6F175D3DCCD1}">
+              <a14:hiddenFill xmlns:a14="http://schemas.microsoft.com/office/drawing/2010/main">
+                <a:solidFill>
+                  <a:srgbClr val="FFFFFF"/>
+                </a:solidFill>
+              </a14:hiddenFill>
+            </a:ext>
+          </a:extLst>
+        </p:spPr>
+      </p:pic>
     </p:spTree>
+    <p:extLst>
+      <p:ext uri="{BB962C8B-B14F-4D97-AF65-F5344CB8AC3E}">
+        <p14:creationId xmlns:p14="http://schemas.microsoft.com/office/powerpoint/2010/main" val="3016336452"/>
+      </p:ext>
+    </p:extLst>
   </p:cSld>
   <p:clrMapOvr>
     <a:masterClrMapping/>
@@ -18286,7 +18481,13 @@
       </p:grpSpPr>
       <p:sp>
         <p:nvSpPr>
-          <p:cNvPr id="2" name="Title 1"/>
+          <p:cNvPr id="2" name="Title 1">
+            <a:extLst>
+              <a:ext uri="{FF2B5EF4-FFF2-40B4-BE49-F238E27FC236}">
+                <a16:creationId xmlns:a16="http://schemas.microsoft.com/office/drawing/2014/main" id="{B1DC4EC9-F97C-24A3-4DE7-49F0B54B1EC5}"/>
+              </a:ext>
+            </a:extLst>
+          </p:cNvPr>
           <p:cNvSpPr>
             <a:spLocks noGrp="1"/>
           </p:cNvSpPr>
@@ -18302,19 +18503,37 @@
           <a:lstStyle/>
           <a:p>
             <a:r>
-              <a:rPr lang="en-US" b="1" dirty="0"/>
-              <a:t>Performance Metrics</a:t>
+              <a:rPr lang="en-IN" b="1" i="0" dirty="0">
+                <a:solidFill>
+                  <a:srgbClr val="3A3A3A"/>
+                </a:solidFill>
+                <a:effectLst/>
+                <a:latin typeface="Catamaran-SemiBold"/>
+              </a:rPr>
+              <a:t>Scatter Gather Pattern</a:t>
             </a:r>
             <a:br>
-              <a:rPr lang="en-US" b="1" dirty="0"/>
+              <a:rPr lang="en-IN" b="0" i="0" dirty="0">
+                <a:solidFill>
+                  <a:srgbClr val="3A3A3A"/>
+                </a:solidFill>
+                <a:effectLst/>
+                <a:latin typeface="Catamaran-Regular"/>
+              </a:rPr>
             </a:br>
-            <a:endParaRPr lang="en-US" dirty="0"/>
-          </a:p>
-        </p:txBody>
-      </p:sp>
-      <p:sp>
-        <p:nvSpPr>
-          <p:cNvPr id="3" name="Content Placeholder 2"/>
+            <a:endParaRPr lang="en-IN" dirty="0"/>
+          </a:p>
+        </p:txBody>
+      </p:sp>
+      <p:sp>
+        <p:nvSpPr>
+          <p:cNvPr id="3" name="Content Placeholder 2">
+            <a:extLst>
+              <a:ext uri="{FF2B5EF4-FFF2-40B4-BE49-F238E27FC236}">
+                <a16:creationId xmlns:a16="http://schemas.microsoft.com/office/drawing/2014/main" id="{CC5D9D8C-BCD7-922B-917F-E7E95E208476}"/>
+              </a:ext>
+            </a:extLst>
+          </p:cNvPr>
           <p:cNvSpPr>
             <a:spLocks noGrp="1"/>
           </p:cNvSpPr>
@@ -18325,86 +18544,479 @@
         <p:spPr/>
         <p:txBody>
           <a:bodyPr>
-            <a:normAutofit fontScale="70000" lnSpcReduction="20000"/>
+            <a:normAutofit fontScale="77500" lnSpcReduction="20000"/>
           </a:bodyPr>
           <a:lstStyle/>
           <a:p>
-            <a:pPr>
-              <a:buNone/>
-            </a:pPr>
-            <a:r>
-              <a:rPr lang="en-US" b="1" dirty="0"/>
-              <a:t>Problem</a:t>
-            </a:r>
-          </a:p>
-          <a:p>
-            <a:r>
-              <a:rPr lang="en-US" dirty="0"/>
-              <a:t>When the service portfolio increases due to </a:t>
-            </a:r>
-            <a:r>
-              <a:rPr lang="en-US" dirty="0" err="1"/>
-              <a:t>microservice</a:t>
-            </a:r>
-            <a:r>
-              <a:rPr lang="en-US" dirty="0"/>
-              <a:t> architecture, it becomes critical to keep a watch on the transactions so that patterns can be monitored and alerts sent when an issue happens. How should we collect metrics to monitor application </a:t>
-            </a:r>
-            <a:r>
-              <a:rPr lang="en-US" dirty="0" err="1"/>
-              <a:t>perfomance</a:t>
-            </a:r>
-            <a:r>
-              <a:rPr lang="en-US" dirty="0"/>
-              <a:t>?</a:t>
-            </a:r>
-          </a:p>
-          <a:p>
-            <a:pPr>
-              <a:buNone/>
-            </a:pPr>
-            <a:r>
-              <a:rPr lang="en-US" b="1" dirty="0"/>
-              <a:t>Solution</a:t>
-            </a:r>
-          </a:p>
-          <a:p>
-            <a:r>
-              <a:rPr lang="en-US" dirty="0"/>
-              <a:t>A metrics service is required to gather statistics about individual operations. It should aggregate the metrics of an application service, which provides reporting and alerting. There are two models for aggregating metrics:</a:t>
-            </a:r>
-          </a:p>
-          <a:p>
-            <a:r>
-              <a:rPr lang="en-US" dirty="0"/>
-              <a:t>Push — the service pushes metrics to the metrics service e.g. </a:t>
-            </a:r>
-            <a:r>
-              <a:rPr lang="en-US" dirty="0" err="1"/>
-              <a:t>NewRelic</a:t>
-            </a:r>
-            <a:r>
-              <a:rPr lang="en-US" dirty="0"/>
-              <a:t>, </a:t>
-            </a:r>
-            <a:r>
-              <a:rPr lang="en-US" dirty="0" err="1"/>
-              <a:t>AppDynamics</a:t>
-            </a:r>
-            <a:endParaRPr lang="en-US" dirty="0"/>
-          </a:p>
-          <a:p>
-            <a:r>
-              <a:rPr lang="en-US" dirty="0"/>
-              <a:t>Pull — the metrics services pulls metrics from the service e.g. Prometheus</a:t>
-            </a:r>
-          </a:p>
-          <a:p>
-            <a:endParaRPr lang="en-US" dirty="0"/>
-          </a:p>
-        </p:txBody>
-      </p:sp>
+            <a:pPr marL="0" indent="0">
+              <a:buNone/>
+            </a:pPr>
+            <a:r>
+              <a:rPr lang="en-IN" sz="1600" dirty="0"/>
+              <a:t>DEMO</a:t>
+            </a:r>
+          </a:p>
+          <a:p>
+            <a:pPr marL="0" indent="0">
+              <a:buNone/>
+            </a:pPr>
+            <a:r>
+              <a:rPr lang="en-IN" sz="1600" dirty="0"/>
+              <a:t>NATS Server:</a:t>
+            </a:r>
+          </a:p>
+          <a:p>
+            <a:pPr marL="0" indent="0">
+              <a:buNone/>
+            </a:pPr>
+            <a:r>
+              <a:rPr lang="en-US" sz="1600" dirty="0"/>
+              <a:t>Please ensure that NATS server is up and running.  We can easily spin up NATS by using docker.</a:t>
+            </a:r>
+          </a:p>
+          <a:p>
+            <a:pPr marL="0" indent="0">
+              <a:buNone/>
+            </a:pPr>
+            <a:r>
+              <a:rPr lang="en-IN" sz="1600" b="1" i="1" dirty="0"/>
+              <a:t>docker run -p 4222:4222 </a:t>
+            </a:r>
+            <a:r>
+              <a:rPr lang="en-IN" sz="1600" b="1" i="1" dirty="0" err="1"/>
+              <a:t>nats:alpine</a:t>
+            </a:r>
+            <a:endParaRPr lang="en-IN" sz="1600" b="1" i="1" dirty="0"/>
+          </a:p>
+          <a:p>
+            <a:pPr marL="0" indent="0" algn="l" fontAlgn="base">
+              <a:buNone/>
+            </a:pPr>
+            <a:r>
+              <a:rPr lang="en-US" sz="1600" i="0" dirty="0">
+                <a:solidFill>
+                  <a:srgbClr val="3A3A3A"/>
+                </a:solidFill>
+                <a:effectLst/>
+              </a:rPr>
+              <a:t>Project Setup</a:t>
+            </a:r>
+          </a:p>
+          <a:p>
+            <a:pPr algn="l" fontAlgn="base"/>
+            <a:r>
+              <a:rPr lang="en-US" sz="1600" b="0" i="0" dirty="0">
+                <a:solidFill>
+                  <a:srgbClr val="212121"/>
+                </a:solidFill>
+                <a:effectLst/>
+              </a:rPr>
+              <a:t>Create a Spring Boot application with below dependencies.</a:t>
+            </a:r>
+          </a:p>
+          <a:p>
+            <a:pPr algn="l" fontAlgn="base"/>
+            <a:endParaRPr lang="en-US" sz="1600" b="0" i="0" dirty="0">
+              <a:solidFill>
+                <a:srgbClr val="212121"/>
+              </a:solidFill>
+              <a:effectLst/>
+            </a:endParaRPr>
+          </a:p>
+          <a:p>
+            <a:pPr algn="l" fontAlgn="base"/>
+            <a:endParaRPr lang="en-US" sz="1600" dirty="0">
+              <a:solidFill>
+                <a:srgbClr val="212121"/>
+              </a:solidFill>
+            </a:endParaRPr>
+          </a:p>
+          <a:p>
+            <a:pPr algn="l" fontAlgn="base"/>
+            <a:endParaRPr lang="en-US" sz="1600" b="0" i="0" dirty="0">
+              <a:solidFill>
+                <a:srgbClr val="212121"/>
+              </a:solidFill>
+              <a:effectLst/>
+            </a:endParaRPr>
+          </a:p>
+          <a:p>
+            <a:pPr algn="l" fontAlgn="base"/>
+            <a:endParaRPr lang="en-US" sz="1600" dirty="0">
+              <a:solidFill>
+                <a:srgbClr val="212121"/>
+              </a:solidFill>
+            </a:endParaRPr>
+          </a:p>
+          <a:p>
+            <a:pPr algn="l" fontAlgn="base"/>
+            <a:endParaRPr lang="en-US" sz="1600" b="0" i="0" dirty="0">
+              <a:solidFill>
+                <a:srgbClr val="212121"/>
+              </a:solidFill>
+              <a:effectLst/>
+            </a:endParaRPr>
+          </a:p>
+          <a:p>
+            <a:pPr algn="l" fontAlgn="base"/>
+            <a:r>
+              <a:rPr lang="en-US" sz="1600" b="0" i="0" dirty="0">
+                <a:solidFill>
+                  <a:srgbClr val="212121"/>
+                </a:solidFill>
+                <a:effectLst/>
+              </a:rPr>
+              <a:t>It will be a multi-module maven project as shown here.</a:t>
+            </a:r>
+          </a:p>
+          <a:p>
+            <a:pPr algn="l" fontAlgn="base"/>
+            <a:endParaRPr lang="en-US" sz="1600" b="0" i="0" dirty="0">
+              <a:solidFill>
+                <a:srgbClr val="212121"/>
+              </a:solidFill>
+              <a:effectLst/>
+            </a:endParaRPr>
+          </a:p>
+          <a:p>
+            <a:pPr algn="l" fontAlgn="base"/>
+            <a:endParaRPr lang="en-US" sz="1600" dirty="0">
+              <a:solidFill>
+                <a:srgbClr val="212121"/>
+              </a:solidFill>
+            </a:endParaRPr>
+          </a:p>
+          <a:p>
+            <a:pPr algn="l" fontAlgn="base"/>
+            <a:endParaRPr lang="en-US" sz="1600" dirty="0">
+              <a:solidFill>
+                <a:srgbClr val="212121"/>
+              </a:solidFill>
+            </a:endParaRPr>
+          </a:p>
+          <a:p>
+            <a:pPr algn="l" fontAlgn="base"/>
+            <a:endParaRPr lang="en-US" sz="1600" dirty="0">
+              <a:solidFill>
+                <a:srgbClr val="212121"/>
+              </a:solidFill>
+            </a:endParaRPr>
+          </a:p>
+          <a:p>
+            <a:pPr algn="l" fontAlgn="base"/>
+            <a:endParaRPr lang="en-US" sz="1600" dirty="0">
+              <a:solidFill>
+                <a:srgbClr val="212121"/>
+              </a:solidFill>
+            </a:endParaRPr>
+          </a:p>
+          <a:p>
+            <a:pPr algn="l" fontAlgn="base"/>
+            <a:r>
+              <a:rPr lang="en-US" sz="1600" b="0" i="0" dirty="0">
+                <a:solidFill>
+                  <a:srgbClr val="212121"/>
+                </a:solidFill>
+                <a:effectLst/>
+              </a:rPr>
+              <a:t>Our project depends on super-fast NATS messaging server. So add this dependency as well.</a:t>
+            </a:r>
+          </a:p>
+          <a:p>
+            <a:pPr algn="l" fontAlgn="base"/>
+            <a:endParaRPr lang="en-US" sz="1600" b="0" i="0" dirty="0">
+              <a:solidFill>
+                <a:srgbClr val="212121"/>
+              </a:solidFill>
+              <a:effectLst/>
+            </a:endParaRPr>
+          </a:p>
+          <a:p>
+            <a:pPr marL="0" indent="0" algn="l" fontAlgn="base">
+              <a:buNone/>
+            </a:pPr>
+            <a:r>
+              <a:rPr lang="en-US" sz="1600" b="0" i="0" dirty="0">
+                <a:solidFill>
+                  <a:srgbClr val="212121"/>
+                </a:solidFill>
+                <a:effectLst/>
+              </a:rPr>
+              <a:t>&lt;dependency&gt;</a:t>
+            </a:r>
+          </a:p>
+          <a:p>
+            <a:pPr marL="0" indent="0" algn="l" fontAlgn="base">
+              <a:buNone/>
+            </a:pPr>
+            <a:r>
+              <a:rPr lang="en-US" sz="1600" b="0" i="0" dirty="0">
+                <a:solidFill>
+                  <a:srgbClr val="212121"/>
+                </a:solidFill>
+                <a:effectLst/>
+              </a:rPr>
+              <a:t>    &lt;</a:t>
+            </a:r>
+            <a:r>
+              <a:rPr lang="en-US" sz="1600" b="0" i="0" dirty="0" err="1">
+                <a:solidFill>
+                  <a:srgbClr val="212121"/>
+                </a:solidFill>
+                <a:effectLst/>
+              </a:rPr>
+              <a:t>groupId</a:t>
+            </a:r>
+            <a:r>
+              <a:rPr lang="en-US" sz="1600" b="0" i="0" dirty="0">
+                <a:solidFill>
+                  <a:srgbClr val="212121"/>
+                </a:solidFill>
+                <a:effectLst/>
+              </a:rPr>
+              <a:t>&gt;</a:t>
+            </a:r>
+            <a:r>
+              <a:rPr lang="en-US" sz="1600" b="0" i="0" dirty="0" err="1">
+                <a:solidFill>
+                  <a:srgbClr val="212121"/>
+                </a:solidFill>
+                <a:effectLst/>
+              </a:rPr>
+              <a:t>io.nats</a:t>
+            </a:r>
+            <a:r>
+              <a:rPr lang="en-US" sz="1600" b="0" i="0" dirty="0">
+                <a:solidFill>
+                  <a:srgbClr val="212121"/>
+                </a:solidFill>
+                <a:effectLst/>
+              </a:rPr>
+              <a:t>&lt;/</a:t>
+            </a:r>
+            <a:r>
+              <a:rPr lang="en-US" sz="1600" b="0" i="0" dirty="0" err="1">
+                <a:solidFill>
+                  <a:srgbClr val="212121"/>
+                </a:solidFill>
+                <a:effectLst/>
+              </a:rPr>
+              <a:t>groupId</a:t>
+            </a:r>
+            <a:r>
+              <a:rPr lang="en-US" sz="1600" b="0" i="0" dirty="0">
+                <a:solidFill>
+                  <a:srgbClr val="212121"/>
+                </a:solidFill>
+                <a:effectLst/>
+              </a:rPr>
+              <a:t>&gt;</a:t>
+            </a:r>
+          </a:p>
+          <a:p>
+            <a:pPr marL="0" indent="0" algn="l" fontAlgn="base">
+              <a:buNone/>
+            </a:pPr>
+            <a:r>
+              <a:rPr lang="en-US" sz="1600" b="0" i="0" dirty="0">
+                <a:solidFill>
+                  <a:srgbClr val="212121"/>
+                </a:solidFill>
+                <a:effectLst/>
+              </a:rPr>
+              <a:t>    &lt;</a:t>
+            </a:r>
+            <a:r>
+              <a:rPr lang="en-US" sz="1600" b="0" i="0" dirty="0" err="1">
+                <a:solidFill>
+                  <a:srgbClr val="212121"/>
+                </a:solidFill>
+                <a:effectLst/>
+              </a:rPr>
+              <a:t>artifactId</a:t>
+            </a:r>
+            <a:r>
+              <a:rPr lang="en-US" sz="1600" b="0" i="0" dirty="0">
+                <a:solidFill>
+                  <a:srgbClr val="212121"/>
+                </a:solidFill>
+                <a:effectLst/>
+              </a:rPr>
+              <a:t>&gt;</a:t>
+            </a:r>
+            <a:r>
+              <a:rPr lang="en-US" sz="1600" b="0" i="0" dirty="0" err="1">
+                <a:solidFill>
+                  <a:srgbClr val="212121"/>
+                </a:solidFill>
+                <a:effectLst/>
+              </a:rPr>
+              <a:t>jnats</a:t>
+            </a:r>
+            <a:r>
+              <a:rPr lang="en-US" sz="1600" b="0" i="0" dirty="0">
+                <a:solidFill>
+                  <a:srgbClr val="212121"/>
+                </a:solidFill>
+                <a:effectLst/>
+              </a:rPr>
+              <a:t>&lt;/</a:t>
+            </a:r>
+            <a:r>
+              <a:rPr lang="en-US" sz="1600" b="0" i="0" dirty="0" err="1">
+                <a:solidFill>
+                  <a:srgbClr val="212121"/>
+                </a:solidFill>
+                <a:effectLst/>
+              </a:rPr>
+              <a:t>artifactId</a:t>
+            </a:r>
+            <a:r>
+              <a:rPr lang="en-US" sz="1600" b="0" i="0" dirty="0">
+                <a:solidFill>
+                  <a:srgbClr val="212121"/>
+                </a:solidFill>
+                <a:effectLst/>
+              </a:rPr>
+              <a:t>&gt;</a:t>
+            </a:r>
+          </a:p>
+          <a:p>
+            <a:pPr marL="0" indent="0" algn="l" fontAlgn="base">
+              <a:buNone/>
+            </a:pPr>
+            <a:r>
+              <a:rPr lang="en-US" sz="1600" b="0" i="0" dirty="0">
+                <a:solidFill>
+                  <a:srgbClr val="212121"/>
+                </a:solidFill>
+                <a:effectLst/>
+              </a:rPr>
+              <a:t>    &lt;version&gt;2.6.8&lt;/version&gt;</a:t>
+            </a:r>
+          </a:p>
+          <a:p>
+            <a:pPr marL="0" indent="0" algn="l" fontAlgn="base">
+              <a:buNone/>
+            </a:pPr>
+            <a:r>
+              <a:rPr lang="en-US" sz="1600" b="0" i="0" dirty="0">
+                <a:solidFill>
+                  <a:srgbClr val="212121"/>
+                </a:solidFill>
+                <a:effectLst/>
+              </a:rPr>
+              <a:t>&lt;/dependency&gt;</a:t>
+            </a:r>
+          </a:p>
+          <a:p>
+            <a:pPr marL="0" indent="0">
+              <a:buNone/>
+            </a:pPr>
+            <a:endParaRPr lang="en-IN" sz="1600" dirty="0"/>
+          </a:p>
+        </p:txBody>
+      </p:sp>
+      <p:pic>
+        <p:nvPicPr>
+          <p:cNvPr id="3078" name="Picture 6">
+            <a:extLst>
+              <a:ext uri="{FF2B5EF4-FFF2-40B4-BE49-F238E27FC236}">
+                <a16:creationId xmlns:a16="http://schemas.microsoft.com/office/drawing/2014/main" id="{7B88FE5C-0638-1A34-41EC-C407635C83DF}"/>
+              </a:ext>
+            </a:extLst>
+          </p:cNvPr>
+          <p:cNvPicPr>
+            <a:picLocks noChangeAspect="1" noChangeArrowheads="1"/>
+          </p:cNvPicPr>
+          <p:nvPr/>
+        </p:nvPicPr>
+        <p:blipFill>
+          <a:blip r:embed="rId2">
+            <a:extLst>
+              <a:ext uri="{28A0092B-C50C-407E-A947-70E740481C1C}">
+                <a14:useLocalDpi xmlns:a14="http://schemas.microsoft.com/office/drawing/2010/main" val="0"/>
+              </a:ext>
+            </a:extLst>
+          </a:blip>
+          <a:srcRect/>
+          <a:stretch>
+            <a:fillRect/>
+          </a:stretch>
+        </p:blipFill>
+        <p:spPr bwMode="auto">
+          <a:xfrm>
+            <a:off x="5004048" y="2420888"/>
+            <a:ext cx="3552817" cy="1160202"/>
+          </a:xfrm>
+          <a:prstGeom prst="rect">
+            <a:avLst/>
+          </a:prstGeom>
+          <a:noFill/>
+          <a:extLst>
+            <a:ext uri="{909E8E84-426E-40DD-AFC4-6F175D3DCCD1}">
+              <a14:hiddenFill xmlns:a14="http://schemas.microsoft.com/office/drawing/2010/main">
+                <a:solidFill>
+                  <a:srgbClr val="FFFFFF"/>
+                </a:solidFill>
+              </a14:hiddenFill>
+            </a:ext>
+          </a:extLst>
+        </p:spPr>
+      </p:pic>
+      <p:pic>
+        <p:nvPicPr>
+          <p:cNvPr id="3080" name="Picture 8">
+            <a:extLst>
+              <a:ext uri="{FF2B5EF4-FFF2-40B4-BE49-F238E27FC236}">
+                <a16:creationId xmlns:a16="http://schemas.microsoft.com/office/drawing/2014/main" id="{20FFAA8B-CDC8-73C6-2DC6-9ABE9E815404}"/>
+              </a:ext>
+            </a:extLst>
+          </p:cNvPr>
+          <p:cNvPicPr>
+            <a:picLocks noChangeAspect="1" noChangeArrowheads="1"/>
+          </p:cNvPicPr>
+          <p:nvPr/>
+        </p:nvPicPr>
+        <p:blipFill>
+          <a:blip r:embed="rId3">
+            <a:extLst>
+              <a:ext uri="{28A0092B-C50C-407E-A947-70E740481C1C}">
+                <a14:useLocalDpi xmlns:a14="http://schemas.microsoft.com/office/drawing/2010/main" val="0"/>
+              </a:ext>
+            </a:extLst>
+          </a:blip>
+          <a:srcRect/>
+          <a:stretch>
+            <a:fillRect/>
+          </a:stretch>
+        </p:blipFill>
+        <p:spPr bwMode="auto">
+          <a:xfrm>
+            <a:off x="5364088" y="3763652"/>
+            <a:ext cx="2619375" cy="809625"/>
+          </a:xfrm>
+          <a:prstGeom prst="rect">
+            <a:avLst/>
+          </a:prstGeom>
+          <a:noFill/>
+          <a:extLst>
+            <a:ext uri="{909E8E84-426E-40DD-AFC4-6F175D3DCCD1}">
+              <a14:hiddenFill xmlns:a14="http://schemas.microsoft.com/office/drawing/2010/main">
+                <a:solidFill>
+                  <a:srgbClr val="FFFFFF"/>
+                </a:solidFill>
+              </a14:hiddenFill>
+            </a:ext>
+          </a:extLst>
+        </p:spPr>
+      </p:pic>
     </p:spTree>
+    <p:extLst>
+      <p:ext uri="{BB962C8B-B14F-4D97-AF65-F5344CB8AC3E}">
+        <p14:creationId xmlns:p14="http://schemas.microsoft.com/office/powerpoint/2010/main" val="2107592708"/>
+      </p:ext>
+    </p:extLst>
   </p:cSld>
   <p:clrMapOvr>
     <a:masterClrMapping/>
@@ -18431,7 +19043,13 @@
       </p:grpSpPr>
       <p:sp>
         <p:nvSpPr>
-          <p:cNvPr id="2" name="Title 1"/>
+          <p:cNvPr id="2" name="Title 1">
+            <a:extLst>
+              <a:ext uri="{FF2B5EF4-FFF2-40B4-BE49-F238E27FC236}">
+                <a16:creationId xmlns:a16="http://schemas.microsoft.com/office/drawing/2014/main" id="{F5BEDD40-8418-A74C-A3EE-2FC169A04A0A}"/>
+              </a:ext>
+            </a:extLst>
+          </p:cNvPr>
           <p:cNvSpPr>
             <a:spLocks noGrp="1"/>
           </p:cNvSpPr>
@@ -18447,19 +19065,37 @@
           <a:lstStyle/>
           <a:p>
             <a:r>
-              <a:rPr lang="en-US" b="1" dirty="0"/>
-              <a:t>Distributed Tracing</a:t>
+              <a:rPr lang="en-IN" b="1" i="0" dirty="0">
+                <a:solidFill>
+                  <a:srgbClr val="3A3A3A"/>
+                </a:solidFill>
+                <a:effectLst/>
+                <a:latin typeface="Catamaran-SemiBold"/>
+              </a:rPr>
+              <a:t>Scatter Gather Pattern</a:t>
             </a:r>
             <a:br>
-              <a:rPr lang="en-US" b="1" dirty="0"/>
+              <a:rPr lang="en-IN" b="0" i="0" dirty="0">
+                <a:solidFill>
+                  <a:srgbClr val="3A3A3A"/>
+                </a:solidFill>
+                <a:effectLst/>
+                <a:latin typeface="Catamaran-Regular"/>
+              </a:rPr>
             </a:br>
-            <a:endParaRPr lang="en-US" dirty="0"/>
-          </a:p>
-        </p:txBody>
-      </p:sp>
-      <p:sp>
-        <p:nvSpPr>
-          <p:cNvPr id="3" name="Content Placeholder 2"/>
+            <a:endParaRPr lang="en-IN" dirty="0"/>
+          </a:p>
+        </p:txBody>
+      </p:sp>
+      <p:sp>
+        <p:nvSpPr>
+          <p:cNvPr id="3" name="Content Placeholder 2">
+            <a:extLst>
+              <a:ext uri="{FF2B5EF4-FFF2-40B4-BE49-F238E27FC236}">
+                <a16:creationId xmlns:a16="http://schemas.microsoft.com/office/drawing/2014/main" id="{E4E37B9B-F345-1836-0EFF-36E68FA2F530}"/>
+              </a:ext>
+            </a:extLst>
+          </p:cNvPr>
           <p:cNvSpPr>
             <a:spLocks noGrp="1"/>
           </p:cNvSpPr>
@@ -18474,92 +19110,306 @@
           </a:bodyPr>
           <a:lstStyle/>
           <a:p>
-            <a:pPr>
-              <a:buNone/>
-            </a:pPr>
-            <a:r>
-              <a:rPr lang="en-US" b="1" dirty="0"/>
-              <a:t>Problem</a:t>
-            </a:r>
-          </a:p>
-          <a:p>
+            <a:r>
+              <a:rPr lang="en-IN" dirty="0"/>
+              <a:t>DEMO</a:t>
+            </a:r>
+          </a:p>
+          <a:p>
+            <a:pPr marL="0" indent="0" algn="l" fontAlgn="base">
+              <a:buNone/>
+            </a:pPr>
+            <a:r>
+              <a:rPr lang="en-US" b="1" i="0" dirty="0">
+                <a:solidFill>
+                  <a:srgbClr val="3A3A3A"/>
+                </a:solidFill>
+                <a:effectLst/>
+                <a:latin typeface="Catamaran-SemiBold"/>
+              </a:rPr>
+              <a:t>Scatter Gather Pattern</a:t>
+            </a:r>
+            <a:endParaRPr lang="en-US" b="0" i="0" dirty="0">
+              <a:solidFill>
+                <a:srgbClr val="3A3A3A"/>
+              </a:solidFill>
+              <a:effectLst/>
+              <a:latin typeface="Catamaran-Regular"/>
+            </a:endParaRPr>
+          </a:p>
+          <a:p>
+            <a:pPr lvl="1" fontAlgn="base">
+              <a:buFont typeface="Arial" panose="020B0604020202020204" pitchFamily="34" charset="0"/>
+              <a:buChar char="•"/>
+            </a:pPr>
+            <a:r>
+              <a:rPr lang="en-US" b="0" i="0" dirty="0">
+                <a:solidFill>
+                  <a:srgbClr val="212121"/>
+                </a:solidFill>
+                <a:effectLst/>
+                <a:latin typeface="Catamaran-Regular"/>
+              </a:rPr>
+              <a:t>Now lets work on the flight-search customer facing app.</a:t>
+            </a:r>
+          </a:p>
+          <a:p>
+            <a:pPr lvl="2" fontAlgn="base"/>
+            <a:r>
+              <a:rPr lang="en-IN" b="0" i="0" dirty="0">
+                <a:solidFill>
+                  <a:srgbClr val="212121"/>
+                </a:solidFill>
+                <a:effectLst/>
+                <a:latin typeface="Catamaran-Regular"/>
+              </a:rPr>
+              <a:t>NATS bean</a:t>
+            </a:r>
+          </a:p>
+          <a:p>
+            <a:pPr lvl="2" fontAlgn="base"/>
+            <a:r>
+              <a:rPr lang="en-US" b="0" i="0" dirty="0">
+                <a:solidFill>
+                  <a:srgbClr val="212121"/>
+                </a:solidFill>
+                <a:effectLst/>
+                <a:latin typeface="Catamaran-Regular"/>
+              </a:rPr>
+              <a:t>Controller</a:t>
+            </a:r>
+          </a:p>
+          <a:p>
+            <a:pPr lvl="2" fontAlgn="base"/>
+            <a:r>
+              <a:rPr lang="en-US" b="0" i="0" dirty="0" err="1">
+                <a:solidFill>
+                  <a:srgbClr val="212121"/>
+                </a:solidFill>
+                <a:effectLst/>
+                <a:latin typeface="Catamaran-Regular"/>
+              </a:rPr>
+              <a:t>ScatterGatherService</a:t>
+            </a:r>
+            <a:endParaRPr lang="en-US" b="0" i="0" dirty="0">
+              <a:solidFill>
+                <a:srgbClr val="212121"/>
+              </a:solidFill>
+              <a:effectLst/>
+              <a:latin typeface="Catamaran-Regular"/>
+            </a:endParaRPr>
+          </a:p>
+          <a:p>
+            <a:pPr lvl="3" fontAlgn="base">
+              <a:buFont typeface="Arial" panose="020B0604020202020204" pitchFamily="34" charset="0"/>
+              <a:buChar char="•"/>
+            </a:pPr>
+            <a:r>
+              <a:rPr lang="en-US" b="0" i="0" dirty="0">
+                <a:solidFill>
+                  <a:srgbClr val="212121"/>
+                </a:solidFill>
+                <a:effectLst/>
+                <a:latin typeface="Catamaran-Regular"/>
+              </a:rPr>
+              <a:t>This class is responsible for broadcasting the request and receiving the responses</a:t>
+            </a:r>
+          </a:p>
+          <a:p>
+            <a:pPr marL="0" indent="0">
+              <a:buNone/>
+            </a:pPr>
+            <a:endParaRPr lang="en-IN" b="1" i="0" dirty="0">
+              <a:solidFill>
+                <a:srgbClr val="3A3A3A"/>
+              </a:solidFill>
+              <a:effectLst/>
+              <a:latin typeface="Catamaran-SemiBold"/>
+            </a:endParaRPr>
+          </a:p>
+          <a:p>
+            <a:pPr marL="0" indent="0">
+              <a:buNone/>
+            </a:pPr>
+            <a:r>
+              <a:rPr lang="en-IN" b="1" i="0" dirty="0">
+                <a:solidFill>
+                  <a:srgbClr val="3A3A3A"/>
+                </a:solidFill>
+                <a:effectLst/>
+                <a:latin typeface="Catamaran-SemiBold"/>
+              </a:rPr>
+              <a:t>Airline – Service</a:t>
+            </a:r>
+            <a:endParaRPr lang="en-IN" b="0" i="0" dirty="0">
+              <a:solidFill>
+                <a:srgbClr val="3A3A3A"/>
+              </a:solidFill>
+              <a:effectLst/>
+              <a:latin typeface="Catamaran-Regular"/>
+            </a:endParaRPr>
+          </a:p>
+          <a:p>
+            <a:pPr lvl="1">
+              <a:buFont typeface="Arial" panose="020B0604020202020204" pitchFamily="34" charset="0"/>
+              <a:buChar char="•"/>
+            </a:pPr>
             <a:r>
               <a:rPr lang="en-US" dirty="0"/>
-              <a:t>In </a:t>
-            </a:r>
-            <a:r>
-              <a:rPr lang="en-US" dirty="0" err="1"/>
-              <a:t>microservice</a:t>
-            </a:r>
+              <a:t>This service class represents the individual airlines. It receives the request and provide the schedules along with price.</a:t>
+            </a:r>
+          </a:p>
+          <a:p>
+            <a:pPr lvl="1">
+              <a:buFont typeface="Arial" panose="020B0604020202020204" pitchFamily="34" charset="0"/>
+              <a:buChar char="•"/>
+            </a:pPr>
             <a:r>
               <a:rPr lang="en-US" dirty="0"/>
-              <a:t> architecture, requests often span multiple services. Each service handles a request by performing one or more operations across multiple services. Then, how do we trace a request end-to-end to troubleshoot the problem?</a:t>
-            </a:r>
-          </a:p>
-          <a:p>
-            <a:pPr>
-              <a:buNone/>
-            </a:pPr>
-            <a:r>
-              <a:rPr lang="en-US" b="1" dirty="0"/>
-              <a:t>Solution</a:t>
-            </a:r>
-          </a:p>
-          <a:p>
-            <a:r>
-              <a:rPr lang="en-US" dirty="0"/>
-              <a:t>We need a service which</a:t>
-            </a:r>
-          </a:p>
-          <a:p>
-            <a:r>
-              <a:rPr lang="en-US" dirty="0"/>
-              <a:t>Assigns each external request a unique external request id.</a:t>
-            </a:r>
-          </a:p>
-          <a:p>
-            <a:r>
-              <a:rPr lang="en-US" dirty="0"/>
-              <a:t>Passes the external request id to all services.</a:t>
-            </a:r>
-          </a:p>
-          <a:p>
-            <a:r>
-              <a:rPr lang="en-US" dirty="0"/>
-              <a:t>Includes the external request id in all log messages.</a:t>
-            </a:r>
-          </a:p>
-          <a:p>
-            <a:r>
-              <a:rPr lang="en-US" dirty="0"/>
-              <a:t>Records information (e.g. start time, end time) about the requests and operations performed when handling an external request in a centralized service.</a:t>
-            </a:r>
-          </a:p>
-          <a:p>
-            <a:r>
-              <a:rPr lang="en-US" dirty="0"/>
-              <a:t>Spring Cloud </a:t>
-            </a:r>
-            <a:r>
-              <a:rPr lang="en-US" dirty="0" err="1"/>
-              <a:t>Slueth</a:t>
-            </a:r>
-            <a:r>
-              <a:rPr lang="en-US" dirty="0"/>
-              <a:t>, along with </a:t>
-            </a:r>
-            <a:r>
-              <a:rPr lang="en-US" dirty="0" err="1"/>
-              <a:t>Zipkin</a:t>
-            </a:r>
-            <a:r>
-              <a:rPr lang="en-US" dirty="0"/>
-              <a:t> server, is a common implementation.</a:t>
-            </a:r>
+              <a:t>This is a separate app. We would be running multiple instances of this app.</a:t>
+            </a:r>
+            <a:endParaRPr lang="en-IN" dirty="0"/>
+          </a:p>
+          <a:p>
+            <a:pPr marL="0" indent="0" algn="l" fontAlgn="base">
+              <a:buNone/>
+            </a:pPr>
+            <a:r>
+              <a:rPr lang="en-US" b="1" i="0" dirty="0">
+                <a:solidFill>
+                  <a:srgbClr val="3A3A3A"/>
+                </a:solidFill>
+                <a:effectLst/>
+                <a:latin typeface="Catamaran-SemiBold"/>
+              </a:rPr>
+              <a:t>Common DTO</a:t>
+            </a:r>
+            <a:endParaRPr lang="en-US" b="0" i="0" dirty="0">
+              <a:solidFill>
+                <a:srgbClr val="3A3A3A"/>
+              </a:solidFill>
+              <a:effectLst/>
+              <a:latin typeface="Catamaran-Regular"/>
+            </a:endParaRPr>
+          </a:p>
+          <a:p>
+            <a:pPr lvl="1" fontAlgn="base">
+              <a:buFont typeface="Arial" panose="020B0604020202020204" pitchFamily="34" charset="0"/>
+              <a:buChar char="•"/>
+            </a:pPr>
+            <a:r>
+              <a:rPr lang="en-US" b="0" i="0" dirty="0">
+                <a:solidFill>
+                  <a:srgbClr val="212121"/>
+                </a:solidFill>
+                <a:effectLst/>
+                <a:latin typeface="Catamaran-Regular"/>
+              </a:rPr>
+              <a:t>Flight Search Request</a:t>
+            </a:r>
+            <a:endParaRPr lang="en-IN" b="0" i="0" dirty="0">
+              <a:solidFill>
+                <a:srgbClr val="212121"/>
+              </a:solidFill>
+              <a:effectLst/>
+              <a:latin typeface="Catamaran-Regular"/>
+            </a:endParaRPr>
+          </a:p>
+          <a:p>
+            <a:pPr lvl="1" fontAlgn="base">
+              <a:buFont typeface="Arial" panose="020B0604020202020204" pitchFamily="34" charset="0"/>
+              <a:buChar char="•"/>
+            </a:pPr>
+            <a:r>
+              <a:rPr lang="en-IN" b="0" i="0" dirty="0">
+                <a:solidFill>
+                  <a:srgbClr val="212121"/>
+                </a:solidFill>
+                <a:effectLst/>
+                <a:latin typeface="Catamaran-Regular"/>
+              </a:rPr>
+              <a:t>Flight Schedule</a:t>
+            </a:r>
+          </a:p>
+          <a:p>
+            <a:pPr lvl="1" fontAlgn="base">
+              <a:buFont typeface="Arial" panose="020B0604020202020204" pitchFamily="34" charset="0"/>
+              <a:buChar char="•"/>
+            </a:pPr>
+            <a:r>
+              <a:rPr lang="en-IN" b="0" i="0" dirty="0">
+                <a:solidFill>
+                  <a:srgbClr val="212121"/>
+                </a:solidFill>
+                <a:effectLst/>
+                <a:latin typeface="Catamaran-Regular"/>
+              </a:rPr>
+              <a:t>Flight Search </a:t>
+            </a:r>
+            <a:r>
+              <a:rPr lang="en-IN" b="0" i="0" dirty="0" err="1">
+                <a:solidFill>
+                  <a:srgbClr val="212121"/>
+                </a:solidFill>
+                <a:effectLst/>
+                <a:latin typeface="Catamaran-Regular"/>
+              </a:rPr>
+              <a:t>Response</a:t>
+            </a:r>
+            <a:r>
+              <a:rPr lang="en-IN" b="1" i="0" dirty="0" err="1">
+                <a:solidFill>
+                  <a:srgbClr val="3A3A3A"/>
+                </a:solidFill>
+                <a:effectLst/>
+                <a:latin typeface="Catamaran-SemiBold"/>
+              </a:rPr>
+              <a:t>Airline</a:t>
+            </a:r>
+            <a:r>
+              <a:rPr lang="en-IN" b="1" i="0" dirty="0">
+                <a:solidFill>
+                  <a:srgbClr val="3A3A3A"/>
+                </a:solidFill>
+                <a:effectLst/>
+                <a:latin typeface="Catamaran-SemiBold"/>
+              </a:rPr>
+              <a:t> – Service</a:t>
+            </a:r>
+          </a:p>
+          <a:p>
+            <a:pPr marL="457200" lvl="1" indent="0" fontAlgn="base">
+              <a:buNone/>
+            </a:pPr>
+            <a:endParaRPr lang="en-IN" b="0" i="0" dirty="0">
+              <a:solidFill>
+                <a:srgbClr val="3A3A3A"/>
+              </a:solidFill>
+              <a:effectLst/>
+              <a:latin typeface="Catamaran-Regular"/>
+            </a:endParaRPr>
+          </a:p>
+          <a:p>
+            <a:pPr lvl="1" fontAlgn="base">
+              <a:buFont typeface="Arial" panose="020B0604020202020204" pitchFamily="34" charset="0"/>
+              <a:buChar char="•"/>
+            </a:pPr>
+            <a:endParaRPr lang="en-US" b="0" i="0" dirty="0">
+              <a:solidFill>
+                <a:srgbClr val="212121"/>
+              </a:solidFill>
+              <a:effectLst/>
+              <a:latin typeface="Catamaran-Regular"/>
+            </a:endParaRPr>
           </a:p>
         </p:txBody>
       </p:sp>
     </p:spTree>
+    <p:extLst>
+      <p:ext uri="{BB962C8B-B14F-4D97-AF65-F5344CB8AC3E}">
+        <p14:creationId xmlns:p14="http://schemas.microsoft.com/office/powerpoint/2010/main" val="554460181"/>
+      </p:ext>
+    </p:extLst>
   </p:cSld>
   <p:clrMapOvr>
     <a:masterClrMapping/>
@@ -18586,7 +19436,13 @@
       </p:grpSpPr>
       <p:sp>
         <p:nvSpPr>
-          <p:cNvPr id="2" name="Title 1"/>
+          <p:cNvPr id="2" name="Title 1">
+            <a:extLst>
+              <a:ext uri="{FF2B5EF4-FFF2-40B4-BE49-F238E27FC236}">
+                <a16:creationId xmlns:a16="http://schemas.microsoft.com/office/drawing/2014/main" id="{54A1E61C-47F4-BA60-7DE6-B71808785D38}"/>
+              </a:ext>
+            </a:extLst>
+          </p:cNvPr>
           <p:cNvSpPr>
             <a:spLocks noGrp="1"/>
           </p:cNvSpPr>
@@ -18602,19 +19458,37 @@
           <a:lstStyle/>
           <a:p>
             <a:r>
-              <a:rPr lang="en-US" b="1" dirty="0"/>
-              <a:t>Health Check</a:t>
+              <a:rPr lang="en-IN" b="1" i="0" dirty="0">
+                <a:solidFill>
+                  <a:srgbClr val="3A3A3A"/>
+                </a:solidFill>
+                <a:effectLst/>
+                <a:latin typeface="Catamaran-SemiBold"/>
+              </a:rPr>
+              <a:t>Scatter Gather Pattern</a:t>
             </a:r>
             <a:br>
-              <a:rPr lang="en-US" b="1" dirty="0"/>
+              <a:rPr lang="en-IN" b="0" i="0" dirty="0">
+                <a:solidFill>
+                  <a:srgbClr val="3A3A3A"/>
+                </a:solidFill>
+                <a:effectLst/>
+                <a:latin typeface="Catamaran-Regular"/>
+              </a:rPr>
             </a:br>
-            <a:endParaRPr lang="en-US" dirty="0"/>
-          </a:p>
-        </p:txBody>
-      </p:sp>
-      <p:sp>
-        <p:nvSpPr>
-          <p:cNvPr id="3" name="Content Placeholder 2"/>
+            <a:endParaRPr lang="en-IN" dirty="0"/>
+          </a:p>
+        </p:txBody>
+      </p:sp>
+      <p:sp>
+        <p:nvSpPr>
+          <p:cNvPr id="3" name="Content Placeholder 2">
+            <a:extLst>
+              <a:ext uri="{FF2B5EF4-FFF2-40B4-BE49-F238E27FC236}">
+                <a16:creationId xmlns:a16="http://schemas.microsoft.com/office/drawing/2014/main" id="{4C5DE325-94A1-0DB6-AA99-4F3FB025B687}"/>
+              </a:ext>
+            </a:extLst>
+          </p:cNvPr>
           <p:cNvSpPr>
             <a:spLocks noGrp="1"/>
           </p:cNvSpPr>
@@ -18625,59 +19499,76 @@
         <p:spPr/>
         <p:txBody>
           <a:bodyPr>
-            <a:normAutofit fontScale="77500" lnSpcReduction="20000"/>
+            <a:normAutofit/>
           </a:bodyPr>
           <a:lstStyle/>
           <a:p>
-            <a:pPr>
-              <a:buNone/>
-            </a:pPr>
-            <a:r>
-              <a:rPr lang="en-US" b="1" dirty="0"/>
-              <a:t>Problem</a:t>
-            </a:r>
-          </a:p>
-          <a:p>
-            <a:r>
-              <a:rPr lang="en-US" dirty="0"/>
-              <a:t>When </a:t>
-            </a:r>
-            <a:r>
-              <a:rPr lang="en-US" dirty="0" err="1"/>
-              <a:t>microservice</a:t>
-            </a:r>
-            <a:r>
-              <a:rPr lang="en-US" dirty="0"/>
-              <a:t> architecture has been implemented, there is a chance that a service might be up but not able to handle transactions. In that case, how do you ensure a request doesn't go to those failed instances? With a load balancing pattern implementation.</a:t>
-            </a:r>
-          </a:p>
-          <a:p>
-            <a:pPr>
-              <a:buNone/>
-            </a:pPr>
-            <a:r>
-              <a:rPr lang="en-US" b="1" dirty="0"/>
-              <a:t>Solution</a:t>
-            </a:r>
-          </a:p>
-          <a:p>
-            <a:r>
-              <a:rPr lang="en-US" dirty="0"/>
-              <a:t>Each service needs to have an endpoint which can be used to check the health of the application, such as /health. This API should o check the status of the host, the connection to other services/infrastructure, and any specific logic.</a:t>
-            </a:r>
-          </a:p>
-          <a:p>
-            <a:r>
-              <a:rPr lang="en-US" dirty="0"/>
-              <a:t>Spring Boot Actuator does implement a /health endpoint and the implementation can be customized, as well.</a:t>
-            </a:r>
-          </a:p>
-          <a:p>
-            <a:endParaRPr lang="en-US" dirty="0"/>
+            <a:r>
+              <a:rPr lang="en-IN" sz="1800" dirty="0"/>
+              <a:t>DEMO</a:t>
+            </a:r>
+          </a:p>
+          <a:p>
+            <a:pPr lvl="1">
+              <a:buFont typeface="Arial" panose="020B0604020202020204" pitchFamily="34" charset="0"/>
+              <a:buChar char="•"/>
+            </a:pPr>
+            <a:r>
+              <a:rPr lang="en-IN" sz="1800" dirty="0"/>
+              <a:t>I send a request</a:t>
+            </a:r>
+          </a:p>
+          <a:p>
+            <a:pPr lvl="2"/>
+            <a:r>
+              <a:rPr lang="en-IN" sz="1800" dirty="0">
+                <a:hlinkClick r:id="rId2"/>
+              </a:rPr>
+              <a:t>http://localhost:8080/flight/Houston/LasVegas</a:t>
+            </a:r>
+            <a:endParaRPr lang="en-IN" sz="1800" dirty="0"/>
+          </a:p>
+          <a:p>
+            <a:pPr lvl="2"/>
+            <a:r>
+              <a:rPr lang="en-US" sz="1800" b="0" i="0" dirty="0">
+                <a:solidFill>
+                  <a:srgbClr val="212121"/>
+                </a:solidFill>
+                <a:effectLst/>
+              </a:rPr>
+              <a:t>I receive </a:t>
+            </a:r>
+            <a:r>
+              <a:rPr lang="en-US" sz="1800" b="0" i="0">
+                <a:solidFill>
+                  <a:srgbClr val="212121"/>
+                </a:solidFill>
+                <a:effectLst/>
+              </a:rPr>
+              <a:t>a response</a:t>
+            </a:r>
+            <a:endParaRPr lang="en-US" sz="1800" b="0" i="0" dirty="0">
+              <a:solidFill>
+                <a:srgbClr val="212121"/>
+              </a:solidFill>
+              <a:effectLst/>
+            </a:endParaRPr>
+          </a:p>
+          <a:p>
+            <a:pPr marL="914400" lvl="2" indent="0">
+              <a:buNone/>
+            </a:pPr>
+            <a:endParaRPr lang="en-IN" sz="1800" dirty="0"/>
           </a:p>
         </p:txBody>
       </p:sp>
     </p:spTree>
+    <p:extLst>
+      <p:ext uri="{BB962C8B-B14F-4D97-AF65-F5344CB8AC3E}">
+        <p14:creationId xmlns:p14="http://schemas.microsoft.com/office/powerpoint/2010/main" val="3514372764"/>
+      </p:ext>
+    </p:extLst>
   </p:cSld>
   <p:clrMapOvr>
     <a:masterClrMapping/>
@@ -18721,7 +19612,7 @@
           <a:p>
             <a:r>
               <a:rPr lang="en-US" b="1" dirty="0"/>
-              <a:t>Cross-Cutting Concern Patterns</a:t>
+              <a:t>Observability Patterns</a:t>
             </a:r>
             <a:br>
               <a:rPr lang="en-US" b="1" dirty="0"/>
@@ -18747,25 +19638,25 @@
           <a:p>
             <a:r>
               <a:rPr lang="en-US" b="1" dirty="0"/>
-              <a:t>External Configuration</a:t>
+              <a:t>Log Aggregation</a:t>
             </a:r>
           </a:p>
           <a:p>
             <a:r>
               <a:rPr lang="en-US" b="1" dirty="0"/>
-              <a:t>Service Discovery Pattern</a:t>
+              <a:t>Performance Metrics</a:t>
             </a:r>
           </a:p>
           <a:p>
             <a:r>
               <a:rPr lang="en-US" b="1" dirty="0"/>
-              <a:t>Circuit Breaker Pattern</a:t>
+              <a:t>Distributed Tracing</a:t>
             </a:r>
           </a:p>
           <a:p>
             <a:r>
               <a:rPr lang="en-US" b="1" dirty="0"/>
-              <a:t>Blue-Green Deployment Pattern</a:t>
+              <a:t>Health Check</a:t>
             </a:r>
           </a:p>
           <a:p>
@@ -18817,7 +19708,7 @@
           <a:p>
             <a:r>
               <a:rPr lang="en-US" b="1" dirty="0"/>
-              <a:t>External Configuration</a:t>
+              <a:t>Log Aggregation</a:t>
             </a:r>
             <a:br>
               <a:rPr lang="en-US" b="1" dirty="0"/>
@@ -18854,7 +19745,7 @@
           <a:p>
             <a:r>
               <a:rPr lang="en-US" dirty="0"/>
-              <a:t>A service typically calls other services and databases as well. For each environment like dev, QA, UAT, prod, the endpoint URL or some configuration properties might be different. A change in any of those properties might require a re-build and re-deploy of the service. How do we avoid code modification for configuration changes?</a:t>
+              <a:t>Consider a use case where an application consists of multiple service instances that are running on multiple machines. Requests often span multiple service instances. Each service instance generates a log file in a standardized format. How can we understand the application behavior through logs for a particular request?</a:t>
             </a:r>
           </a:p>
           <a:p>
@@ -18869,29 +19760,23 @@
           <a:p>
             <a:r>
               <a:rPr lang="en-US" dirty="0"/>
-              <a:t>Externalize all the configuration, including endpoint URLs and credentials. The application should load them either at startup or on the fly.</a:t>
-            </a:r>
-          </a:p>
-          <a:p>
+              <a:t>We need a centralized logging service that aggregates logs from each service instance. Users can search and analyze the logs. They can configure alerts that are triggered when certain messages appear in the logs. For example, PCF does have </a:t>
+            </a:r>
+            <a:r>
+              <a:rPr lang="en-US" dirty="0" err="1"/>
+              <a:t>Loggeregator</a:t>
+            </a:r>
             <a:r>
               <a:rPr lang="en-US" dirty="0"/>
-              <a:t>Spring Cloud </a:t>
+              <a:t>, which collects logs from each component (router, controller, </a:t>
             </a:r>
             <a:r>
               <a:rPr lang="en-US" dirty="0" err="1"/>
-              <a:t>config</a:t>
+              <a:t>diego</a:t>
             </a:r>
             <a:r>
               <a:rPr lang="en-US" dirty="0"/>
-              <a:t> server provides the option to externalize the properties to </a:t>
-            </a:r>
-            <a:r>
-              <a:rPr lang="en-US" dirty="0" err="1"/>
-              <a:t>GitHub</a:t>
-            </a:r>
-            <a:r>
-              <a:rPr lang="en-US" dirty="0"/>
-              <a:t> and load them as environment properties. These can be accessed by the application on startup or can be refreshed without a server restart.</a:t>
+              <a:t>, etc...) of the PCF platform along with applications. AWS Cloud Watch also does the same.</a:t>
             </a:r>
           </a:p>
           <a:p>
@@ -18943,7 +19828,7 @@
           <a:p>
             <a:r>
               <a:rPr lang="en-US" b="1" dirty="0"/>
-              <a:t>Service Discovery Pattern</a:t>
+              <a:t>Performance Metrics</a:t>
             </a:r>
             <a:br>
               <a:rPr lang="en-US" b="1" dirty="0"/>
@@ -18962,15 +19847,10 @@
             <p:ph idx="1"/>
           </p:nvPr>
         </p:nvSpPr>
-        <p:spPr>
-          <a:xfrm>
-            <a:off x="457200" y="1600200"/>
-            <a:ext cx="8507288" cy="4493095"/>
-          </a:xfrm>
-        </p:spPr>
+        <p:spPr/>
         <p:txBody>
           <a:bodyPr>
-            <a:normAutofit fontScale="47500" lnSpcReduction="20000"/>
+            <a:normAutofit fontScale="70000" lnSpcReduction="20000"/>
           </a:bodyPr>
           <a:lstStyle/>
           <a:p>
@@ -18985,40 +19865,24 @@
           <a:p>
             <a:r>
               <a:rPr lang="en-US" dirty="0"/>
-              <a:t>When </a:t>
+              <a:t>When the service portfolio increases due to </a:t>
             </a:r>
             <a:r>
               <a:rPr lang="en-US" dirty="0" err="1"/>
-              <a:t>microservices</a:t>
+              <a:t>microservice</a:t>
             </a:r>
             <a:r>
               <a:rPr lang="en-US" dirty="0"/>
-              <a:t> come into the picture, we need to address a few issues in terms of calling services:</a:t>
-            </a:r>
-          </a:p>
-          <a:p>
+              <a:t> architecture, it becomes critical to keep a watch on the transactions so that patterns can be monitored and alerts sent when an issue happens. How should we collect metrics to monitor application </a:t>
+            </a:r>
+            <a:r>
+              <a:rPr lang="en-US" dirty="0" err="1"/>
+              <a:t>perfomance</a:t>
+            </a:r>
             <a:r>
               <a:rPr lang="en-US" dirty="0"/>
-              <a:t>With container technology, IP addresses are dynamically allocated to the service instances. Every time the address changes, a consumer service can break and need manual changes.</a:t>
-            </a:r>
-          </a:p>
-          <a:p>
-            <a:r>
-              <a:rPr lang="en-US" dirty="0"/>
-              <a:t>Each service URL has to be remembered by the consumer and become tightly coupled.</a:t>
-            </a:r>
-          </a:p>
-          <a:p>
-            <a:r>
-              <a:rPr lang="en-US" dirty="0"/>
-              <a:t>So how does the consumer or router know all the available service instances and locations?</a:t>
-            </a:r>
-          </a:p>
-          <a:p>
-            <a:endParaRPr lang="en-US" dirty="0"/>
-          </a:p>
-          <a:p>
-            <a:endParaRPr lang="en-US" dirty="0"/>
+              <a:t>?</a:t>
+            </a:r>
           </a:p>
           <a:p>
             <a:pPr>
@@ -19032,7 +19896,32 @@
           <a:p>
             <a:r>
               <a:rPr lang="en-US" dirty="0"/>
-              <a:t>A service registry needs to be created which will keep the metadata of each producer service. A service instance should register to the registry when starting and should de-register when shutting down. The consumer or router should query the registry and find out the location of the service. The registry also needs to do a health check of the producer service to ensure that only working instances of the services are available to be consumed through it. There are two types of service discovery: client-side and server-side. An example of client-side discovery is Netflix Eureka and an example of server-side discovery is AWS ALB.</a:t>
+              <a:t>A metrics service is required to gather statistics about individual operations. It should aggregate the metrics of an application service, which provides reporting and alerting. There are two models for aggregating metrics:</a:t>
+            </a:r>
+          </a:p>
+          <a:p>
+            <a:r>
+              <a:rPr lang="en-US" dirty="0"/>
+              <a:t>Push — the service pushes metrics to the metrics service e.g. </a:t>
+            </a:r>
+            <a:r>
+              <a:rPr lang="en-US" dirty="0" err="1"/>
+              <a:t>NewRelic</a:t>
+            </a:r>
+            <a:r>
+              <a:rPr lang="en-US" dirty="0"/>
+              <a:t>, </a:t>
+            </a:r>
+            <a:r>
+              <a:rPr lang="en-US" dirty="0" err="1"/>
+              <a:t>AppDynamics</a:t>
+            </a:r>
+            <a:endParaRPr lang="en-US" dirty="0"/>
+          </a:p>
+          <a:p>
+            <a:r>
+              <a:rPr lang="en-US" dirty="0"/>
+              <a:t>Pull — the metrics services pulls metrics from the service e.g. Prometheus</a:t>
             </a:r>
           </a:p>
           <a:p>
@@ -19084,7 +19973,7 @@
           <a:p>
             <a:r>
               <a:rPr lang="en-US" b="1" dirty="0"/>
-              <a:t>Circuit Breaker Pattern</a:t>
+              <a:t>Distributed Tracing</a:t>
             </a:r>
             <a:br>
               <a:rPr lang="en-US" b="1" dirty="0"/>
@@ -19106,7 +19995,7 @@
         <p:spPr/>
         <p:txBody>
           <a:bodyPr>
-            <a:normAutofit fontScale="47500" lnSpcReduction="20000"/>
+            <a:normAutofit fontScale="62500" lnSpcReduction="20000"/>
           </a:bodyPr>
           <a:lstStyle/>
           <a:p>
@@ -19121,14 +20010,16 @@
           <a:p>
             <a:r>
               <a:rPr lang="en-US" dirty="0"/>
-              <a:t>A service generally calls other services to retrieve data, and there is the chance that the downstream service may be down. There are two problems with this: first, the request will keep going to the down service, exhausting network resources and slowing performance. Second, the user experience will be bad and unpredictable. How do we avoid cascading service failures and handle failures gracefully?</a:t>
-            </a:r>
-          </a:p>
-          <a:p>
-            <a:pPr>
-              <a:buNone/>
-            </a:pPr>
-            <a:endParaRPr lang="en-US" b="1" dirty="0"/>
+              <a:t>In </a:t>
+            </a:r>
+            <a:r>
+              <a:rPr lang="en-US" dirty="0" err="1"/>
+              <a:t>microservice</a:t>
+            </a:r>
+            <a:r>
+              <a:rPr lang="en-US" dirty="0"/>
+              <a:t> architecture, requests often span multiple services. Each service handles a request by performing one or more operations across multiple services. Then, how do we trace a request end-to-end to troubleshoot the problem?</a:t>
+            </a:r>
           </a:p>
           <a:p>
             <a:pPr>
@@ -19142,25 +20033,54 @@
           <a:p>
             <a:r>
               <a:rPr lang="en-US" dirty="0"/>
-              <a:t>The consumer should invoke a remote service via a proxy that behaves in a similar fashion to an electrical circuit breaker. When the number of consecutive failures crosses a threshold, the circuit breaker trips, and for the duration of a timeout period, all attempts to invoke the remote service will fail immediately. After the timeout expires the circuit breaker allows a limited number of test requests to pass through. If those requests succeed, the circuit breaker resumes normal operation. Otherwise, if there is a failure, the timeout period begins again.</a:t>
+              <a:t>We need a service which</a:t>
             </a:r>
           </a:p>
           <a:p>
             <a:r>
               <a:rPr lang="en-US" dirty="0"/>
-              <a:t>Netflix </a:t>
+              <a:t>Assigns each external request a unique external request id.</a:t>
+            </a:r>
+          </a:p>
+          <a:p>
+            <a:r>
+              <a:rPr lang="en-US" dirty="0"/>
+              <a:t>Passes the external request id to all services.</a:t>
+            </a:r>
+          </a:p>
+          <a:p>
+            <a:r>
+              <a:rPr lang="en-US" dirty="0"/>
+              <a:t>Includes the external request id in all log messages.</a:t>
+            </a:r>
+          </a:p>
+          <a:p>
+            <a:r>
+              <a:rPr lang="en-US" dirty="0"/>
+              <a:t>Records information (e.g. start time, end time) about the requests and operations performed when handling an external request in a centralized service.</a:t>
+            </a:r>
+          </a:p>
+          <a:p>
+            <a:r>
+              <a:rPr lang="en-US" dirty="0"/>
+              <a:t>Spring Cloud </a:t>
             </a:r>
             <a:r>
               <a:rPr lang="en-US" dirty="0" err="1"/>
-              <a:t>Hystrix</a:t>
+              <a:t>Slueth</a:t>
             </a:r>
             <a:r>
               <a:rPr lang="en-US" dirty="0"/>
-              <a:t> is a good implementation of the circuit breaker pattern. It also helps you to define a fallback mechanism which can be used when the circuit breaker trips. That provides a better user experience.</a:t>
-            </a:r>
-          </a:p>
-          <a:p>
-            <a:endParaRPr lang="en-US" dirty="0"/>
+              <a:t>, along with </a:t>
+            </a:r>
+            <a:r>
+              <a:rPr lang="en-US" dirty="0" err="1"/>
+              <a:t>Zipkin</a:t>
+            </a:r>
+            <a:r>
+              <a:rPr lang="en-US" dirty="0"/>
+              <a:t> server, is a common implementation.</a:t>
+            </a:r>
           </a:p>
         </p:txBody>
       </p:sp>
@@ -19201,128 +20121,176 @@
         </p:nvSpPr>
         <p:spPr/>
         <p:txBody>
+          <a:bodyPr>
+            <a:normAutofit fontScale="90000"/>
+          </a:bodyPr>
+          <a:lstStyle/>
+          <a:p>
+            <a:r>
+              <a:rPr lang="en-US" b="1" dirty="0"/>
+              <a:t>Health Check</a:t>
+            </a:r>
+            <a:br>
+              <a:rPr lang="en-US" b="1" dirty="0"/>
+            </a:br>
+            <a:endParaRPr lang="en-US" dirty="0"/>
+          </a:p>
+        </p:txBody>
+      </p:sp>
+      <p:sp>
+        <p:nvSpPr>
+          <p:cNvPr id="3" name="Content Placeholder 2"/>
+          <p:cNvSpPr>
+            <a:spLocks noGrp="1"/>
+          </p:cNvSpPr>
+          <p:nvPr>
+            <p:ph idx="1"/>
+          </p:nvPr>
+        </p:nvSpPr>
+        <p:spPr/>
+        <p:txBody>
+          <a:bodyPr>
+            <a:normAutofit fontScale="77500" lnSpcReduction="20000"/>
+          </a:bodyPr>
+          <a:lstStyle/>
+          <a:p>
+            <a:pPr>
+              <a:buNone/>
+            </a:pPr>
+            <a:r>
+              <a:rPr lang="en-US" b="1" dirty="0"/>
+              <a:t>Problem</a:t>
+            </a:r>
+          </a:p>
+          <a:p>
+            <a:r>
+              <a:rPr lang="en-US" dirty="0"/>
+              <a:t>When </a:t>
+            </a:r>
+            <a:r>
+              <a:rPr lang="en-US" dirty="0" err="1"/>
+              <a:t>microservice</a:t>
+            </a:r>
+            <a:r>
+              <a:rPr lang="en-US" dirty="0"/>
+              <a:t> architecture has been implemented, there is a chance that a service might be up but not able to handle transactions. In that case, how do you ensure a request doesn't go to those failed instances? With a load balancing pattern implementation.</a:t>
+            </a:r>
+          </a:p>
+          <a:p>
+            <a:pPr>
+              <a:buNone/>
+            </a:pPr>
+            <a:r>
+              <a:rPr lang="en-US" b="1" dirty="0"/>
+              <a:t>Solution</a:t>
+            </a:r>
+          </a:p>
+          <a:p>
+            <a:r>
+              <a:rPr lang="en-US" dirty="0"/>
+              <a:t>Each service needs to have an endpoint which can be used to check the health of the application, such as /health. This API should o check the status of the host, the connection to other services/infrastructure, and any specific logic.</a:t>
+            </a:r>
+          </a:p>
+          <a:p>
+            <a:r>
+              <a:rPr lang="en-US" dirty="0"/>
+              <a:t>Spring Boot Actuator does implement a /health endpoint and the implementation can be customized, as well.</a:t>
+            </a:r>
+          </a:p>
+          <a:p>
+            <a:endParaRPr lang="en-US" dirty="0"/>
+          </a:p>
+        </p:txBody>
+      </p:sp>
+    </p:spTree>
+  </p:cSld>
+  <p:clrMapOvr>
+    <a:masterClrMapping/>
+  </p:clrMapOvr>
+</p:sld>
+</file>
+
+<file path=ppt/slides/slide59.xml><?xml version="1.0" encoding="utf-8"?>
+<p:sld xmlns:a="http://schemas.openxmlformats.org/drawingml/2006/main" xmlns:r="http://schemas.openxmlformats.org/officeDocument/2006/relationships" xmlns:p="http://schemas.openxmlformats.org/presentationml/2006/main">
+  <p:cSld>
+    <p:spTree>
+      <p:nvGrpSpPr>
+        <p:cNvPr id="1" name=""/>
+        <p:cNvGrpSpPr/>
+        <p:nvPr/>
+      </p:nvGrpSpPr>
+      <p:grpSpPr>
+        <a:xfrm>
+          <a:off x="0" y="0"/>
+          <a:ext cx="0" cy="0"/>
+          <a:chOff x="0" y="0"/>
+          <a:chExt cx="0" cy="0"/>
+        </a:xfrm>
+      </p:grpSpPr>
+      <p:sp>
+        <p:nvSpPr>
+          <p:cNvPr id="2" name="Title 1"/>
+          <p:cNvSpPr>
+            <a:spLocks noGrp="1"/>
+          </p:cNvSpPr>
+          <p:nvPr>
+            <p:ph type="title"/>
+          </p:nvPr>
+        </p:nvSpPr>
+        <p:spPr/>
+        <p:txBody>
+          <a:bodyPr>
+            <a:normAutofit fontScale="90000"/>
+          </a:bodyPr>
+          <a:lstStyle/>
+          <a:p>
+            <a:r>
+              <a:rPr lang="en-US" b="1" dirty="0"/>
+              <a:t>Cross-Cutting Concern Patterns</a:t>
+            </a:r>
+            <a:br>
+              <a:rPr lang="en-US" b="1" dirty="0"/>
+            </a:br>
+            <a:endParaRPr lang="en-US" dirty="0"/>
+          </a:p>
+        </p:txBody>
+      </p:sp>
+      <p:sp>
+        <p:nvSpPr>
+          <p:cNvPr id="3" name="Content Placeholder 2"/>
+          <p:cNvSpPr>
+            <a:spLocks noGrp="1"/>
+          </p:cNvSpPr>
+          <p:nvPr>
+            <p:ph idx="1"/>
+          </p:nvPr>
+        </p:nvSpPr>
+        <p:spPr/>
+        <p:txBody>
           <a:bodyPr/>
           <a:lstStyle/>
           <a:p>
             <a:r>
               <a:rPr lang="en-US" b="1" dirty="0"/>
+              <a:t>External Configuration</a:t>
+            </a:r>
+          </a:p>
+          <a:p>
+            <a:r>
+              <a:rPr lang="en-US" b="1" dirty="0"/>
+              <a:t>Service Discovery Pattern</a:t>
+            </a:r>
+          </a:p>
+          <a:p>
+            <a:r>
+              <a:rPr lang="en-US" b="1" dirty="0"/>
+              <a:t>Circuit Breaker Pattern</a:t>
+            </a:r>
+          </a:p>
+          <a:p>
+            <a:r>
+              <a:rPr lang="en-US" b="1" dirty="0"/>
               <a:t>Blue-Green Deployment Pattern</a:t>
-            </a:r>
-          </a:p>
-        </p:txBody>
-      </p:sp>
-      <p:sp>
-        <p:nvSpPr>
-          <p:cNvPr id="3" name="Content Placeholder 2"/>
-          <p:cNvSpPr>
-            <a:spLocks noGrp="1"/>
-          </p:cNvSpPr>
-          <p:nvPr>
-            <p:ph idx="1"/>
-          </p:nvPr>
-        </p:nvSpPr>
-        <p:spPr/>
-        <p:txBody>
-          <a:bodyPr>
-            <a:normAutofit fontScale="55000" lnSpcReduction="20000"/>
-          </a:bodyPr>
-          <a:lstStyle/>
-          <a:p>
-            <a:pPr>
-              <a:buNone/>
-            </a:pPr>
-            <a:r>
-              <a:rPr lang="en-US" b="1" dirty="0"/>
-              <a:t>Problem</a:t>
-            </a:r>
-          </a:p>
-          <a:p>
-            <a:r>
-              <a:rPr lang="en-US" dirty="0"/>
-              <a:t>With </a:t>
-            </a:r>
-            <a:r>
-              <a:rPr lang="en-US" dirty="0" err="1"/>
-              <a:t>microservice</a:t>
-            </a:r>
-            <a:r>
-              <a:rPr lang="en-US" dirty="0"/>
-              <a:t> architecture, one application can have many </a:t>
-            </a:r>
-            <a:r>
-              <a:rPr lang="en-US" dirty="0" err="1"/>
-              <a:t>microservices</a:t>
-            </a:r>
-            <a:r>
-              <a:rPr lang="en-US" dirty="0"/>
-              <a:t>. If we stop all the services then deploy an enhanced version, the downtime will be huge and can impact the business. Also, the rollback will be a nightmare. How do we avoid or reduce downtime of the services during deployment?</a:t>
-            </a:r>
-          </a:p>
-          <a:p>
-            <a:pPr>
-              <a:buNone/>
-            </a:pPr>
-            <a:r>
-              <a:rPr lang="en-US" b="1" dirty="0"/>
-              <a:t>Solution</a:t>
-            </a:r>
-          </a:p>
-          <a:p>
-            <a:r>
-              <a:rPr lang="en-US" dirty="0"/>
-              <a:t>The blue-green deployment strategy can be implemented to reduce or remove downtime. It achieves this by running two identical production environments, Blue and Green. Let's assume Green is the existing live instance and Blue is the new version of the application. At any time, only one of the environments is live, with the live environment serving all production traffic. All cloud platforms provide options for implementing a blue-green deployment. </a:t>
-            </a:r>
-          </a:p>
-          <a:p>
-            <a:pPr>
-              <a:buNone/>
-            </a:pPr>
-            <a:endParaRPr lang="en-US" dirty="0"/>
-          </a:p>
-          <a:p>
-            <a:r>
-              <a:rPr lang="en-US" dirty="0"/>
-              <a:t>There are many other patterns used with </a:t>
-            </a:r>
-            <a:r>
-              <a:rPr lang="en-US" dirty="0" err="1"/>
-              <a:t>microservice</a:t>
-            </a:r>
-            <a:r>
-              <a:rPr lang="en-US" dirty="0"/>
-              <a:t> architecture, like Sidecar, Chained </a:t>
-            </a:r>
-            <a:r>
-              <a:rPr lang="en-US" dirty="0" err="1"/>
-              <a:t>Microservice</a:t>
-            </a:r>
-            <a:r>
-              <a:rPr lang="en-US" dirty="0"/>
-              <a:t>, Branch </a:t>
-            </a:r>
-            <a:r>
-              <a:rPr lang="en-US" dirty="0" err="1"/>
-              <a:t>Microservice</a:t>
-            </a:r>
-            <a:r>
-              <a:rPr lang="en-US" dirty="0"/>
-              <a:t>, Event Sourcing Pattern, Continuous Delivery Patterns, and more. The list keeps growing as we get more experience with </a:t>
-            </a:r>
-            <a:r>
-              <a:rPr lang="en-US" dirty="0" err="1"/>
-              <a:t>microservices</a:t>
-            </a:r>
-            <a:r>
-              <a:rPr lang="en-US" dirty="0"/>
-              <a:t>. I am stopping now to hear back from you on what </a:t>
-            </a:r>
-            <a:r>
-              <a:rPr lang="en-US" dirty="0" err="1"/>
-              <a:t>microservice</a:t>
-            </a:r>
-            <a:r>
-              <a:rPr lang="en-US" dirty="0"/>
-              <a:t> patterns you are using.</a:t>
             </a:r>
           </a:p>
           <a:p>
@@ -19424,6 +20392,563 @@
             <a:r>
               <a:rPr lang="en-US" b="1" dirty="0"/>
               <a:t>Cross-Cutting Concern Patterns</a:t>
+            </a:r>
+          </a:p>
+          <a:p>
+            <a:endParaRPr lang="en-US" dirty="0"/>
+          </a:p>
+        </p:txBody>
+      </p:sp>
+    </p:spTree>
+  </p:cSld>
+  <p:clrMapOvr>
+    <a:masterClrMapping/>
+  </p:clrMapOvr>
+</p:sld>
+</file>
+
+<file path=ppt/slides/slide60.xml><?xml version="1.0" encoding="utf-8"?>
+<p:sld xmlns:a="http://schemas.openxmlformats.org/drawingml/2006/main" xmlns:r="http://schemas.openxmlformats.org/officeDocument/2006/relationships" xmlns:p="http://schemas.openxmlformats.org/presentationml/2006/main">
+  <p:cSld>
+    <p:spTree>
+      <p:nvGrpSpPr>
+        <p:cNvPr id="1" name=""/>
+        <p:cNvGrpSpPr/>
+        <p:nvPr/>
+      </p:nvGrpSpPr>
+      <p:grpSpPr>
+        <a:xfrm>
+          <a:off x="0" y="0"/>
+          <a:ext cx="0" cy="0"/>
+          <a:chOff x="0" y="0"/>
+          <a:chExt cx="0" cy="0"/>
+        </a:xfrm>
+      </p:grpSpPr>
+      <p:sp>
+        <p:nvSpPr>
+          <p:cNvPr id="2" name="Title 1"/>
+          <p:cNvSpPr>
+            <a:spLocks noGrp="1"/>
+          </p:cNvSpPr>
+          <p:nvPr>
+            <p:ph type="title"/>
+          </p:nvPr>
+        </p:nvSpPr>
+        <p:spPr/>
+        <p:txBody>
+          <a:bodyPr>
+            <a:normAutofit fontScale="90000"/>
+          </a:bodyPr>
+          <a:lstStyle/>
+          <a:p>
+            <a:r>
+              <a:rPr lang="en-US" b="1" dirty="0"/>
+              <a:t>External Configuration</a:t>
+            </a:r>
+            <a:br>
+              <a:rPr lang="en-US" b="1" dirty="0"/>
+            </a:br>
+            <a:endParaRPr lang="en-US" dirty="0"/>
+          </a:p>
+        </p:txBody>
+      </p:sp>
+      <p:sp>
+        <p:nvSpPr>
+          <p:cNvPr id="3" name="Content Placeholder 2"/>
+          <p:cNvSpPr>
+            <a:spLocks noGrp="1"/>
+          </p:cNvSpPr>
+          <p:nvPr>
+            <p:ph idx="1"/>
+          </p:nvPr>
+        </p:nvSpPr>
+        <p:spPr/>
+        <p:txBody>
+          <a:bodyPr>
+            <a:normAutofit fontScale="70000" lnSpcReduction="20000"/>
+          </a:bodyPr>
+          <a:lstStyle/>
+          <a:p>
+            <a:pPr>
+              <a:buNone/>
+            </a:pPr>
+            <a:r>
+              <a:rPr lang="en-US" b="1" dirty="0"/>
+              <a:t>Problem</a:t>
+            </a:r>
+          </a:p>
+          <a:p>
+            <a:r>
+              <a:rPr lang="en-US" dirty="0"/>
+              <a:t>A service typically calls other services and databases as well. For each environment like dev, QA, UAT, prod, the endpoint URL or some configuration properties might be different. A change in any of those properties might require a re-build and re-deploy of the service. How do we avoid code modification for configuration changes?</a:t>
+            </a:r>
+          </a:p>
+          <a:p>
+            <a:pPr>
+              <a:buNone/>
+            </a:pPr>
+            <a:r>
+              <a:rPr lang="en-US" b="1" dirty="0"/>
+              <a:t>Solution</a:t>
+            </a:r>
+          </a:p>
+          <a:p>
+            <a:r>
+              <a:rPr lang="en-US" dirty="0"/>
+              <a:t>Externalize all the configuration, including endpoint URLs and credentials. The application should load them either at startup or on the fly.</a:t>
+            </a:r>
+          </a:p>
+          <a:p>
+            <a:r>
+              <a:rPr lang="en-US" dirty="0"/>
+              <a:t>Spring Cloud </a:t>
+            </a:r>
+            <a:r>
+              <a:rPr lang="en-US" dirty="0" err="1"/>
+              <a:t>config</a:t>
+            </a:r>
+            <a:r>
+              <a:rPr lang="en-US" dirty="0"/>
+              <a:t> server provides the option to externalize the properties to </a:t>
+            </a:r>
+            <a:r>
+              <a:rPr lang="en-US" dirty="0" err="1"/>
+              <a:t>GitHub</a:t>
+            </a:r>
+            <a:r>
+              <a:rPr lang="en-US" dirty="0"/>
+              <a:t> and load them as environment properties. These can be accessed by the application on startup or can be refreshed without a server restart.</a:t>
+            </a:r>
+          </a:p>
+          <a:p>
+            <a:endParaRPr lang="en-US" dirty="0"/>
+          </a:p>
+        </p:txBody>
+      </p:sp>
+    </p:spTree>
+  </p:cSld>
+  <p:clrMapOvr>
+    <a:masterClrMapping/>
+  </p:clrMapOvr>
+</p:sld>
+</file>
+
+<file path=ppt/slides/slide61.xml><?xml version="1.0" encoding="utf-8"?>
+<p:sld xmlns:a="http://schemas.openxmlformats.org/drawingml/2006/main" xmlns:r="http://schemas.openxmlformats.org/officeDocument/2006/relationships" xmlns:p="http://schemas.openxmlformats.org/presentationml/2006/main">
+  <p:cSld>
+    <p:spTree>
+      <p:nvGrpSpPr>
+        <p:cNvPr id="1" name=""/>
+        <p:cNvGrpSpPr/>
+        <p:nvPr/>
+      </p:nvGrpSpPr>
+      <p:grpSpPr>
+        <a:xfrm>
+          <a:off x="0" y="0"/>
+          <a:ext cx="0" cy="0"/>
+          <a:chOff x="0" y="0"/>
+          <a:chExt cx="0" cy="0"/>
+        </a:xfrm>
+      </p:grpSpPr>
+      <p:sp>
+        <p:nvSpPr>
+          <p:cNvPr id="2" name="Title 1"/>
+          <p:cNvSpPr>
+            <a:spLocks noGrp="1"/>
+          </p:cNvSpPr>
+          <p:nvPr>
+            <p:ph type="title"/>
+          </p:nvPr>
+        </p:nvSpPr>
+        <p:spPr/>
+        <p:txBody>
+          <a:bodyPr>
+            <a:normAutofit fontScale="90000"/>
+          </a:bodyPr>
+          <a:lstStyle/>
+          <a:p>
+            <a:r>
+              <a:rPr lang="en-US" b="1" dirty="0"/>
+              <a:t>Service Discovery Pattern</a:t>
+            </a:r>
+            <a:br>
+              <a:rPr lang="en-US" b="1" dirty="0"/>
+            </a:br>
+            <a:endParaRPr lang="en-US" dirty="0"/>
+          </a:p>
+        </p:txBody>
+      </p:sp>
+      <p:sp>
+        <p:nvSpPr>
+          <p:cNvPr id="3" name="Content Placeholder 2"/>
+          <p:cNvSpPr>
+            <a:spLocks noGrp="1"/>
+          </p:cNvSpPr>
+          <p:nvPr>
+            <p:ph idx="1"/>
+          </p:nvPr>
+        </p:nvSpPr>
+        <p:spPr>
+          <a:xfrm>
+            <a:off x="457200" y="1600200"/>
+            <a:ext cx="8507288" cy="4493095"/>
+          </a:xfrm>
+        </p:spPr>
+        <p:txBody>
+          <a:bodyPr>
+            <a:normAutofit fontScale="47500" lnSpcReduction="20000"/>
+          </a:bodyPr>
+          <a:lstStyle/>
+          <a:p>
+            <a:pPr>
+              <a:buNone/>
+            </a:pPr>
+            <a:r>
+              <a:rPr lang="en-US" b="1" dirty="0"/>
+              <a:t>Problem</a:t>
+            </a:r>
+          </a:p>
+          <a:p>
+            <a:r>
+              <a:rPr lang="en-US" dirty="0"/>
+              <a:t>When </a:t>
+            </a:r>
+            <a:r>
+              <a:rPr lang="en-US" dirty="0" err="1"/>
+              <a:t>microservices</a:t>
+            </a:r>
+            <a:r>
+              <a:rPr lang="en-US" dirty="0"/>
+              <a:t> come into the picture, we need to address a few issues in terms of calling services:</a:t>
+            </a:r>
+          </a:p>
+          <a:p>
+            <a:r>
+              <a:rPr lang="en-US" dirty="0"/>
+              <a:t>With container technology, IP addresses are dynamically allocated to the service instances. Every time the address changes, a consumer service can break and need manual changes.</a:t>
+            </a:r>
+          </a:p>
+          <a:p>
+            <a:r>
+              <a:rPr lang="en-US" dirty="0"/>
+              <a:t>Each service URL has to be remembered by the consumer and become tightly coupled.</a:t>
+            </a:r>
+          </a:p>
+          <a:p>
+            <a:r>
+              <a:rPr lang="en-US" dirty="0"/>
+              <a:t>So how does the consumer or router know all the available service instances and locations?</a:t>
+            </a:r>
+          </a:p>
+          <a:p>
+            <a:endParaRPr lang="en-US" dirty="0"/>
+          </a:p>
+          <a:p>
+            <a:endParaRPr lang="en-US" dirty="0"/>
+          </a:p>
+          <a:p>
+            <a:pPr>
+              <a:buNone/>
+            </a:pPr>
+            <a:r>
+              <a:rPr lang="en-US" b="1" dirty="0"/>
+              <a:t>Solution</a:t>
+            </a:r>
+          </a:p>
+          <a:p>
+            <a:r>
+              <a:rPr lang="en-US" dirty="0"/>
+              <a:t>A service registry needs to be created which will keep the metadata of each producer service. A service instance should register to the registry when starting and should de-register when shutting down. The consumer or router should query the registry and find out the location of the service. The registry also needs to do a health check of the producer service to ensure that only working instances of the services are available to be consumed through it. There are two types of service discovery: client-side and server-side. An example of client-side discovery is Netflix Eureka and an example of server-side discovery is AWS ALB.</a:t>
+            </a:r>
+          </a:p>
+          <a:p>
+            <a:endParaRPr lang="en-US" dirty="0"/>
+          </a:p>
+        </p:txBody>
+      </p:sp>
+    </p:spTree>
+  </p:cSld>
+  <p:clrMapOvr>
+    <a:masterClrMapping/>
+  </p:clrMapOvr>
+</p:sld>
+</file>
+
+<file path=ppt/slides/slide62.xml><?xml version="1.0" encoding="utf-8"?>
+<p:sld xmlns:a="http://schemas.openxmlformats.org/drawingml/2006/main" xmlns:r="http://schemas.openxmlformats.org/officeDocument/2006/relationships" xmlns:p="http://schemas.openxmlformats.org/presentationml/2006/main">
+  <p:cSld>
+    <p:spTree>
+      <p:nvGrpSpPr>
+        <p:cNvPr id="1" name=""/>
+        <p:cNvGrpSpPr/>
+        <p:nvPr/>
+      </p:nvGrpSpPr>
+      <p:grpSpPr>
+        <a:xfrm>
+          <a:off x="0" y="0"/>
+          <a:ext cx="0" cy="0"/>
+          <a:chOff x="0" y="0"/>
+          <a:chExt cx="0" cy="0"/>
+        </a:xfrm>
+      </p:grpSpPr>
+      <p:sp>
+        <p:nvSpPr>
+          <p:cNvPr id="2" name="Title 1"/>
+          <p:cNvSpPr>
+            <a:spLocks noGrp="1"/>
+          </p:cNvSpPr>
+          <p:nvPr>
+            <p:ph type="title"/>
+          </p:nvPr>
+        </p:nvSpPr>
+        <p:spPr/>
+        <p:txBody>
+          <a:bodyPr>
+            <a:normAutofit fontScale="90000"/>
+          </a:bodyPr>
+          <a:lstStyle/>
+          <a:p>
+            <a:r>
+              <a:rPr lang="en-US" b="1" dirty="0"/>
+              <a:t>Circuit Breaker Pattern</a:t>
+            </a:r>
+            <a:br>
+              <a:rPr lang="en-US" b="1" dirty="0"/>
+            </a:br>
+            <a:endParaRPr lang="en-US" dirty="0"/>
+          </a:p>
+        </p:txBody>
+      </p:sp>
+      <p:sp>
+        <p:nvSpPr>
+          <p:cNvPr id="3" name="Content Placeholder 2"/>
+          <p:cNvSpPr>
+            <a:spLocks noGrp="1"/>
+          </p:cNvSpPr>
+          <p:nvPr>
+            <p:ph idx="1"/>
+          </p:nvPr>
+        </p:nvSpPr>
+        <p:spPr/>
+        <p:txBody>
+          <a:bodyPr>
+            <a:normAutofit fontScale="47500" lnSpcReduction="20000"/>
+          </a:bodyPr>
+          <a:lstStyle/>
+          <a:p>
+            <a:pPr>
+              <a:buNone/>
+            </a:pPr>
+            <a:r>
+              <a:rPr lang="en-US" b="1" dirty="0"/>
+              <a:t>Problem</a:t>
+            </a:r>
+          </a:p>
+          <a:p>
+            <a:r>
+              <a:rPr lang="en-US" dirty="0"/>
+              <a:t>A service generally calls other services to retrieve data, and there is the chance that the downstream service may be down. There are two problems with this: first, the request will keep going to the down service, exhausting network resources and slowing performance. Second, the user experience will be bad and unpredictable. How do we avoid cascading service failures and handle failures gracefully?</a:t>
+            </a:r>
+          </a:p>
+          <a:p>
+            <a:pPr>
+              <a:buNone/>
+            </a:pPr>
+            <a:endParaRPr lang="en-US" b="1" dirty="0"/>
+          </a:p>
+          <a:p>
+            <a:pPr>
+              <a:buNone/>
+            </a:pPr>
+            <a:r>
+              <a:rPr lang="en-US" b="1" dirty="0"/>
+              <a:t>Solution</a:t>
+            </a:r>
+          </a:p>
+          <a:p>
+            <a:r>
+              <a:rPr lang="en-US" dirty="0"/>
+              <a:t>The consumer should invoke a remote service via a proxy that behaves in a similar fashion to an electrical circuit breaker. When the number of consecutive failures crosses a threshold, the circuit breaker trips, and for the duration of a timeout period, all attempts to invoke the remote service will fail immediately. After the timeout expires the circuit breaker allows a limited number of test requests to pass through. If those requests succeed, the circuit breaker resumes normal operation. Otherwise, if there is a failure, the timeout period begins again.</a:t>
+            </a:r>
+          </a:p>
+          <a:p>
+            <a:r>
+              <a:rPr lang="en-US" dirty="0"/>
+              <a:t>Netflix </a:t>
+            </a:r>
+            <a:r>
+              <a:rPr lang="en-US" dirty="0" err="1"/>
+              <a:t>Hystrix</a:t>
+            </a:r>
+            <a:r>
+              <a:rPr lang="en-US" dirty="0"/>
+              <a:t> is a good implementation of the circuit breaker pattern. It also helps you to define a fallback mechanism which can be used when the circuit breaker trips. That provides a better user experience.</a:t>
+            </a:r>
+          </a:p>
+          <a:p>
+            <a:endParaRPr lang="en-US" dirty="0"/>
+          </a:p>
+        </p:txBody>
+      </p:sp>
+    </p:spTree>
+  </p:cSld>
+  <p:clrMapOvr>
+    <a:masterClrMapping/>
+  </p:clrMapOvr>
+</p:sld>
+</file>
+
+<file path=ppt/slides/slide63.xml><?xml version="1.0" encoding="utf-8"?>
+<p:sld xmlns:a="http://schemas.openxmlformats.org/drawingml/2006/main" xmlns:r="http://schemas.openxmlformats.org/officeDocument/2006/relationships" xmlns:p="http://schemas.openxmlformats.org/presentationml/2006/main">
+  <p:cSld>
+    <p:spTree>
+      <p:nvGrpSpPr>
+        <p:cNvPr id="1" name=""/>
+        <p:cNvGrpSpPr/>
+        <p:nvPr/>
+      </p:nvGrpSpPr>
+      <p:grpSpPr>
+        <a:xfrm>
+          <a:off x="0" y="0"/>
+          <a:ext cx="0" cy="0"/>
+          <a:chOff x="0" y="0"/>
+          <a:chExt cx="0" cy="0"/>
+        </a:xfrm>
+      </p:grpSpPr>
+      <p:sp>
+        <p:nvSpPr>
+          <p:cNvPr id="2" name="Title 1"/>
+          <p:cNvSpPr>
+            <a:spLocks noGrp="1"/>
+          </p:cNvSpPr>
+          <p:nvPr>
+            <p:ph type="title"/>
+          </p:nvPr>
+        </p:nvSpPr>
+        <p:spPr/>
+        <p:txBody>
+          <a:bodyPr/>
+          <a:lstStyle/>
+          <a:p>
+            <a:r>
+              <a:rPr lang="en-US" b="1" dirty="0"/>
+              <a:t>Blue-Green Deployment Pattern</a:t>
+            </a:r>
+          </a:p>
+        </p:txBody>
+      </p:sp>
+      <p:sp>
+        <p:nvSpPr>
+          <p:cNvPr id="3" name="Content Placeholder 2"/>
+          <p:cNvSpPr>
+            <a:spLocks noGrp="1"/>
+          </p:cNvSpPr>
+          <p:nvPr>
+            <p:ph idx="1"/>
+          </p:nvPr>
+        </p:nvSpPr>
+        <p:spPr/>
+        <p:txBody>
+          <a:bodyPr>
+            <a:normAutofit fontScale="55000" lnSpcReduction="20000"/>
+          </a:bodyPr>
+          <a:lstStyle/>
+          <a:p>
+            <a:pPr>
+              <a:buNone/>
+            </a:pPr>
+            <a:r>
+              <a:rPr lang="en-US" b="1" dirty="0"/>
+              <a:t>Problem</a:t>
+            </a:r>
+          </a:p>
+          <a:p>
+            <a:r>
+              <a:rPr lang="en-US" dirty="0"/>
+              <a:t>With </a:t>
+            </a:r>
+            <a:r>
+              <a:rPr lang="en-US" dirty="0" err="1"/>
+              <a:t>microservice</a:t>
+            </a:r>
+            <a:r>
+              <a:rPr lang="en-US" dirty="0"/>
+              <a:t> architecture, one application can have many </a:t>
+            </a:r>
+            <a:r>
+              <a:rPr lang="en-US" dirty="0" err="1"/>
+              <a:t>microservices</a:t>
+            </a:r>
+            <a:r>
+              <a:rPr lang="en-US" dirty="0"/>
+              <a:t>. If we stop all the services then deploy an enhanced version, the downtime will be huge and can impact the business. Also, the rollback will be a nightmare. How do we avoid or reduce downtime of the services during deployment?</a:t>
+            </a:r>
+          </a:p>
+          <a:p>
+            <a:pPr>
+              <a:buNone/>
+            </a:pPr>
+            <a:r>
+              <a:rPr lang="en-US" b="1" dirty="0"/>
+              <a:t>Solution</a:t>
+            </a:r>
+          </a:p>
+          <a:p>
+            <a:r>
+              <a:rPr lang="en-US" dirty="0"/>
+              <a:t>The blue-green deployment strategy can be implemented to reduce or remove downtime. It achieves this by running two identical production environments, Blue and Green. Let's assume Green is the existing live instance and Blue is the new version of the application. At any time, only one of the environments is live, with the live environment serving all production traffic. All cloud platforms provide options for implementing a blue-green deployment. </a:t>
+            </a:r>
+          </a:p>
+          <a:p>
+            <a:pPr>
+              <a:buNone/>
+            </a:pPr>
+            <a:endParaRPr lang="en-US" dirty="0"/>
+          </a:p>
+          <a:p>
+            <a:r>
+              <a:rPr lang="en-US" dirty="0"/>
+              <a:t>There are many other patterns used with </a:t>
+            </a:r>
+            <a:r>
+              <a:rPr lang="en-US" dirty="0" err="1"/>
+              <a:t>microservice</a:t>
+            </a:r>
+            <a:r>
+              <a:rPr lang="en-US" dirty="0"/>
+              <a:t> architecture, like Sidecar, Chained </a:t>
+            </a:r>
+            <a:r>
+              <a:rPr lang="en-US" dirty="0" err="1"/>
+              <a:t>Microservice</a:t>
+            </a:r>
+            <a:r>
+              <a:rPr lang="en-US" dirty="0"/>
+              <a:t>, Branch </a:t>
+            </a:r>
+            <a:r>
+              <a:rPr lang="en-US" dirty="0" err="1"/>
+              <a:t>Microservice</a:t>
+            </a:r>
+            <a:r>
+              <a:rPr lang="en-US" dirty="0"/>
+              <a:t>, Event Sourcing Pattern, Continuous Delivery Patterns, and more. The list keeps growing as we get more experience with </a:t>
+            </a:r>
+            <a:r>
+              <a:rPr lang="en-US" dirty="0" err="1"/>
+              <a:t>microservices</a:t>
+            </a:r>
+            <a:r>
+              <a:rPr lang="en-US" dirty="0"/>
+              <a:t>. I am stopping now to hear back from you on what </a:t>
+            </a:r>
+            <a:r>
+              <a:rPr lang="en-US" dirty="0" err="1"/>
+              <a:t>microservice</a:t>
+            </a:r>
+            <a:r>
+              <a:rPr lang="en-US" dirty="0"/>
+              <a:t> patterns you are using.</a:t>
             </a:r>
           </a:p>
           <a:p>

</xml_diff>

<commit_message>
Added Zipkin,sleuth,prometheus and grafana examples
</commit_message>
<xml_diff>
--- a/Micro services Design Pattern.pptx
+++ b/Micro services Design Pattern.pptx
@@ -5,7 +5,7 @@
     <p:sldMasterId id="2147483648" r:id="rId1"/>
   </p:sldMasterIdLst>
   <p:notesMasterIdLst>
-    <p:notesMasterId r:id="rId65"/>
+    <p:notesMasterId r:id="rId73"/>
   </p:notesMasterIdLst>
   <p:sldIdLst>
     <p:sldId id="256" r:id="rId2"/>
@@ -57,20 +57,28 @@
     <p:sldId id="291" r:id="rId48"/>
     <p:sldId id="292" r:id="rId49"/>
     <p:sldId id="314" r:id="rId50"/>
-    <p:sldId id="315" r:id="rId51"/>
-    <p:sldId id="316" r:id="rId52"/>
-    <p:sldId id="317" r:id="rId53"/>
-    <p:sldId id="318" r:id="rId54"/>
-    <p:sldId id="272" r:id="rId55"/>
-    <p:sldId id="273" r:id="rId56"/>
-    <p:sldId id="274" r:id="rId57"/>
-    <p:sldId id="275" r:id="rId58"/>
-    <p:sldId id="276" r:id="rId59"/>
-    <p:sldId id="277" r:id="rId60"/>
-    <p:sldId id="278" r:id="rId61"/>
-    <p:sldId id="279" r:id="rId62"/>
-    <p:sldId id="280" r:id="rId63"/>
-    <p:sldId id="281" r:id="rId64"/>
+    <p:sldId id="316" r:id="rId51"/>
+    <p:sldId id="317" r:id="rId52"/>
+    <p:sldId id="318" r:id="rId53"/>
+    <p:sldId id="272" r:id="rId54"/>
+    <p:sldId id="273" r:id="rId55"/>
+    <p:sldId id="274" r:id="rId56"/>
+    <p:sldId id="322" r:id="rId57"/>
+    <p:sldId id="323" r:id="rId58"/>
+    <p:sldId id="324" r:id="rId59"/>
+    <p:sldId id="325" r:id="rId60"/>
+    <p:sldId id="326" r:id="rId61"/>
+    <p:sldId id="327" r:id="rId62"/>
+    <p:sldId id="275" r:id="rId63"/>
+    <p:sldId id="319" r:id="rId64"/>
+    <p:sldId id="320" r:id="rId65"/>
+    <p:sldId id="321" r:id="rId66"/>
+    <p:sldId id="276" r:id="rId67"/>
+    <p:sldId id="277" r:id="rId68"/>
+    <p:sldId id="278" r:id="rId69"/>
+    <p:sldId id="279" r:id="rId70"/>
+    <p:sldId id="280" r:id="rId71"/>
+    <p:sldId id="281" r:id="rId72"/>
   </p:sldIdLst>
   <p:sldSz cx="9144000" cy="6858000" type="screen4x3"/>
   <p:notesSz cx="6858000" cy="9144000"/>
@@ -270,7 +278,7 @@
           <a:p>
             <a:fld id="{9361661B-EA32-4140-B0F1-A19F0F4DBBC8}" type="datetimeFigureOut">
               <a:rPr lang="en-IN" smtClean="0"/>
-              <a:t>30-11-2023</a:t>
+              <a:t>01-12-2023</a:t>
             </a:fld>
             <a:endParaRPr lang="en-IN"/>
           </a:p>
@@ -2495,6 +2503,547 @@
 </p:notes>
 </file>
 
+<file path=ppt/notesSlides/notesSlide23.xml><?xml version="1.0" encoding="utf-8"?>
+<p:notes xmlns:a="http://schemas.openxmlformats.org/drawingml/2006/main" xmlns:r="http://schemas.openxmlformats.org/officeDocument/2006/relationships" xmlns:p="http://schemas.openxmlformats.org/presentationml/2006/main">
+  <p:cSld>
+    <p:spTree>
+      <p:nvGrpSpPr>
+        <p:cNvPr id="1" name=""/>
+        <p:cNvGrpSpPr/>
+        <p:nvPr/>
+      </p:nvGrpSpPr>
+      <p:grpSpPr>
+        <a:xfrm>
+          <a:off x="0" y="0"/>
+          <a:ext cx="0" cy="0"/>
+          <a:chOff x="0" y="0"/>
+          <a:chExt cx="0" cy="0"/>
+        </a:xfrm>
+      </p:grpSpPr>
+      <p:sp>
+        <p:nvSpPr>
+          <p:cNvPr id="2" name="Slide Image Placeholder 1"/>
+          <p:cNvSpPr>
+            <a:spLocks noGrp="1" noRot="1" noChangeAspect="1"/>
+          </p:cNvSpPr>
+          <p:nvPr>
+            <p:ph type="sldImg"/>
+          </p:nvPr>
+        </p:nvSpPr>
+        <p:spPr/>
+      </p:sp>
+      <p:sp>
+        <p:nvSpPr>
+          <p:cNvPr id="3" name="Notes Placeholder 2"/>
+          <p:cNvSpPr>
+            <a:spLocks noGrp="1"/>
+          </p:cNvSpPr>
+          <p:nvPr>
+            <p:ph type="body" idx="1"/>
+          </p:nvPr>
+        </p:nvSpPr>
+        <p:spPr/>
+        <p:txBody>
+          <a:bodyPr/>
+          <a:lstStyle/>
+          <a:p>
+            <a:r>
+              <a:rPr lang="en-US" dirty="0"/>
+              <a:t>In our project, we're using Spring Boot 2 and my team was pretty excited that we were able to start using Micrometer, an instrumentation library powering the delivery of application metrics. Micrometer is the default metrics library in Spring Boot 2 and it doesn't just give you metrics from your Spring application, but can also deliver JVM metrics (garbage collection and memory pools, </a:t>
+            </a:r>
+            <a:r>
+              <a:rPr lang="en-US" dirty="0" err="1"/>
+              <a:t>etc</a:t>
+            </a:r>
+            <a:r>
+              <a:rPr lang="en-US" dirty="0"/>
+              <a:t>) and also metrics from the application container. Micrometer has several different libraries that can be included to ship metrics to different backends and has support for Prometheus, Netflix Atlas, CloudWatch, Datadog, Graphite, Ganglia, JMX, Influx/</a:t>
+            </a:r>
+            <a:r>
+              <a:rPr lang="en-US" dirty="0" err="1"/>
+              <a:t>Telegraf</a:t>
+            </a:r>
+            <a:r>
+              <a:rPr lang="en-US" dirty="0"/>
+              <a:t>, New Relic, </a:t>
+            </a:r>
+            <a:r>
+              <a:rPr lang="en-US" dirty="0" err="1"/>
+              <a:t>StatsD</a:t>
+            </a:r>
+            <a:r>
+              <a:rPr lang="en-US" dirty="0"/>
+              <a:t>, </a:t>
+            </a:r>
+            <a:r>
+              <a:rPr lang="en-US" dirty="0" err="1"/>
+              <a:t>SignalFx</a:t>
+            </a:r>
+            <a:r>
+              <a:rPr lang="en-US" dirty="0"/>
+              <a:t>, and Wavefront.</a:t>
+            </a:r>
+          </a:p>
+          <a:p>
+            <a:endParaRPr lang="en-US" dirty="0"/>
+          </a:p>
+          <a:p>
+            <a:r>
+              <a:rPr lang="en-US" dirty="0"/>
+              <a:t>Because we didn't have a lot of control over the way our applications were deployed we looked at the several different backends supported by a micrometer. Most of the above backends work by pushing data out to a remote (cloud service). Since the </a:t>
+            </a:r>
+            <a:r>
+              <a:rPr lang="en-US" dirty="0" err="1"/>
+              <a:t>organisation</a:t>
+            </a:r>
+            <a:r>
+              <a:rPr lang="en-US" dirty="0"/>
+              <a:t> we work for doesn't allow us to push this 'sensitive' data to a remote party we looked at self-hosted solutions. We started with looking into Prometheus (and Grafana) and we soon learned that it was really easy to get a monitoring system up and running within an hour. In the rest of this post, I'll show you how easy it is to start monitoring Spring Boot applications with Prometheus and Grafana.</a:t>
+            </a:r>
+          </a:p>
+          <a:p>
+            <a:endParaRPr lang="en-IN" dirty="0"/>
+          </a:p>
+        </p:txBody>
+      </p:sp>
+      <p:sp>
+        <p:nvSpPr>
+          <p:cNvPr id="4" name="Slide Number Placeholder 3"/>
+          <p:cNvSpPr>
+            <a:spLocks noGrp="1"/>
+          </p:cNvSpPr>
+          <p:nvPr>
+            <p:ph type="sldNum" sz="quarter" idx="5"/>
+          </p:nvPr>
+        </p:nvSpPr>
+        <p:spPr/>
+        <p:txBody>
+          <a:bodyPr/>
+          <a:lstStyle/>
+          <a:p>
+            <a:fld id="{9BD7E917-8394-433F-96B5-1F86F1B85784}" type="slidenum">
+              <a:rPr lang="en-IN" smtClean="0"/>
+              <a:t>57</a:t>
+            </a:fld>
+            <a:endParaRPr lang="en-IN"/>
+          </a:p>
+        </p:txBody>
+      </p:sp>
+    </p:spTree>
+    <p:extLst>
+      <p:ext uri="{BB962C8B-B14F-4D97-AF65-F5344CB8AC3E}">
+        <p14:creationId xmlns:p14="http://schemas.microsoft.com/office/powerpoint/2010/main" val="3358461916"/>
+      </p:ext>
+    </p:extLst>
+  </p:cSld>
+  <p:clrMapOvr>
+    <a:masterClrMapping/>
+  </p:clrMapOvr>
+</p:notes>
+</file>
+
+<file path=ppt/notesSlides/notesSlide24.xml><?xml version="1.0" encoding="utf-8"?>
+<p:notes xmlns:a="http://schemas.openxmlformats.org/drawingml/2006/main" xmlns:r="http://schemas.openxmlformats.org/officeDocument/2006/relationships" xmlns:p="http://schemas.openxmlformats.org/presentationml/2006/main">
+  <p:cSld>
+    <p:spTree>
+      <p:nvGrpSpPr>
+        <p:cNvPr id="1" name=""/>
+        <p:cNvGrpSpPr/>
+        <p:nvPr/>
+      </p:nvGrpSpPr>
+      <p:grpSpPr>
+        <a:xfrm>
+          <a:off x="0" y="0"/>
+          <a:ext cx="0" cy="0"/>
+          <a:chOff x="0" y="0"/>
+          <a:chExt cx="0" cy="0"/>
+        </a:xfrm>
+      </p:grpSpPr>
+      <p:sp>
+        <p:nvSpPr>
+          <p:cNvPr id="2" name="Slide Image Placeholder 1"/>
+          <p:cNvSpPr>
+            <a:spLocks noGrp="1" noRot="1" noChangeAspect="1"/>
+          </p:cNvSpPr>
+          <p:nvPr>
+            <p:ph type="sldImg"/>
+          </p:nvPr>
+        </p:nvSpPr>
+        <p:spPr/>
+      </p:sp>
+      <p:sp>
+        <p:nvSpPr>
+          <p:cNvPr id="3" name="Notes Placeholder 2"/>
+          <p:cNvSpPr>
+            <a:spLocks noGrp="1"/>
+          </p:cNvSpPr>
+          <p:nvPr>
+            <p:ph type="body" idx="1"/>
+          </p:nvPr>
+        </p:nvSpPr>
+        <p:spPr/>
+        <p:txBody>
+          <a:bodyPr/>
+          <a:lstStyle/>
+          <a:p>
+            <a:r>
+              <a:rPr lang="en-US" b="0" i="0" dirty="0">
+                <a:solidFill>
+                  <a:srgbClr val="222635"/>
+                </a:solidFill>
+                <a:effectLst/>
+                <a:latin typeface="Cambria" panose="02040503050406030204" pitchFamily="18" charset="0"/>
+              </a:rPr>
+              <a:t>The following example shows a configuration with a set of statics targets for test and staging environments. You can decide to monitor all environments within one Prometheus instance, but you could of course also use a separate Prometheus instance for monitoring just the production environment.</a:t>
+            </a:r>
+          </a:p>
+          <a:p>
+            <a:endParaRPr lang="en-IN" dirty="0"/>
+          </a:p>
+        </p:txBody>
+      </p:sp>
+      <p:sp>
+        <p:nvSpPr>
+          <p:cNvPr id="4" name="Slide Number Placeholder 3"/>
+          <p:cNvSpPr>
+            <a:spLocks noGrp="1"/>
+          </p:cNvSpPr>
+          <p:nvPr>
+            <p:ph type="sldNum" sz="quarter" idx="5"/>
+          </p:nvPr>
+        </p:nvSpPr>
+        <p:spPr/>
+        <p:txBody>
+          <a:bodyPr/>
+          <a:lstStyle/>
+          <a:p>
+            <a:fld id="{9BD7E917-8394-433F-96B5-1F86F1B85784}" type="slidenum">
+              <a:rPr lang="en-IN" smtClean="0"/>
+              <a:t>58</a:t>
+            </a:fld>
+            <a:endParaRPr lang="en-IN"/>
+          </a:p>
+        </p:txBody>
+      </p:sp>
+    </p:spTree>
+    <p:extLst>
+      <p:ext uri="{BB962C8B-B14F-4D97-AF65-F5344CB8AC3E}">
+        <p14:creationId xmlns:p14="http://schemas.microsoft.com/office/powerpoint/2010/main" val="99323103"/>
+      </p:ext>
+    </p:extLst>
+  </p:cSld>
+  <p:clrMapOvr>
+    <a:masterClrMapping/>
+  </p:clrMapOvr>
+</p:notes>
+</file>
+
+<file path=ppt/notesSlides/notesSlide25.xml><?xml version="1.0" encoding="utf-8"?>
+<p:notes xmlns:a="http://schemas.openxmlformats.org/drawingml/2006/main" xmlns:r="http://schemas.openxmlformats.org/officeDocument/2006/relationships" xmlns:p="http://schemas.openxmlformats.org/presentationml/2006/main">
+  <p:cSld>
+    <p:spTree>
+      <p:nvGrpSpPr>
+        <p:cNvPr id="1" name=""/>
+        <p:cNvGrpSpPr/>
+        <p:nvPr/>
+      </p:nvGrpSpPr>
+      <p:grpSpPr>
+        <a:xfrm>
+          <a:off x="0" y="0"/>
+          <a:ext cx="0" cy="0"/>
+          <a:chOff x="0" y="0"/>
+          <a:chExt cx="0" cy="0"/>
+        </a:xfrm>
+      </p:grpSpPr>
+      <p:sp>
+        <p:nvSpPr>
+          <p:cNvPr id="2" name="Slide Image Placeholder 1"/>
+          <p:cNvSpPr>
+            <a:spLocks noGrp="1" noRot="1" noChangeAspect="1"/>
+          </p:cNvSpPr>
+          <p:nvPr>
+            <p:ph type="sldImg"/>
+          </p:nvPr>
+        </p:nvSpPr>
+        <p:spPr/>
+      </p:sp>
+      <p:sp>
+        <p:nvSpPr>
+          <p:cNvPr id="3" name="Notes Placeholder 2"/>
+          <p:cNvSpPr>
+            <a:spLocks noGrp="1"/>
+          </p:cNvSpPr>
+          <p:nvPr>
+            <p:ph type="body" idx="1"/>
+          </p:nvPr>
+        </p:nvSpPr>
+        <p:spPr/>
+        <p:txBody>
+          <a:bodyPr/>
+          <a:lstStyle/>
+          <a:p>
+            <a:r>
+              <a:rPr lang="en-US" b="0" i="0" dirty="0">
+                <a:solidFill>
+                  <a:srgbClr val="222635"/>
+                </a:solidFill>
+                <a:effectLst/>
+                <a:latin typeface="Cambria" panose="02040503050406030204" pitchFamily="18" charset="0"/>
+              </a:rPr>
+              <a:t>The following example shows a configuration with a set of statics targets for test and staging environments. You can decide to monitor all environments within one Prometheus instance, but you could of course also use a separate Prometheus instance for monitoring just the production environment.</a:t>
+            </a:r>
+          </a:p>
+          <a:p>
+            <a:endParaRPr lang="en-IN" dirty="0"/>
+          </a:p>
+        </p:txBody>
+      </p:sp>
+      <p:sp>
+        <p:nvSpPr>
+          <p:cNvPr id="4" name="Slide Number Placeholder 3"/>
+          <p:cNvSpPr>
+            <a:spLocks noGrp="1"/>
+          </p:cNvSpPr>
+          <p:nvPr>
+            <p:ph type="sldNum" sz="quarter" idx="5"/>
+          </p:nvPr>
+        </p:nvSpPr>
+        <p:spPr/>
+        <p:txBody>
+          <a:bodyPr/>
+          <a:lstStyle/>
+          <a:p>
+            <a:fld id="{9BD7E917-8394-433F-96B5-1F86F1B85784}" type="slidenum">
+              <a:rPr lang="en-IN" smtClean="0"/>
+              <a:t>59</a:t>
+            </a:fld>
+            <a:endParaRPr lang="en-IN"/>
+          </a:p>
+        </p:txBody>
+      </p:sp>
+    </p:spTree>
+    <p:extLst>
+      <p:ext uri="{BB962C8B-B14F-4D97-AF65-F5344CB8AC3E}">
+        <p14:creationId xmlns:p14="http://schemas.microsoft.com/office/powerpoint/2010/main" val="317631043"/>
+      </p:ext>
+    </p:extLst>
+  </p:cSld>
+  <p:clrMapOvr>
+    <a:masterClrMapping/>
+  </p:clrMapOvr>
+</p:notes>
+</file>
+
+<file path=ppt/notesSlides/notesSlide26.xml><?xml version="1.0" encoding="utf-8"?>
+<p:notes xmlns:a="http://schemas.openxmlformats.org/drawingml/2006/main" xmlns:r="http://schemas.openxmlformats.org/officeDocument/2006/relationships" xmlns:p="http://schemas.openxmlformats.org/presentationml/2006/main">
+  <p:cSld>
+    <p:spTree>
+      <p:nvGrpSpPr>
+        <p:cNvPr id="1" name=""/>
+        <p:cNvGrpSpPr/>
+        <p:nvPr/>
+      </p:nvGrpSpPr>
+      <p:grpSpPr>
+        <a:xfrm>
+          <a:off x="0" y="0"/>
+          <a:ext cx="0" cy="0"/>
+          <a:chOff x="0" y="0"/>
+          <a:chExt cx="0" cy="0"/>
+        </a:xfrm>
+      </p:grpSpPr>
+      <p:sp>
+        <p:nvSpPr>
+          <p:cNvPr id="2" name="Slide Image Placeholder 1"/>
+          <p:cNvSpPr>
+            <a:spLocks noGrp="1" noRot="1" noChangeAspect="1"/>
+          </p:cNvSpPr>
+          <p:nvPr>
+            <p:ph type="sldImg"/>
+          </p:nvPr>
+        </p:nvSpPr>
+        <p:spPr/>
+      </p:sp>
+      <p:sp>
+        <p:nvSpPr>
+          <p:cNvPr id="3" name="Notes Placeholder 2"/>
+          <p:cNvSpPr>
+            <a:spLocks noGrp="1"/>
+          </p:cNvSpPr>
+          <p:nvPr>
+            <p:ph type="body" idx="1"/>
+          </p:nvPr>
+        </p:nvSpPr>
+        <p:spPr/>
+        <p:txBody>
+          <a:bodyPr/>
+          <a:lstStyle/>
+          <a:p>
+            <a:endParaRPr lang="en-IN" dirty="0"/>
+          </a:p>
+        </p:txBody>
+      </p:sp>
+      <p:sp>
+        <p:nvSpPr>
+          <p:cNvPr id="4" name="Slide Number Placeholder 3"/>
+          <p:cNvSpPr>
+            <a:spLocks noGrp="1"/>
+          </p:cNvSpPr>
+          <p:nvPr>
+            <p:ph type="sldNum" sz="quarter" idx="5"/>
+          </p:nvPr>
+        </p:nvSpPr>
+        <p:spPr/>
+        <p:txBody>
+          <a:bodyPr/>
+          <a:lstStyle/>
+          <a:p>
+            <a:fld id="{9BD7E917-8394-433F-96B5-1F86F1B85784}" type="slidenum">
+              <a:rPr lang="en-IN" smtClean="0"/>
+              <a:t>60</a:t>
+            </a:fld>
+            <a:endParaRPr lang="en-IN"/>
+          </a:p>
+        </p:txBody>
+      </p:sp>
+    </p:spTree>
+    <p:extLst>
+      <p:ext uri="{BB962C8B-B14F-4D97-AF65-F5344CB8AC3E}">
+        <p14:creationId xmlns:p14="http://schemas.microsoft.com/office/powerpoint/2010/main" val="2949034425"/>
+      </p:ext>
+    </p:extLst>
+  </p:cSld>
+  <p:clrMapOvr>
+    <a:masterClrMapping/>
+  </p:clrMapOvr>
+</p:notes>
+</file>
+
+<file path=ppt/notesSlides/notesSlide27.xml><?xml version="1.0" encoding="utf-8"?>
+<p:notes xmlns:a="http://schemas.openxmlformats.org/drawingml/2006/main" xmlns:r="http://schemas.openxmlformats.org/officeDocument/2006/relationships" xmlns:p="http://schemas.openxmlformats.org/presentationml/2006/main">
+  <p:cSld>
+    <p:spTree>
+      <p:nvGrpSpPr>
+        <p:cNvPr id="1" name=""/>
+        <p:cNvGrpSpPr/>
+        <p:nvPr/>
+      </p:nvGrpSpPr>
+      <p:grpSpPr>
+        <a:xfrm>
+          <a:off x="0" y="0"/>
+          <a:ext cx="0" cy="0"/>
+          <a:chOff x="0" y="0"/>
+          <a:chExt cx="0" cy="0"/>
+        </a:xfrm>
+      </p:grpSpPr>
+      <p:sp>
+        <p:nvSpPr>
+          <p:cNvPr id="2" name="Slide Image Placeholder 1"/>
+          <p:cNvSpPr>
+            <a:spLocks noGrp="1" noRot="1" noChangeAspect="1"/>
+          </p:cNvSpPr>
+          <p:nvPr>
+            <p:ph type="sldImg"/>
+          </p:nvPr>
+        </p:nvSpPr>
+        <p:spPr/>
+      </p:sp>
+      <p:sp>
+        <p:nvSpPr>
+          <p:cNvPr id="3" name="Notes Placeholder 2"/>
+          <p:cNvSpPr>
+            <a:spLocks noGrp="1"/>
+          </p:cNvSpPr>
+          <p:nvPr>
+            <p:ph type="body" idx="1"/>
+          </p:nvPr>
+        </p:nvSpPr>
+        <p:spPr/>
+        <p:txBody>
+          <a:bodyPr/>
+          <a:lstStyle/>
+          <a:p>
+            <a:r>
+              <a:rPr lang="en-US" b="0" i="0" dirty="0">
+                <a:solidFill>
+                  <a:srgbClr val="222635"/>
+                </a:solidFill>
+                <a:effectLst/>
+                <a:latin typeface="Cambria" panose="02040503050406030204" pitchFamily="18" charset="0"/>
+              </a:rPr>
+              <a:t>Now if we connect Grafana with Prometheus as the data source and install </a:t>
+            </a:r>
+            <a:r>
+              <a:rPr lang="en-US" b="0" i="0" u="none" strike="noStrike" dirty="0">
+                <a:effectLst/>
+                <a:latin typeface="Cambria" panose="02040503050406030204" pitchFamily="18" charset="0"/>
+                <a:hlinkClick r:id="rId3"/>
+              </a:rPr>
+              <a:t>this excellent JVM Micrometer dashboard</a:t>
+            </a:r>
+            <a:r>
+              <a:rPr lang="en-US" b="0" i="0" dirty="0">
+                <a:solidFill>
+                  <a:srgbClr val="222635"/>
+                </a:solidFill>
+                <a:effectLst/>
+                <a:latin typeface="Cambria" panose="02040503050406030204" pitchFamily="18" charset="0"/>
+              </a:rPr>
+              <a:t> into Grafana we can instantly start monitoring our Spring Boot application. You will end up with a pretty mature dashboard that lets you switch between different instances of your application.</a:t>
+            </a:r>
+          </a:p>
+          <a:p>
+            <a:r>
+              <a:rPr lang="en-US" b="0" i="0" dirty="0">
+                <a:solidFill>
+                  <a:srgbClr val="222635"/>
+                </a:solidFill>
+                <a:effectLst/>
+                <a:latin typeface="Cambria" panose="02040503050406030204" pitchFamily="18" charset="0"/>
+              </a:rPr>
+              <a:t>If you want to start everything all at once you can easily use docker-compose.</a:t>
+            </a:r>
+          </a:p>
+          <a:p>
+            <a:endParaRPr lang="en-IN" dirty="0"/>
+          </a:p>
+        </p:txBody>
+      </p:sp>
+      <p:sp>
+        <p:nvSpPr>
+          <p:cNvPr id="4" name="Slide Number Placeholder 3"/>
+          <p:cNvSpPr>
+            <a:spLocks noGrp="1"/>
+          </p:cNvSpPr>
+          <p:nvPr>
+            <p:ph type="sldNum" sz="quarter" idx="5"/>
+          </p:nvPr>
+        </p:nvSpPr>
+        <p:spPr/>
+        <p:txBody>
+          <a:bodyPr/>
+          <a:lstStyle/>
+          <a:p>
+            <a:fld id="{9BD7E917-8394-433F-96B5-1F86F1B85784}" type="slidenum">
+              <a:rPr lang="en-IN" smtClean="0"/>
+              <a:t>61</a:t>
+            </a:fld>
+            <a:endParaRPr lang="en-IN"/>
+          </a:p>
+        </p:txBody>
+      </p:sp>
+    </p:spTree>
+    <p:extLst>
+      <p:ext uri="{BB962C8B-B14F-4D97-AF65-F5344CB8AC3E}">
+        <p14:creationId xmlns:p14="http://schemas.microsoft.com/office/powerpoint/2010/main" val="2906693958"/>
+      </p:ext>
+    </p:extLst>
+  </p:cSld>
+  <p:clrMapOvr>
+    <a:masterClrMapping/>
+  </p:clrMapOvr>
+</p:notes>
+</file>
+
 <file path=ppt/notesSlides/notesSlide3.xml><?xml version="1.0" encoding="utf-8"?>
 <p:notes xmlns:a="http://schemas.openxmlformats.org/drawingml/2006/main" xmlns:r="http://schemas.openxmlformats.org/officeDocument/2006/relationships" xmlns:p="http://schemas.openxmlformats.org/presentationml/2006/main">
   <p:cSld>
@@ -5080,7 +5629,7 @@
           <a:p>
             <a:fld id="{30A3986D-CCD2-4D39-883A-01078D9363A9}" type="datetimeFigureOut">
               <a:rPr lang="en-US" smtClean="0"/>
-              <a:t>11/30/2023</a:t>
+              <a:t>12/1/2023</a:t>
             </a:fld>
             <a:endParaRPr lang="en-US"/>
           </a:p>
@@ -5243,7 +5792,7 @@
           <a:p>
             <a:fld id="{30A3986D-CCD2-4D39-883A-01078D9363A9}" type="datetimeFigureOut">
               <a:rPr lang="en-US" smtClean="0"/>
-              <a:t>11/30/2023</a:t>
+              <a:t>12/1/2023</a:t>
             </a:fld>
             <a:endParaRPr lang="en-US"/>
           </a:p>
@@ -5416,7 +5965,7 @@
           <a:p>
             <a:fld id="{30A3986D-CCD2-4D39-883A-01078D9363A9}" type="datetimeFigureOut">
               <a:rPr lang="en-US" smtClean="0"/>
-              <a:t>11/30/2023</a:t>
+              <a:t>12/1/2023</a:t>
             </a:fld>
             <a:endParaRPr lang="en-US"/>
           </a:p>
@@ -5579,7 +6128,7 @@
           <a:p>
             <a:fld id="{30A3986D-CCD2-4D39-883A-01078D9363A9}" type="datetimeFigureOut">
               <a:rPr lang="en-US" smtClean="0"/>
-              <a:t>11/30/2023</a:t>
+              <a:t>12/1/2023</a:t>
             </a:fld>
             <a:endParaRPr lang="en-US"/>
           </a:p>
@@ -5819,7 +6368,7 @@
           <a:p>
             <a:fld id="{30A3986D-CCD2-4D39-883A-01078D9363A9}" type="datetimeFigureOut">
               <a:rPr lang="en-US" smtClean="0"/>
-              <a:t>11/30/2023</a:t>
+              <a:t>12/1/2023</a:t>
             </a:fld>
             <a:endParaRPr lang="en-US"/>
           </a:p>
@@ -6099,7 +6648,7 @@
           <a:p>
             <a:fld id="{30A3986D-CCD2-4D39-883A-01078D9363A9}" type="datetimeFigureOut">
               <a:rPr lang="en-US" smtClean="0"/>
-              <a:t>11/30/2023</a:t>
+              <a:t>12/1/2023</a:t>
             </a:fld>
             <a:endParaRPr lang="en-US"/>
           </a:p>
@@ -6513,7 +7062,7 @@
           <a:p>
             <a:fld id="{30A3986D-CCD2-4D39-883A-01078D9363A9}" type="datetimeFigureOut">
               <a:rPr lang="en-US" smtClean="0"/>
-              <a:t>11/30/2023</a:t>
+              <a:t>12/1/2023</a:t>
             </a:fld>
             <a:endParaRPr lang="en-US"/>
           </a:p>
@@ -6625,7 +7174,7 @@
           <a:p>
             <a:fld id="{30A3986D-CCD2-4D39-883A-01078D9363A9}" type="datetimeFigureOut">
               <a:rPr lang="en-US" smtClean="0"/>
-              <a:t>11/30/2023</a:t>
+              <a:t>12/1/2023</a:t>
             </a:fld>
             <a:endParaRPr lang="en-US"/>
           </a:p>
@@ -6715,7 +7264,7 @@
           <a:p>
             <a:fld id="{30A3986D-CCD2-4D39-883A-01078D9363A9}" type="datetimeFigureOut">
               <a:rPr lang="en-US" smtClean="0"/>
-              <a:t>11/30/2023</a:t>
+              <a:t>12/1/2023</a:t>
             </a:fld>
             <a:endParaRPr lang="en-US"/>
           </a:p>
@@ -6985,7 +7534,7 @@
           <a:p>
             <a:fld id="{30A3986D-CCD2-4D39-883A-01078D9363A9}" type="datetimeFigureOut">
               <a:rPr lang="en-US" smtClean="0"/>
-              <a:t>11/30/2023</a:t>
+              <a:t>12/1/2023</a:t>
             </a:fld>
             <a:endParaRPr lang="en-US"/>
           </a:p>
@@ -7232,7 +7781,7 @@
           <a:p>
             <a:fld id="{30A3986D-CCD2-4D39-883A-01078D9363A9}" type="datetimeFigureOut">
               <a:rPr lang="en-US" smtClean="0"/>
-              <a:t>11/30/2023</a:t>
+              <a:t>12/1/2023</a:t>
             </a:fld>
             <a:endParaRPr lang="en-US"/>
           </a:p>
@@ -7438,7 +7987,7 @@
           <a:p>
             <a:fld id="{30A3986D-CCD2-4D39-883A-01078D9363A9}" type="datetimeFigureOut">
               <a:rPr lang="en-US" smtClean="0"/>
-              <a:t>11/30/2023</a:t>
+              <a:t>12/1/2023</a:t>
             </a:fld>
             <a:endParaRPr lang="en-US"/>
           </a:p>
@@ -18319,231 +18868,6 @@
         <p:spPr/>
         <p:txBody>
           <a:bodyPr>
-            <a:normAutofit fontScale="47500" lnSpcReduction="20000"/>
-          </a:bodyPr>
-          <a:lstStyle/>
-          <a:p>
-            <a:pPr marL="0" indent="0">
-              <a:buNone/>
-            </a:pPr>
-            <a:r>
-              <a:rPr lang="en-IN" dirty="0"/>
-              <a:t>DEMO</a:t>
-            </a:r>
-          </a:p>
-          <a:p>
-            <a:pPr marL="0" indent="0">
-              <a:buNone/>
-            </a:pPr>
-            <a:r>
-              <a:rPr lang="en-US" dirty="0"/>
-              <a:t>Let’s consider a flight booking application in which user searches for flight deals. The application sends the information to all the airlines, find their fares and then responds back.</a:t>
-            </a:r>
-          </a:p>
-          <a:p>
-            <a:pPr marL="0" indent="0">
-              <a:buNone/>
-            </a:pPr>
-            <a:endParaRPr lang="en-US" dirty="0"/>
-          </a:p>
-          <a:p>
-            <a:pPr marL="0" indent="0">
-              <a:buNone/>
-            </a:pPr>
-            <a:r>
-              <a:rPr lang="en-US" dirty="0"/>
-              <a:t>As our application depends on 3rd party APIs and we need to provide best user experience to our user, we will publish the user request to all airlines and whichever responds within specific timeout period, we will collect all results and show the top 5 deals to our users.</a:t>
-            </a:r>
-          </a:p>
-          <a:p>
-            <a:endParaRPr lang="en-US" dirty="0"/>
-          </a:p>
-          <a:p>
-            <a:endParaRPr lang="en-US" dirty="0"/>
-          </a:p>
-          <a:p>
-            <a:endParaRPr lang="en-US" dirty="0"/>
-          </a:p>
-          <a:p>
-            <a:endParaRPr lang="en-US" dirty="0"/>
-          </a:p>
-          <a:p>
-            <a:endParaRPr lang="en-US" dirty="0"/>
-          </a:p>
-          <a:p>
-            <a:endParaRPr lang="en-US" dirty="0"/>
-          </a:p>
-          <a:p>
-            <a:endParaRPr lang="en-US" dirty="0"/>
-          </a:p>
-          <a:p>
-            <a:endParaRPr lang="en-US" dirty="0"/>
-          </a:p>
-          <a:p>
-            <a:endParaRPr lang="en-US" dirty="0"/>
-          </a:p>
-          <a:p>
-            <a:endParaRPr lang="en-US" dirty="0"/>
-          </a:p>
-          <a:p>
-            <a:endParaRPr lang="en-US" dirty="0"/>
-          </a:p>
-          <a:p>
-            <a:r>
-              <a:rPr lang="en-US" dirty="0"/>
-              <a:t>The main application does not even know how many airlines are listening to the requests. Even if some of the airlines services are not be up and running, it is not going to affect our flight-app.</a:t>
-            </a:r>
-          </a:p>
-          <a:p>
-            <a:pPr marL="0" indent="0">
-              <a:buNone/>
-            </a:pPr>
-            <a:endParaRPr lang="en-IN" dirty="0"/>
-          </a:p>
-        </p:txBody>
-      </p:sp>
-      <p:pic>
-        <p:nvPicPr>
-          <p:cNvPr id="2053" name="Picture 5" descr="scatter gather pattern">
-            <a:extLst>
-              <a:ext uri="{FF2B5EF4-FFF2-40B4-BE49-F238E27FC236}">
-                <a16:creationId xmlns:a16="http://schemas.microsoft.com/office/drawing/2014/main" id="{7299B820-16B5-2D8E-CF66-78145592C1F0}"/>
-              </a:ext>
-            </a:extLst>
-          </p:cNvPr>
-          <p:cNvPicPr>
-            <a:picLocks noChangeAspect="1" noChangeArrowheads="1"/>
-          </p:cNvPicPr>
-          <p:nvPr/>
-        </p:nvPicPr>
-        <p:blipFill>
-          <a:blip r:embed="rId3">
-            <a:extLst>
-              <a:ext uri="{28A0092B-C50C-407E-A947-70E740481C1C}">
-                <a14:useLocalDpi xmlns:a14="http://schemas.microsoft.com/office/drawing/2010/main" val="0"/>
-              </a:ext>
-            </a:extLst>
-          </a:blip>
-          <a:srcRect/>
-          <a:stretch>
-            <a:fillRect/>
-          </a:stretch>
-        </p:blipFill>
-        <p:spPr bwMode="auto">
-          <a:xfrm>
-            <a:off x="2033972" y="3212976"/>
-            <a:ext cx="5076056" cy="2170543"/>
-          </a:xfrm>
-          <a:prstGeom prst="rect">
-            <a:avLst/>
-          </a:prstGeom>
-          <a:noFill/>
-          <a:extLst>
-            <a:ext uri="{909E8E84-426E-40DD-AFC4-6F175D3DCCD1}">
-              <a14:hiddenFill xmlns:a14="http://schemas.microsoft.com/office/drawing/2010/main">
-                <a:solidFill>
-                  <a:srgbClr val="FFFFFF"/>
-                </a:solidFill>
-              </a14:hiddenFill>
-            </a:ext>
-          </a:extLst>
-        </p:spPr>
-      </p:pic>
-    </p:spTree>
-    <p:extLst>
-      <p:ext uri="{BB962C8B-B14F-4D97-AF65-F5344CB8AC3E}">
-        <p14:creationId xmlns:p14="http://schemas.microsoft.com/office/powerpoint/2010/main" val="3016336452"/>
-      </p:ext>
-    </p:extLst>
-  </p:cSld>
-  <p:clrMapOvr>
-    <a:masterClrMapping/>
-  </p:clrMapOvr>
-</p:sld>
-</file>
-
-<file path=ppt/slides/slide51.xml><?xml version="1.0" encoding="utf-8"?>
-<p:sld xmlns:a="http://schemas.openxmlformats.org/drawingml/2006/main" xmlns:r="http://schemas.openxmlformats.org/officeDocument/2006/relationships" xmlns:p="http://schemas.openxmlformats.org/presentationml/2006/main">
-  <p:cSld>
-    <p:spTree>
-      <p:nvGrpSpPr>
-        <p:cNvPr id="1" name=""/>
-        <p:cNvGrpSpPr/>
-        <p:nvPr/>
-      </p:nvGrpSpPr>
-      <p:grpSpPr>
-        <a:xfrm>
-          <a:off x="0" y="0"/>
-          <a:ext cx="0" cy="0"/>
-          <a:chOff x="0" y="0"/>
-          <a:chExt cx="0" cy="0"/>
-        </a:xfrm>
-      </p:grpSpPr>
-      <p:sp>
-        <p:nvSpPr>
-          <p:cNvPr id="2" name="Title 1">
-            <a:extLst>
-              <a:ext uri="{FF2B5EF4-FFF2-40B4-BE49-F238E27FC236}">
-                <a16:creationId xmlns:a16="http://schemas.microsoft.com/office/drawing/2014/main" id="{B1DC4EC9-F97C-24A3-4DE7-49F0B54B1EC5}"/>
-              </a:ext>
-            </a:extLst>
-          </p:cNvPr>
-          <p:cNvSpPr>
-            <a:spLocks noGrp="1"/>
-          </p:cNvSpPr>
-          <p:nvPr>
-            <p:ph type="title"/>
-          </p:nvPr>
-        </p:nvSpPr>
-        <p:spPr/>
-        <p:txBody>
-          <a:bodyPr>
-            <a:normAutofit fontScale="90000"/>
-          </a:bodyPr>
-          <a:lstStyle/>
-          <a:p>
-            <a:r>
-              <a:rPr lang="en-IN" b="1" i="0" dirty="0">
-                <a:solidFill>
-                  <a:srgbClr val="3A3A3A"/>
-                </a:solidFill>
-                <a:effectLst/>
-                <a:latin typeface="Catamaran-SemiBold"/>
-              </a:rPr>
-              <a:t>Scatter Gather Pattern</a:t>
-            </a:r>
-            <a:br>
-              <a:rPr lang="en-IN" b="0" i="0" dirty="0">
-                <a:solidFill>
-                  <a:srgbClr val="3A3A3A"/>
-                </a:solidFill>
-                <a:effectLst/>
-                <a:latin typeface="Catamaran-Regular"/>
-              </a:rPr>
-            </a:br>
-            <a:endParaRPr lang="en-IN" dirty="0"/>
-          </a:p>
-        </p:txBody>
-      </p:sp>
-      <p:sp>
-        <p:nvSpPr>
-          <p:cNvPr id="3" name="Content Placeholder 2">
-            <a:extLst>
-              <a:ext uri="{FF2B5EF4-FFF2-40B4-BE49-F238E27FC236}">
-                <a16:creationId xmlns:a16="http://schemas.microsoft.com/office/drawing/2014/main" id="{CC5D9D8C-BCD7-922B-917F-E7E95E208476}"/>
-              </a:ext>
-            </a:extLst>
-          </p:cNvPr>
-          <p:cNvSpPr>
-            <a:spLocks noGrp="1"/>
-          </p:cNvSpPr>
-          <p:nvPr>
-            <p:ph idx="1"/>
-          </p:nvPr>
-        </p:nvSpPr>
-        <p:spPr/>
-        <p:txBody>
-          <a:bodyPr>
             <a:normAutofit fontScale="77500" lnSpcReduction="20000"/>
           </a:bodyPr>
           <a:lstStyle/>
@@ -19024,6 +19348,399 @@
 </p:sld>
 </file>
 
+<file path=ppt/slides/slide51.xml><?xml version="1.0" encoding="utf-8"?>
+<p:sld xmlns:a="http://schemas.openxmlformats.org/drawingml/2006/main" xmlns:r="http://schemas.openxmlformats.org/officeDocument/2006/relationships" xmlns:p="http://schemas.openxmlformats.org/presentationml/2006/main">
+  <p:cSld>
+    <p:spTree>
+      <p:nvGrpSpPr>
+        <p:cNvPr id="1" name=""/>
+        <p:cNvGrpSpPr/>
+        <p:nvPr/>
+      </p:nvGrpSpPr>
+      <p:grpSpPr>
+        <a:xfrm>
+          <a:off x="0" y="0"/>
+          <a:ext cx="0" cy="0"/>
+          <a:chOff x="0" y="0"/>
+          <a:chExt cx="0" cy="0"/>
+        </a:xfrm>
+      </p:grpSpPr>
+      <p:sp>
+        <p:nvSpPr>
+          <p:cNvPr id="2" name="Title 1">
+            <a:extLst>
+              <a:ext uri="{FF2B5EF4-FFF2-40B4-BE49-F238E27FC236}">
+                <a16:creationId xmlns:a16="http://schemas.microsoft.com/office/drawing/2014/main" id="{F5BEDD40-8418-A74C-A3EE-2FC169A04A0A}"/>
+              </a:ext>
+            </a:extLst>
+          </p:cNvPr>
+          <p:cNvSpPr>
+            <a:spLocks noGrp="1"/>
+          </p:cNvSpPr>
+          <p:nvPr>
+            <p:ph type="title"/>
+          </p:nvPr>
+        </p:nvSpPr>
+        <p:spPr/>
+        <p:txBody>
+          <a:bodyPr>
+            <a:normAutofit fontScale="90000"/>
+          </a:bodyPr>
+          <a:lstStyle/>
+          <a:p>
+            <a:r>
+              <a:rPr lang="en-IN" b="1" i="0" dirty="0">
+                <a:solidFill>
+                  <a:srgbClr val="3A3A3A"/>
+                </a:solidFill>
+                <a:effectLst/>
+                <a:latin typeface="Catamaran-SemiBold"/>
+              </a:rPr>
+              <a:t>Scatter Gather Pattern</a:t>
+            </a:r>
+            <a:br>
+              <a:rPr lang="en-IN" b="0" i="0" dirty="0">
+                <a:solidFill>
+                  <a:srgbClr val="3A3A3A"/>
+                </a:solidFill>
+                <a:effectLst/>
+                <a:latin typeface="Catamaran-Regular"/>
+              </a:rPr>
+            </a:br>
+            <a:endParaRPr lang="en-IN" dirty="0"/>
+          </a:p>
+        </p:txBody>
+      </p:sp>
+      <p:sp>
+        <p:nvSpPr>
+          <p:cNvPr id="3" name="Content Placeholder 2">
+            <a:extLst>
+              <a:ext uri="{FF2B5EF4-FFF2-40B4-BE49-F238E27FC236}">
+                <a16:creationId xmlns:a16="http://schemas.microsoft.com/office/drawing/2014/main" id="{E4E37B9B-F345-1836-0EFF-36E68FA2F530}"/>
+              </a:ext>
+            </a:extLst>
+          </p:cNvPr>
+          <p:cNvSpPr>
+            <a:spLocks noGrp="1"/>
+          </p:cNvSpPr>
+          <p:nvPr>
+            <p:ph idx="1"/>
+          </p:nvPr>
+        </p:nvSpPr>
+        <p:spPr/>
+        <p:txBody>
+          <a:bodyPr>
+            <a:normAutofit fontScale="62500" lnSpcReduction="20000"/>
+          </a:bodyPr>
+          <a:lstStyle/>
+          <a:p>
+            <a:r>
+              <a:rPr lang="en-IN" dirty="0"/>
+              <a:t>DEMO</a:t>
+            </a:r>
+          </a:p>
+          <a:p>
+            <a:pPr marL="0" indent="0" algn="l" fontAlgn="base">
+              <a:buNone/>
+            </a:pPr>
+            <a:r>
+              <a:rPr lang="en-US" b="1" i="0" dirty="0">
+                <a:solidFill>
+                  <a:srgbClr val="3A3A3A"/>
+                </a:solidFill>
+                <a:effectLst/>
+                <a:latin typeface="Catamaran-SemiBold"/>
+              </a:rPr>
+              <a:t>Scatter Gather Pattern</a:t>
+            </a:r>
+            <a:endParaRPr lang="en-US" b="0" i="0" dirty="0">
+              <a:solidFill>
+                <a:srgbClr val="3A3A3A"/>
+              </a:solidFill>
+              <a:effectLst/>
+              <a:latin typeface="Catamaran-Regular"/>
+            </a:endParaRPr>
+          </a:p>
+          <a:p>
+            <a:pPr lvl="1" fontAlgn="base">
+              <a:buFont typeface="Arial" panose="020B0604020202020204" pitchFamily="34" charset="0"/>
+              <a:buChar char="•"/>
+            </a:pPr>
+            <a:r>
+              <a:rPr lang="en-US" b="0" i="0" dirty="0">
+                <a:solidFill>
+                  <a:srgbClr val="212121"/>
+                </a:solidFill>
+                <a:effectLst/>
+                <a:latin typeface="Catamaran-Regular"/>
+              </a:rPr>
+              <a:t>Now lets work on the flight-search customer facing app.</a:t>
+            </a:r>
+          </a:p>
+          <a:p>
+            <a:pPr lvl="2" fontAlgn="base"/>
+            <a:r>
+              <a:rPr lang="en-IN" b="0" i="0" dirty="0">
+                <a:solidFill>
+                  <a:srgbClr val="212121"/>
+                </a:solidFill>
+                <a:effectLst/>
+                <a:latin typeface="Catamaran-Regular"/>
+              </a:rPr>
+              <a:t>NATS bean</a:t>
+            </a:r>
+          </a:p>
+          <a:p>
+            <a:pPr lvl="2" fontAlgn="base"/>
+            <a:r>
+              <a:rPr lang="en-US" b="0" i="0" dirty="0">
+                <a:solidFill>
+                  <a:srgbClr val="212121"/>
+                </a:solidFill>
+                <a:effectLst/>
+                <a:latin typeface="Catamaran-Regular"/>
+              </a:rPr>
+              <a:t>Controller</a:t>
+            </a:r>
+          </a:p>
+          <a:p>
+            <a:pPr lvl="2" fontAlgn="base"/>
+            <a:r>
+              <a:rPr lang="en-US" b="0" i="0" dirty="0" err="1">
+                <a:solidFill>
+                  <a:srgbClr val="212121"/>
+                </a:solidFill>
+                <a:effectLst/>
+                <a:latin typeface="Catamaran-Regular"/>
+              </a:rPr>
+              <a:t>ScatterGatherService</a:t>
+            </a:r>
+            <a:endParaRPr lang="en-US" b="0" i="0" dirty="0">
+              <a:solidFill>
+                <a:srgbClr val="212121"/>
+              </a:solidFill>
+              <a:effectLst/>
+              <a:latin typeface="Catamaran-Regular"/>
+            </a:endParaRPr>
+          </a:p>
+          <a:p>
+            <a:pPr lvl="3" fontAlgn="base">
+              <a:buFont typeface="Arial" panose="020B0604020202020204" pitchFamily="34" charset="0"/>
+              <a:buChar char="•"/>
+            </a:pPr>
+            <a:r>
+              <a:rPr lang="en-US" b="0" i="0" dirty="0">
+                <a:solidFill>
+                  <a:srgbClr val="212121"/>
+                </a:solidFill>
+                <a:effectLst/>
+                <a:latin typeface="Catamaran-Regular"/>
+              </a:rPr>
+              <a:t>This class is responsible for broadcasting the request and receiving the responses</a:t>
+            </a:r>
+          </a:p>
+          <a:p>
+            <a:pPr marL="0" indent="0">
+              <a:buNone/>
+            </a:pPr>
+            <a:endParaRPr lang="en-IN" b="1" i="0" dirty="0">
+              <a:solidFill>
+                <a:srgbClr val="3A3A3A"/>
+              </a:solidFill>
+              <a:effectLst/>
+              <a:latin typeface="Catamaran-SemiBold"/>
+            </a:endParaRPr>
+          </a:p>
+          <a:p>
+            <a:pPr marL="0" indent="0">
+              <a:buNone/>
+            </a:pPr>
+            <a:r>
+              <a:rPr lang="en-IN" b="1" i="0" dirty="0">
+                <a:solidFill>
+                  <a:srgbClr val="3A3A3A"/>
+                </a:solidFill>
+                <a:effectLst/>
+                <a:latin typeface="Catamaran-SemiBold"/>
+              </a:rPr>
+              <a:t>Airline – Service</a:t>
+            </a:r>
+            <a:endParaRPr lang="en-IN" b="0" i="0" dirty="0">
+              <a:solidFill>
+                <a:srgbClr val="3A3A3A"/>
+              </a:solidFill>
+              <a:effectLst/>
+              <a:latin typeface="Catamaran-Regular"/>
+            </a:endParaRPr>
+          </a:p>
+          <a:p>
+            <a:pPr lvl="1">
+              <a:buFont typeface="Arial" panose="020B0604020202020204" pitchFamily="34" charset="0"/>
+              <a:buChar char="•"/>
+            </a:pPr>
+            <a:r>
+              <a:rPr lang="en-US" dirty="0"/>
+              <a:t>This service class represents the individual airlines. It receives the request and provide the schedules along with price.</a:t>
+            </a:r>
+          </a:p>
+          <a:p>
+            <a:pPr lvl="1">
+              <a:buFont typeface="Arial" panose="020B0604020202020204" pitchFamily="34" charset="0"/>
+              <a:buChar char="•"/>
+            </a:pPr>
+            <a:r>
+              <a:rPr lang="en-US" dirty="0"/>
+              <a:t>This is a separate app. We would be running multiple instances of this app.</a:t>
+            </a:r>
+            <a:endParaRPr lang="en-IN" dirty="0"/>
+          </a:p>
+          <a:p>
+            <a:pPr marL="0" indent="0" algn="l" fontAlgn="base">
+              <a:buNone/>
+            </a:pPr>
+            <a:r>
+              <a:rPr lang="en-US" b="1" i="0" dirty="0">
+                <a:solidFill>
+                  <a:srgbClr val="3A3A3A"/>
+                </a:solidFill>
+                <a:effectLst/>
+                <a:latin typeface="Catamaran-SemiBold"/>
+              </a:rPr>
+              <a:t>Common DTO</a:t>
+            </a:r>
+            <a:endParaRPr lang="en-US" b="0" i="0" dirty="0">
+              <a:solidFill>
+                <a:srgbClr val="3A3A3A"/>
+              </a:solidFill>
+              <a:effectLst/>
+              <a:latin typeface="Catamaran-Regular"/>
+            </a:endParaRPr>
+          </a:p>
+          <a:p>
+            <a:pPr lvl="1" fontAlgn="base">
+              <a:buFont typeface="Arial" panose="020B0604020202020204" pitchFamily="34" charset="0"/>
+              <a:buChar char="•"/>
+            </a:pPr>
+            <a:r>
+              <a:rPr lang="en-US" b="0" i="0" dirty="0">
+                <a:solidFill>
+                  <a:srgbClr val="212121"/>
+                </a:solidFill>
+                <a:effectLst/>
+                <a:latin typeface="Catamaran-Regular"/>
+              </a:rPr>
+              <a:t>Flight Search Request</a:t>
+            </a:r>
+            <a:endParaRPr lang="en-IN" b="0" i="0" dirty="0">
+              <a:solidFill>
+                <a:srgbClr val="212121"/>
+              </a:solidFill>
+              <a:effectLst/>
+              <a:latin typeface="Catamaran-Regular"/>
+            </a:endParaRPr>
+          </a:p>
+          <a:p>
+            <a:pPr lvl="1" fontAlgn="base">
+              <a:buFont typeface="Arial" panose="020B0604020202020204" pitchFamily="34" charset="0"/>
+              <a:buChar char="•"/>
+            </a:pPr>
+            <a:r>
+              <a:rPr lang="en-IN" b="0" i="0" dirty="0">
+                <a:solidFill>
+                  <a:srgbClr val="212121"/>
+                </a:solidFill>
+                <a:effectLst/>
+                <a:latin typeface="Catamaran-Regular"/>
+              </a:rPr>
+              <a:t>Flight Schedule</a:t>
+            </a:r>
+          </a:p>
+          <a:p>
+            <a:pPr lvl="1" fontAlgn="base">
+              <a:buFont typeface="Arial" panose="020B0604020202020204" pitchFamily="34" charset="0"/>
+              <a:buChar char="•"/>
+            </a:pPr>
+            <a:r>
+              <a:rPr lang="en-IN" b="0" i="0" dirty="0">
+                <a:solidFill>
+                  <a:srgbClr val="212121"/>
+                </a:solidFill>
+                <a:effectLst/>
+                <a:latin typeface="Catamaran-Regular"/>
+              </a:rPr>
+              <a:t>Flight Search </a:t>
+            </a:r>
+            <a:r>
+              <a:rPr lang="en-IN" b="0" i="0" dirty="0" err="1">
+                <a:solidFill>
+                  <a:srgbClr val="212121"/>
+                </a:solidFill>
+                <a:effectLst/>
+                <a:latin typeface="Catamaran-Regular"/>
+              </a:rPr>
+              <a:t>Response</a:t>
+            </a:r>
+            <a:r>
+              <a:rPr lang="en-IN" b="1" i="0" dirty="0" err="1">
+                <a:solidFill>
+                  <a:srgbClr val="3A3A3A"/>
+                </a:solidFill>
+                <a:effectLst/>
+                <a:latin typeface="Catamaran-SemiBold"/>
+              </a:rPr>
+              <a:t>Airline</a:t>
+            </a:r>
+            <a:r>
+              <a:rPr lang="en-IN" b="1" i="0" dirty="0">
+                <a:solidFill>
+                  <a:srgbClr val="3A3A3A"/>
+                </a:solidFill>
+                <a:effectLst/>
+                <a:latin typeface="Catamaran-SemiBold"/>
+              </a:rPr>
+              <a:t> – Service</a:t>
+            </a:r>
+          </a:p>
+          <a:p>
+            <a:pPr marL="457200" lvl="1" indent="0" fontAlgn="base">
+              <a:buNone/>
+            </a:pPr>
+            <a:endParaRPr lang="en-IN" b="0" i="0" dirty="0">
+              <a:solidFill>
+                <a:srgbClr val="3A3A3A"/>
+              </a:solidFill>
+              <a:effectLst/>
+              <a:latin typeface="Catamaran-Regular"/>
+            </a:endParaRPr>
+          </a:p>
+          <a:p>
+            <a:pPr lvl="1" fontAlgn="base">
+              <a:buFont typeface="Arial" panose="020B0604020202020204" pitchFamily="34" charset="0"/>
+              <a:buChar char="•"/>
+            </a:pPr>
+            <a:endParaRPr lang="en-US" b="0" i="0" dirty="0">
+              <a:solidFill>
+                <a:srgbClr val="212121"/>
+              </a:solidFill>
+              <a:effectLst/>
+              <a:latin typeface="Catamaran-Regular"/>
+            </a:endParaRPr>
+          </a:p>
+        </p:txBody>
+      </p:sp>
+    </p:spTree>
+    <p:extLst>
+      <p:ext uri="{BB962C8B-B14F-4D97-AF65-F5344CB8AC3E}">
+        <p14:creationId xmlns:p14="http://schemas.microsoft.com/office/powerpoint/2010/main" val="554460181"/>
+      </p:ext>
+    </p:extLst>
+  </p:cSld>
+  <p:clrMapOvr>
+    <a:masterClrMapping/>
+  </p:clrMapOvr>
+</p:sld>
+</file>
+
 <file path=ppt/slides/slide52.xml><?xml version="1.0" encoding="utf-8"?>
 <p:sld xmlns:a="http://schemas.openxmlformats.org/drawingml/2006/main" xmlns:r="http://schemas.openxmlformats.org/officeDocument/2006/relationships" xmlns:p="http://schemas.openxmlformats.org/presentationml/2006/main">
   <p:cSld>
@@ -19046,7 +19763,7 @@
           <p:cNvPr id="2" name="Title 1">
             <a:extLst>
               <a:ext uri="{FF2B5EF4-FFF2-40B4-BE49-F238E27FC236}">
-                <a16:creationId xmlns:a16="http://schemas.microsoft.com/office/drawing/2014/main" id="{F5BEDD40-8418-A74C-A3EE-2FC169A04A0A}"/>
+                <a16:creationId xmlns:a16="http://schemas.microsoft.com/office/drawing/2014/main" id="{54A1E61C-47F4-BA60-7DE6-B71808785D38}"/>
               </a:ext>
             </a:extLst>
           </p:cNvPr>
@@ -19092,7 +19809,7 @@
           <p:cNvPr id="3" name="Content Placeholder 2">
             <a:extLst>
               <a:ext uri="{FF2B5EF4-FFF2-40B4-BE49-F238E27FC236}">
-                <a16:creationId xmlns:a16="http://schemas.microsoft.com/office/drawing/2014/main" id="{E4E37B9B-F345-1836-0EFF-36E68FA2F530}"/>
+                <a16:creationId xmlns:a16="http://schemas.microsoft.com/office/drawing/2014/main" id="{4C5DE325-94A1-0DB6-AA99-4F3FB025B687}"/>
               </a:ext>
             </a:extLst>
           </p:cNvPr>
@@ -19106,148 +19823,14 @@
         <p:spPr/>
         <p:txBody>
           <a:bodyPr>
-            <a:normAutofit fontScale="62500" lnSpcReduction="20000"/>
+            <a:normAutofit/>
           </a:bodyPr>
           <a:lstStyle/>
           <a:p>
             <a:r>
-              <a:rPr lang="en-IN" dirty="0"/>
+              <a:rPr lang="en-IN" sz="1800" dirty="0"/>
               <a:t>DEMO</a:t>
             </a:r>
-          </a:p>
-          <a:p>
-            <a:pPr marL="0" indent="0" algn="l" fontAlgn="base">
-              <a:buNone/>
-            </a:pPr>
-            <a:r>
-              <a:rPr lang="en-US" b="1" i="0" dirty="0">
-                <a:solidFill>
-                  <a:srgbClr val="3A3A3A"/>
-                </a:solidFill>
-                <a:effectLst/>
-                <a:latin typeface="Catamaran-SemiBold"/>
-              </a:rPr>
-              <a:t>Scatter Gather Pattern</a:t>
-            </a:r>
-            <a:endParaRPr lang="en-US" b="0" i="0" dirty="0">
-              <a:solidFill>
-                <a:srgbClr val="3A3A3A"/>
-              </a:solidFill>
-              <a:effectLst/>
-              <a:latin typeface="Catamaran-Regular"/>
-            </a:endParaRPr>
-          </a:p>
-          <a:p>
-            <a:pPr lvl="1" fontAlgn="base">
-              <a:buFont typeface="Arial" panose="020B0604020202020204" pitchFamily="34" charset="0"/>
-              <a:buChar char="•"/>
-            </a:pPr>
-            <a:r>
-              <a:rPr lang="en-US" b="0" i="0" dirty="0">
-                <a:solidFill>
-                  <a:srgbClr val="212121"/>
-                </a:solidFill>
-                <a:effectLst/>
-                <a:latin typeface="Catamaran-Regular"/>
-              </a:rPr>
-              <a:t>Now lets work on the flight-search customer facing app.</a:t>
-            </a:r>
-          </a:p>
-          <a:p>
-            <a:pPr lvl="2" fontAlgn="base"/>
-            <a:r>
-              <a:rPr lang="en-IN" b="0" i="0" dirty="0">
-                <a:solidFill>
-                  <a:srgbClr val="212121"/>
-                </a:solidFill>
-                <a:effectLst/>
-                <a:latin typeface="Catamaran-Regular"/>
-              </a:rPr>
-              <a:t>NATS bean</a:t>
-            </a:r>
-          </a:p>
-          <a:p>
-            <a:pPr lvl="2" fontAlgn="base"/>
-            <a:r>
-              <a:rPr lang="en-US" b="0" i="0" dirty="0">
-                <a:solidFill>
-                  <a:srgbClr val="212121"/>
-                </a:solidFill>
-                <a:effectLst/>
-                <a:latin typeface="Catamaran-Regular"/>
-              </a:rPr>
-              <a:t>Controller</a:t>
-            </a:r>
-          </a:p>
-          <a:p>
-            <a:pPr lvl="2" fontAlgn="base"/>
-            <a:r>
-              <a:rPr lang="en-US" b="0" i="0" dirty="0" err="1">
-                <a:solidFill>
-                  <a:srgbClr val="212121"/>
-                </a:solidFill>
-                <a:effectLst/>
-                <a:latin typeface="Catamaran-Regular"/>
-              </a:rPr>
-              <a:t>ScatterGatherService</a:t>
-            </a:r>
-            <a:endParaRPr lang="en-US" b="0" i="0" dirty="0">
-              <a:solidFill>
-                <a:srgbClr val="212121"/>
-              </a:solidFill>
-              <a:effectLst/>
-              <a:latin typeface="Catamaran-Regular"/>
-            </a:endParaRPr>
-          </a:p>
-          <a:p>
-            <a:pPr lvl="3" fontAlgn="base">
-              <a:buFont typeface="Arial" panose="020B0604020202020204" pitchFamily="34" charset="0"/>
-              <a:buChar char="•"/>
-            </a:pPr>
-            <a:r>
-              <a:rPr lang="en-US" b="0" i="0" dirty="0">
-                <a:solidFill>
-                  <a:srgbClr val="212121"/>
-                </a:solidFill>
-                <a:effectLst/>
-                <a:latin typeface="Catamaran-Regular"/>
-              </a:rPr>
-              <a:t>This class is responsible for broadcasting the request and receiving the responses</a:t>
-            </a:r>
-          </a:p>
-          <a:p>
-            <a:pPr marL="0" indent="0">
-              <a:buNone/>
-            </a:pPr>
-            <a:endParaRPr lang="en-IN" b="1" i="0" dirty="0">
-              <a:solidFill>
-                <a:srgbClr val="3A3A3A"/>
-              </a:solidFill>
-              <a:effectLst/>
-              <a:latin typeface="Catamaran-SemiBold"/>
-            </a:endParaRPr>
-          </a:p>
-          <a:p>
-            <a:pPr marL="0" indent="0">
-              <a:buNone/>
-            </a:pPr>
-            <a:r>
-              <a:rPr lang="en-IN" b="1" i="0" dirty="0">
-                <a:solidFill>
-                  <a:srgbClr val="3A3A3A"/>
-                </a:solidFill>
-                <a:effectLst/>
-                <a:latin typeface="Catamaran-SemiBold"/>
-              </a:rPr>
-              <a:t>Airline – Service</a:t>
-            </a:r>
-            <a:endParaRPr lang="en-IN" b="0" i="0" dirty="0">
-              <a:solidFill>
-                <a:srgbClr val="3A3A3A"/>
-              </a:solidFill>
-              <a:effectLst/>
-              <a:latin typeface="Catamaran-Regular"/>
-            </a:endParaRPr>
           </a:p>
           <a:p>
             <a:pPr lvl="1">
@@ -19255,159 +19838,44 @@
               <a:buChar char="•"/>
             </a:pPr>
             <a:r>
-              <a:rPr lang="en-US" dirty="0"/>
-              <a:t>This service class represents the individual airlines. It receives the request and provide the schedules along with price.</a:t>
-            </a:r>
-          </a:p>
-          <a:p>
-            <a:pPr lvl="1">
-              <a:buFont typeface="Arial" panose="020B0604020202020204" pitchFamily="34" charset="0"/>
-              <a:buChar char="•"/>
-            </a:pPr>
-            <a:r>
-              <a:rPr lang="en-US" dirty="0"/>
-              <a:t>This is a separate app. We would be running multiple instances of this app.</a:t>
-            </a:r>
-            <a:endParaRPr lang="en-IN" dirty="0"/>
-          </a:p>
-          <a:p>
-            <a:pPr marL="0" indent="0" algn="l" fontAlgn="base">
-              <a:buNone/>
-            </a:pPr>
-            <a:r>
-              <a:rPr lang="en-US" b="1" i="0" dirty="0">
-                <a:solidFill>
-                  <a:srgbClr val="3A3A3A"/>
-                </a:solidFill>
-                <a:effectLst/>
-                <a:latin typeface="Catamaran-SemiBold"/>
-              </a:rPr>
-              <a:t>Common DTO</a:t>
-            </a:r>
-            <a:endParaRPr lang="en-US" b="0" i="0" dirty="0">
-              <a:solidFill>
-                <a:srgbClr val="3A3A3A"/>
-              </a:solidFill>
-              <a:effectLst/>
-              <a:latin typeface="Catamaran-Regular"/>
-            </a:endParaRPr>
-          </a:p>
-          <a:p>
-            <a:pPr lvl="1" fontAlgn="base">
-              <a:buFont typeface="Arial" panose="020B0604020202020204" pitchFamily="34" charset="0"/>
-              <a:buChar char="•"/>
-            </a:pPr>
-            <a:r>
-              <a:rPr lang="en-US" b="0" i="0" dirty="0">
+              <a:rPr lang="en-IN" sz="1800" dirty="0"/>
+              <a:t>I send a request</a:t>
+            </a:r>
+          </a:p>
+          <a:p>
+            <a:pPr lvl="2"/>
+            <a:r>
+              <a:rPr lang="en-IN" sz="1800" dirty="0">
+                <a:hlinkClick r:id="rId2"/>
+              </a:rPr>
+              <a:t>http://localhost:8080/flight/Houston/LasVegas</a:t>
+            </a:r>
+            <a:endParaRPr lang="en-IN" sz="1800" dirty="0"/>
+          </a:p>
+          <a:p>
+            <a:pPr lvl="2"/>
+            <a:r>
+              <a:rPr lang="en-US" sz="1800" b="0" i="0" dirty="0">
                 <a:solidFill>
                   <a:srgbClr val="212121"/>
                 </a:solidFill>
                 <a:effectLst/>
-                <a:latin typeface="Catamaran-Regular"/>
-              </a:rPr>
-              <a:t>Flight Search Request</a:t>
-            </a:r>
-            <a:endParaRPr lang="en-IN" b="0" i="0" dirty="0">
-              <a:solidFill>
-                <a:srgbClr val="212121"/>
-              </a:solidFill>
-              <a:effectLst/>
-              <a:latin typeface="Catamaran-Regular"/>
-            </a:endParaRPr>
-          </a:p>
-          <a:p>
-            <a:pPr lvl="1" fontAlgn="base">
-              <a:buFont typeface="Arial" panose="020B0604020202020204" pitchFamily="34" charset="0"/>
-              <a:buChar char="•"/>
-            </a:pPr>
-            <a:r>
-              <a:rPr lang="en-IN" b="0" i="0" dirty="0">
-                <a:solidFill>
-                  <a:srgbClr val="212121"/>
-                </a:solidFill>
-                <a:effectLst/>
-                <a:latin typeface="Catamaran-Regular"/>
-              </a:rPr>
-              <a:t>Flight Schedule</a:t>
-            </a:r>
-          </a:p>
-          <a:p>
-            <a:pPr lvl="1" fontAlgn="base">
-              <a:buFont typeface="Arial" panose="020B0604020202020204" pitchFamily="34" charset="0"/>
-              <a:buChar char="•"/>
-            </a:pPr>
-            <a:r>
-              <a:rPr lang="en-IN" b="0" i="0" dirty="0">
-                <a:solidFill>
-                  <a:srgbClr val="212121"/>
-                </a:solidFill>
-                <a:effectLst/>
-                <a:latin typeface="Catamaran-Regular"/>
-              </a:rPr>
-              <a:t>Flight Search </a:t>
-            </a:r>
-            <a:r>
-              <a:rPr lang="en-IN" b="0" i="0" dirty="0" err="1">
-                <a:solidFill>
-                  <a:srgbClr val="212121"/>
-                </a:solidFill>
-                <a:effectLst/>
-                <a:latin typeface="Catamaran-Regular"/>
-              </a:rPr>
-              <a:t>Response</a:t>
-            </a:r>
-            <a:r>
-              <a:rPr lang="en-IN" b="1" i="0" dirty="0" err="1">
-                <a:solidFill>
-                  <a:srgbClr val="3A3A3A"/>
-                </a:solidFill>
-                <a:effectLst/>
-                <a:latin typeface="Catamaran-SemiBold"/>
-              </a:rPr>
-              <a:t>Airline</a:t>
-            </a:r>
-            <a:r>
-              <a:rPr lang="en-IN" b="1" i="0" dirty="0">
-                <a:solidFill>
-                  <a:srgbClr val="3A3A3A"/>
-                </a:solidFill>
-                <a:effectLst/>
-                <a:latin typeface="Catamaran-SemiBold"/>
-              </a:rPr>
-              <a:t> – Service</a:t>
-            </a:r>
-          </a:p>
-          <a:p>
-            <a:pPr marL="457200" lvl="1" indent="0" fontAlgn="base">
-              <a:buNone/>
-            </a:pPr>
-            <a:endParaRPr lang="en-IN" b="0" i="0" dirty="0">
-              <a:solidFill>
-                <a:srgbClr val="3A3A3A"/>
-              </a:solidFill>
-              <a:effectLst/>
-              <a:latin typeface="Catamaran-Regular"/>
-            </a:endParaRPr>
-          </a:p>
-          <a:p>
-            <a:pPr lvl="1" fontAlgn="base">
-              <a:buFont typeface="Arial" panose="020B0604020202020204" pitchFamily="34" charset="0"/>
-              <a:buChar char="•"/>
-            </a:pPr>
-            <a:endParaRPr lang="en-US" b="0" i="0" dirty="0">
-              <a:solidFill>
-                <a:srgbClr val="212121"/>
-              </a:solidFill>
-              <a:effectLst/>
-              <a:latin typeface="Catamaran-Regular"/>
-            </a:endParaRPr>
+              </a:rPr>
+              <a:t>I receive a response</a:t>
+            </a:r>
+          </a:p>
+          <a:p>
+            <a:pPr marL="914400" lvl="2" indent="0">
+              <a:buNone/>
+            </a:pPr>
+            <a:endParaRPr lang="en-IN" sz="1800" dirty="0"/>
           </a:p>
         </p:txBody>
       </p:sp>
     </p:spTree>
     <p:extLst>
       <p:ext uri="{BB962C8B-B14F-4D97-AF65-F5344CB8AC3E}">
-        <p14:creationId xmlns:p14="http://schemas.microsoft.com/office/powerpoint/2010/main" val="554460181"/>
+        <p14:creationId xmlns:p14="http://schemas.microsoft.com/office/powerpoint/2010/main" val="3514372764"/>
       </p:ext>
     </p:extLst>
   </p:cSld>
@@ -19436,13 +19904,7 @@
       </p:grpSpPr>
       <p:sp>
         <p:nvSpPr>
-          <p:cNvPr id="2" name="Title 1">
-            <a:extLst>
-              <a:ext uri="{FF2B5EF4-FFF2-40B4-BE49-F238E27FC236}">
-                <a16:creationId xmlns:a16="http://schemas.microsoft.com/office/drawing/2014/main" id="{54A1E61C-47F4-BA60-7DE6-B71808785D38}"/>
-              </a:ext>
-            </a:extLst>
-          </p:cNvPr>
+          <p:cNvPr id="2" name="Title 1"/>
           <p:cNvSpPr>
             <a:spLocks noGrp="1"/>
           </p:cNvSpPr>
@@ -19458,37 +19920,19 @@
           <a:lstStyle/>
           <a:p>
             <a:r>
-              <a:rPr lang="en-IN" b="1" i="0" dirty="0">
-                <a:solidFill>
-                  <a:srgbClr val="3A3A3A"/>
-                </a:solidFill>
-                <a:effectLst/>
-                <a:latin typeface="Catamaran-SemiBold"/>
-              </a:rPr>
-              <a:t>Scatter Gather Pattern</a:t>
+              <a:rPr lang="en-US" b="1" dirty="0"/>
+              <a:t>Observability Patterns</a:t>
             </a:r>
             <a:br>
-              <a:rPr lang="en-IN" b="0" i="0" dirty="0">
-                <a:solidFill>
-                  <a:srgbClr val="3A3A3A"/>
-                </a:solidFill>
-                <a:effectLst/>
-                <a:latin typeface="Catamaran-Regular"/>
-              </a:rPr>
+              <a:rPr lang="en-US" b="1" dirty="0"/>
             </a:br>
-            <a:endParaRPr lang="en-IN" dirty="0"/>
-          </a:p>
-        </p:txBody>
-      </p:sp>
-      <p:sp>
-        <p:nvSpPr>
-          <p:cNvPr id="3" name="Content Placeholder 2">
-            <a:extLst>
-              <a:ext uri="{FF2B5EF4-FFF2-40B4-BE49-F238E27FC236}">
-                <a16:creationId xmlns:a16="http://schemas.microsoft.com/office/drawing/2014/main" id="{4C5DE325-94A1-0DB6-AA99-4F3FB025B687}"/>
-              </a:ext>
-            </a:extLst>
-          </p:cNvPr>
+            <a:endParaRPr lang="en-US" dirty="0"/>
+          </a:p>
+        </p:txBody>
+      </p:sp>
+      <p:sp>
+        <p:nvSpPr>
+          <p:cNvPr id="3" name="Content Placeholder 2"/>
           <p:cNvSpPr>
             <a:spLocks noGrp="1"/>
           </p:cNvSpPr>
@@ -19498,77 +19942,38 @@
         </p:nvSpPr>
         <p:spPr/>
         <p:txBody>
-          <a:bodyPr>
-            <a:normAutofit/>
-          </a:bodyPr>
-          <a:lstStyle/>
-          <a:p>
-            <a:r>
-              <a:rPr lang="en-IN" sz="1800" dirty="0"/>
-              <a:t>DEMO</a:t>
-            </a:r>
-          </a:p>
-          <a:p>
-            <a:pPr lvl="1">
-              <a:buFont typeface="Arial" panose="020B0604020202020204" pitchFamily="34" charset="0"/>
-              <a:buChar char="•"/>
-            </a:pPr>
-            <a:r>
-              <a:rPr lang="en-IN" sz="1800" dirty="0"/>
-              <a:t>I send a request</a:t>
-            </a:r>
-          </a:p>
-          <a:p>
-            <a:pPr lvl="2"/>
-            <a:r>
-              <a:rPr lang="en-IN" sz="1800" dirty="0">
-                <a:hlinkClick r:id="rId2"/>
-              </a:rPr>
-              <a:t>http://localhost:8080/flight/Houston/LasVegas</a:t>
-            </a:r>
-            <a:endParaRPr lang="en-IN" sz="1800" dirty="0"/>
-          </a:p>
-          <a:p>
-            <a:pPr lvl="2"/>
-            <a:r>
-              <a:rPr lang="en-US" sz="1800" b="0" i="0" dirty="0">
-                <a:solidFill>
-                  <a:srgbClr val="212121"/>
-                </a:solidFill>
-                <a:effectLst/>
-              </a:rPr>
-              <a:t>I receive </a:t>
-            </a:r>
-            <a:r>
-              <a:rPr lang="en-US" sz="1800" b="0" i="0">
-                <a:solidFill>
-                  <a:srgbClr val="212121"/>
-                </a:solidFill>
-                <a:effectLst/>
-              </a:rPr>
-              <a:t>a response</a:t>
-            </a:r>
-            <a:endParaRPr lang="en-US" sz="1800" b="0" i="0" dirty="0">
-              <a:solidFill>
-                <a:srgbClr val="212121"/>
-              </a:solidFill>
-              <a:effectLst/>
-            </a:endParaRPr>
-          </a:p>
-          <a:p>
-            <a:pPr marL="914400" lvl="2" indent="0">
-              <a:buNone/>
-            </a:pPr>
-            <a:endParaRPr lang="en-IN" sz="1800" dirty="0"/>
+          <a:bodyPr/>
+          <a:lstStyle/>
+          <a:p>
+            <a:r>
+              <a:rPr lang="en-US" b="1" dirty="0"/>
+              <a:t>Log Aggregation</a:t>
+            </a:r>
+          </a:p>
+          <a:p>
+            <a:r>
+              <a:rPr lang="en-US" b="1" dirty="0"/>
+              <a:t>Performance Metrics</a:t>
+            </a:r>
+          </a:p>
+          <a:p>
+            <a:r>
+              <a:rPr lang="en-US" b="1" dirty="0"/>
+              <a:t>Distributed Tracing</a:t>
+            </a:r>
+          </a:p>
+          <a:p>
+            <a:r>
+              <a:rPr lang="en-US" b="1" dirty="0"/>
+              <a:t>Health Check</a:t>
+            </a:r>
+          </a:p>
+          <a:p>
+            <a:endParaRPr lang="en-US" dirty="0"/>
           </a:p>
         </p:txBody>
       </p:sp>
     </p:spTree>
-    <p:extLst>
-      <p:ext uri="{BB962C8B-B14F-4D97-AF65-F5344CB8AC3E}">
-        <p14:creationId xmlns:p14="http://schemas.microsoft.com/office/powerpoint/2010/main" val="3514372764"/>
-      </p:ext>
-    </p:extLst>
   </p:cSld>
   <p:clrMapOvr>
     <a:masterClrMapping/>
@@ -19612,7 +20017,7 @@
           <a:p>
             <a:r>
               <a:rPr lang="en-US" b="1" dirty="0"/>
-              <a:t>Observability Patterns</a:t>
+              <a:t>Log Aggregation</a:t>
             </a:r>
             <a:br>
               <a:rPr lang="en-US" b="1" dirty="0"/>
@@ -19633,30 +20038,54 @@
         </p:nvSpPr>
         <p:spPr/>
         <p:txBody>
-          <a:bodyPr/>
-          <a:lstStyle/>
-          <a:p>
+          <a:bodyPr>
+            <a:normAutofit fontScale="70000" lnSpcReduction="20000"/>
+          </a:bodyPr>
+          <a:lstStyle/>
+          <a:p>
+            <a:pPr>
+              <a:buNone/>
+            </a:pPr>
             <a:r>
               <a:rPr lang="en-US" b="1" dirty="0"/>
-              <a:t>Log Aggregation</a:t>
-            </a:r>
-          </a:p>
-          <a:p>
+              <a:t>Problem</a:t>
+            </a:r>
+          </a:p>
+          <a:p>
+            <a:r>
+              <a:rPr lang="en-US" dirty="0"/>
+              <a:t>Consider a use case where an application consists of multiple service instances that are running on multiple machines. Requests often span multiple service instances. Each service instance generates a log file in a standardized format. How can we understand the application behavior through logs for a particular request?</a:t>
+            </a:r>
+          </a:p>
+          <a:p>
+            <a:pPr>
+              <a:buNone/>
+            </a:pPr>
             <a:r>
               <a:rPr lang="en-US" b="1" dirty="0"/>
-              <a:t>Performance Metrics</a:t>
-            </a:r>
-          </a:p>
-          <a:p>
-            <a:r>
-              <a:rPr lang="en-US" b="1" dirty="0"/>
-              <a:t>Distributed Tracing</a:t>
-            </a:r>
-          </a:p>
-          <a:p>
-            <a:r>
-              <a:rPr lang="en-US" b="1" dirty="0"/>
-              <a:t>Health Check</a:t>
+              <a:t>Solution</a:t>
+            </a:r>
+          </a:p>
+          <a:p>
+            <a:r>
+              <a:rPr lang="en-US" dirty="0"/>
+              <a:t>We need a centralized logging service that aggregates logs from each service instance. Users can search and analyze the logs. They can configure alerts that are triggered when certain messages appear in the logs. For example, PCF does have </a:t>
+            </a:r>
+            <a:r>
+              <a:rPr lang="en-US" dirty="0" err="1"/>
+              <a:t>Loggeregator</a:t>
+            </a:r>
+            <a:r>
+              <a:rPr lang="en-US" dirty="0"/>
+              <a:t>, which collects logs from each component (router, controller, </a:t>
+            </a:r>
+            <a:r>
+              <a:rPr lang="en-US" dirty="0" err="1"/>
+              <a:t>diego</a:t>
+            </a:r>
+            <a:r>
+              <a:rPr lang="en-US" dirty="0"/>
+              <a:t>, etc...) of the PCF platform along with applications. AWS Cloud Watch also does the same.</a:t>
             </a:r>
           </a:p>
           <a:p>
@@ -19708,7 +20137,7 @@
           <a:p>
             <a:r>
               <a:rPr lang="en-US" b="1" dirty="0"/>
-              <a:t>Log Aggregation</a:t>
+              <a:t>Performance Metrics</a:t>
             </a:r>
             <a:br>
               <a:rPr lang="en-US" b="1" dirty="0"/>
@@ -19745,7 +20174,23 @@
           <a:p>
             <a:r>
               <a:rPr lang="en-US" dirty="0"/>
-              <a:t>Consider a use case where an application consists of multiple service instances that are running on multiple machines. Requests often span multiple service instances. Each service instance generates a log file in a standardized format. How can we understand the application behavior through logs for a particular request?</a:t>
+              <a:t>When the service portfolio increases due to </a:t>
+            </a:r>
+            <a:r>
+              <a:rPr lang="en-US" dirty="0" err="1"/>
+              <a:t>microservice</a:t>
+            </a:r>
+            <a:r>
+              <a:rPr lang="en-US" dirty="0"/>
+              <a:t> architecture, it becomes critical to keep a watch on the transactions so that patterns can be monitored and alerts sent when an issue happens. How should we collect metrics to monitor application </a:t>
+            </a:r>
+            <a:r>
+              <a:rPr lang="en-US" dirty="0" err="1"/>
+              <a:t>perfomance</a:t>
+            </a:r>
+            <a:r>
+              <a:rPr lang="en-US" dirty="0"/>
+              <a:t>?</a:t>
             </a:r>
           </a:p>
           <a:p>
@@ -19760,23 +20205,32 @@
           <a:p>
             <a:r>
               <a:rPr lang="en-US" dirty="0"/>
-              <a:t>We need a centralized logging service that aggregates logs from each service instance. Users can search and analyze the logs. They can configure alerts that are triggered when certain messages appear in the logs. For example, PCF does have </a:t>
+              <a:t>A metrics service is required to gather statistics about individual operations. It should aggregate the metrics of an application service, which provides reporting and alerting. There are two models for aggregating metrics:</a:t>
+            </a:r>
+          </a:p>
+          <a:p>
+            <a:r>
+              <a:rPr lang="en-US" dirty="0"/>
+              <a:t>Push — the service pushes metrics to the metrics service e.g. </a:t>
             </a:r>
             <a:r>
               <a:rPr lang="en-US" dirty="0" err="1"/>
-              <a:t>Loggeregator</a:t>
-            </a:r>
-            <a:r>
-              <a:rPr lang="en-US" dirty="0"/>
-              <a:t>, which collects logs from each component (router, controller, </a:t>
+              <a:t>NewRelic</a:t>
+            </a:r>
+            <a:r>
+              <a:rPr lang="en-US" dirty="0"/>
+              <a:t>, </a:t>
             </a:r>
             <a:r>
               <a:rPr lang="en-US" dirty="0" err="1"/>
-              <a:t>diego</a:t>
-            </a:r>
-            <a:r>
-              <a:rPr lang="en-US" dirty="0"/>
-              <a:t>, etc...) of the PCF platform along with applications. AWS Cloud Watch also does the same.</a:t>
+              <a:t>AppDynamics</a:t>
+            </a:r>
+            <a:endParaRPr lang="en-US" dirty="0"/>
+          </a:p>
+          <a:p>
+            <a:r>
+              <a:rPr lang="en-US" dirty="0"/>
+              <a:t>Pull — the metrics services pulls metrics from the service e.g. Prometheus</a:t>
             </a:r>
           </a:p>
           <a:p>
@@ -19811,7 +20265,13 @@
       </p:grpSpPr>
       <p:sp>
         <p:nvSpPr>
-          <p:cNvPr id="2" name="Title 1"/>
+          <p:cNvPr id="2" name="Title 1">
+            <a:extLst>
+              <a:ext uri="{FF2B5EF4-FFF2-40B4-BE49-F238E27FC236}">
+                <a16:creationId xmlns:a16="http://schemas.microsoft.com/office/drawing/2014/main" id="{5D3CC03D-B9BB-4FAC-9A0F-0BC58EF8860C}"/>
+              </a:ext>
+            </a:extLst>
+          </p:cNvPr>
           <p:cNvSpPr>
             <a:spLocks noGrp="1"/>
           </p:cNvSpPr>
@@ -19821,115 +20281,106 @@
         </p:nvSpPr>
         <p:spPr/>
         <p:txBody>
+          <a:bodyPr/>
+          <a:lstStyle/>
+          <a:p>
+            <a:r>
+              <a:rPr lang="en-IN" dirty="0"/>
+              <a:t>DEMO</a:t>
+            </a:r>
+          </a:p>
+        </p:txBody>
+      </p:sp>
+      <p:sp>
+        <p:nvSpPr>
+          <p:cNvPr id="3" name="Content Placeholder 2">
+            <a:extLst>
+              <a:ext uri="{FF2B5EF4-FFF2-40B4-BE49-F238E27FC236}">
+                <a16:creationId xmlns:a16="http://schemas.microsoft.com/office/drawing/2014/main" id="{6AEE99EF-2332-4DB1-5DD8-45FF83B5A3DD}"/>
+              </a:ext>
+            </a:extLst>
+          </p:cNvPr>
+          <p:cNvSpPr>
+            <a:spLocks noGrp="1"/>
+          </p:cNvSpPr>
+          <p:nvPr>
+            <p:ph idx="1"/>
+          </p:nvPr>
+        </p:nvSpPr>
+        <p:spPr/>
+        <p:txBody>
           <a:bodyPr>
-            <a:normAutofit fontScale="90000"/>
+            <a:normAutofit fontScale="47500" lnSpcReduction="20000"/>
           </a:bodyPr>
           <a:lstStyle/>
           <a:p>
             <a:r>
-              <a:rPr lang="en-US" b="1" dirty="0"/>
-              <a:t>Performance Metrics</a:t>
-            </a:r>
-            <a:br>
-              <a:rPr lang="en-US" b="1" dirty="0"/>
-            </a:br>
+              <a:rPr lang="en-US" dirty="0"/>
+              <a:t>Suppose in project, we've been building three different applications. All three applications are based on Spring Boot but have very different workloads. </a:t>
+            </a:r>
+          </a:p>
+          <a:p>
+            <a:r>
+              <a:rPr lang="en-US" dirty="0"/>
+              <a:t>They've all reached their way to the production environment and have been running steadily for quite some time now. </a:t>
+            </a:r>
+          </a:p>
+          <a:p>
+            <a:r>
+              <a:rPr lang="en-US" dirty="0"/>
+              <a:t>We do regular (weekly basis) deployments of our applications to production with bug fixes, new features, and technical improvements. </a:t>
+            </a:r>
+          </a:p>
+          <a:p>
+            <a:r>
+              <a:rPr lang="en-US" dirty="0"/>
+              <a:t>The </a:t>
+            </a:r>
+            <a:r>
+              <a:rPr lang="en-US" dirty="0" err="1"/>
+              <a:t>organisation</a:t>
+            </a:r>
+            <a:r>
+              <a:rPr lang="en-US" dirty="0"/>
+              <a:t> has a traditional infrastructure workflow in the sense that deployments to the VM instances on acceptance and production happen via the (remote hosting) provider.</a:t>
+            </a:r>
+          </a:p>
+          <a:p>
             <a:endParaRPr lang="en-US" dirty="0"/>
           </a:p>
-        </p:txBody>
-      </p:sp>
-      <p:sp>
-        <p:nvSpPr>
-          <p:cNvPr id="3" name="Content Placeholder 2"/>
-          <p:cNvSpPr>
-            <a:spLocks noGrp="1"/>
-          </p:cNvSpPr>
-          <p:nvPr>
-            <p:ph idx="1"/>
-          </p:nvPr>
-        </p:nvSpPr>
-        <p:spPr/>
-        <p:txBody>
-          <a:bodyPr>
-            <a:normAutofit fontScale="70000" lnSpcReduction="20000"/>
-          </a:bodyPr>
-          <a:lstStyle/>
-          <a:p>
-            <a:pPr>
-              <a:buNone/>
-            </a:pPr>
-            <a:r>
-              <a:rPr lang="en-US" b="1" dirty="0"/>
-              <a:t>Problem</a:t>
-            </a:r>
-          </a:p>
-          <a:p>
-            <a:r>
-              <a:rPr lang="en-US" dirty="0"/>
-              <a:t>When the service portfolio increases due to </a:t>
-            </a:r>
-            <a:r>
-              <a:rPr lang="en-US" dirty="0" err="1"/>
-              <a:t>microservice</a:t>
-            </a:r>
-            <a:r>
-              <a:rPr lang="en-US" dirty="0"/>
-              <a:t> architecture, it becomes critical to keep a watch on the transactions so that patterns can be monitored and alerts sent when an issue happens. How should we collect metrics to monitor application </a:t>
-            </a:r>
-            <a:r>
-              <a:rPr lang="en-US" dirty="0" err="1"/>
-              <a:t>perfomance</a:t>
-            </a:r>
-            <a:r>
-              <a:rPr lang="en-US" dirty="0"/>
-              <a:t>?</a:t>
-            </a:r>
-          </a:p>
-          <a:p>
-            <a:pPr>
-              <a:buNone/>
-            </a:pPr>
-            <a:r>
-              <a:rPr lang="en-US" b="1" dirty="0"/>
-              <a:t>Solution</a:t>
-            </a:r>
-          </a:p>
-          <a:p>
-            <a:r>
-              <a:rPr lang="en-US" dirty="0"/>
-              <a:t>A metrics service is required to gather statistics about individual operations. It should aggregate the metrics of an application service, which provides reporting and alerting. There are two models for aggregating metrics:</a:t>
-            </a:r>
-          </a:p>
-          <a:p>
-            <a:r>
-              <a:rPr lang="en-US" dirty="0"/>
-              <a:t>Push — the service pushes metrics to the metrics service e.g. </a:t>
-            </a:r>
-            <a:r>
-              <a:rPr lang="en-US" dirty="0" err="1"/>
-              <a:t>NewRelic</a:t>
-            </a:r>
-            <a:r>
-              <a:rPr lang="en-US" dirty="0"/>
-              <a:t>, </a:t>
-            </a:r>
-            <a:r>
-              <a:rPr lang="en-US" dirty="0" err="1"/>
-              <a:t>AppDynamics</a:t>
-            </a:r>
-            <a:endParaRPr lang="en-US" dirty="0"/>
-          </a:p>
-          <a:p>
-            <a:r>
-              <a:rPr lang="en-US" dirty="0"/>
-              <a:t>Pull — the metrics services pulls metrics from the service e.g. Prometheus</a:t>
-            </a:r>
-          </a:p>
-          <a:p>
-            <a:endParaRPr lang="en-US" dirty="0"/>
+          <a:p>
+            <a:r>
+              <a:rPr lang="en-US" dirty="0"/>
+              <a:t>The hosting provider is responsible for the uptime of the applications and therefore they keep an eye on system metrics through the usage of their own monitoring system. </a:t>
+            </a:r>
+          </a:p>
+          <a:p>
+            <a:r>
+              <a:rPr lang="en-US" dirty="0"/>
+              <a:t>As a team, we are able to look in the system, but it doesn't say much about the internals of our application. </a:t>
+            </a:r>
+          </a:p>
+          <a:p>
+            <a:r>
+              <a:rPr lang="en-US" dirty="0"/>
+              <a:t>In the past, we've asked to add some additional metrics to their system, but the system isn't that easy to configure with additional metrics. </a:t>
+            </a:r>
+          </a:p>
+          <a:p>
+            <a:r>
+              <a:rPr lang="en-US" dirty="0"/>
+              <a:t>To us as a team runtime statistics about our applications and the impact our changes have on the overall health are crucial to understanding the impact of our work.</a:t>
+            </a:r>
+            <a:endParaRPr lang="en-IN" dirty="0"/>
           </a:p>
         </p:txBody>
       </p:sp>
     </p:spTree>
+    <p:extLst>
+      <p:ext uri="{BB962C8B-B14F-4D97-AF65-F5344CB8AC3E}">
+        <p14:creationId xmlns:p14="http://schemas.microsoft.com/office/powerpoint/2010/main" val="2493691273"/>
+      </p:ext>
+    </p:extLst>
   </p:cSld>
   <p:clrMapOvr>
     <a:masterClrMapping/>
@@ -19956,7 +20407,13 @@
       </p:grpSpPr>
       <p:sp>
         <p:nvSpPr>
-          <p:cNvPr id="2" name="Title 1"/>
+          <p:cNvPr id="2" name="Title 1">
+            <a:extLst>
+              <a:ext uri="{FF2B5EF4-FFF2-40B4-BE49-F238E27FC236}">
+                <a16:creationId xmlns:a16="http://schemas.microsoft.com/office/drawing/2014/main" id="{5D3CC03D-B9BB-4FAC-9A0F-0BC58EF8860C}"/>
+              </a:ext>
+            </a:extLst>
+          </p:cNvPr>
           <p:cNvSpPr>
             <a:spLocks noGrp="1"/>
           </p:cNvSpPr>
@@ -19966,125 +20423,99 @@
         </p:nvSpPr>
         <p:spPr/>
         <p:txBody>
+          <a:bodyPr/>
+          <a:lstStyle/>
+          <a:p>
+            <a:r>
+              <a:rPr lang="en-IN" dirty="0"/>
+              <a:t>DEMO</a:t>
+            </a:r>
+          </a:p>
+        </p:txBody>
+      </p:sp>
+      <p:sp>
+        <p:nvSpPr>
+          <p:cNvPr id="3" name="Content Placeholder 2">
+            <a:extLst>
+              <a:ext uri="{FF2B5EF4-FFF2-40B4-BE49-F238E27FC236}">
+                <a16:creationId xmlns:a16="http://schemas.microsoft.com/office/drawing/2014/main" id="{6AEE99EF-2332-4DB1-5DD8-45FF83B5A3DD}"/>
+              </a:ext>
+            </a:extLst>
+          </p:cNvPr>
+          <p:cNvSpPr>
+            <a:spLocks noGrp="1"/>
+          </p:cNvSpPr>
+          <p:nvPr>
+            <p:ph idx="1"/>
+          </p:nvPr>
+        </p:nvSpPr>
+        <p:spPr/>
+        <p:txBody>
           <a:bodyPr>
-            <a:normAutofit fontScale="90000"/>
+            <a:normAutofit fontScale="77500" lnSpcReduction="20000"/>
           </a:bodyPr>
           <a:lstStyle/>
           <a:p>
+            <a:pPr marL="0" indent="0">
+              <a:buNone/>
+            </a:pPr>
             <a:r>
               <a:rPr lang="en-US" b="1" dirty="0"/>
-              <a:t>Distributed Tracing</a:t>
-            </a:r>
-            <a:br>
-              <a:rPr lang="en-US" b="1" dirty="0"/>
-            </a:br>
+              <a:t>Spring Boot Actuator and Micrometer</a:t>
+            </a:r>
+          </a:p>
+          <a:p>
+            <a:pPr marL="0" indent="0">
+              <a:buNone/>
+            </a:pPr>
+            <a:r>
+              <a:rPr lang="en-US" dirty="0"/>
+              <a:t>If we use Spring Boot before we've probably heard of Spring Boot Actuator. </a:t>
+            </a:r>
+          </a:p>
+          <a:p>
+            <a:r>
+              <a:rPr lang="en-US" dirty="0"/>
+              <a:t>Actuator is a set of features that help you monitor and manage your application when it moves away from your local development environment and onto a test, staging or production environment. </a:t>
+            </a:r>
+          </a:p>
+          <a:p>
+            <a:r>
+              <a:rPr lang="en-US" dirty="0"/>
+              <a:t>It helps expose operational information about the running application - health, metrics, audit entries, scheduled task, env settings, etc. You can query the information via either several HTTP endpoints or JMX beans. </a:t>
+            </a:r>
+          </a:p>
+          <a:p>
+            <a:r>
+              <a:rPr lang="en-US" dirty="0"/>
+              <a:t>Being able to view the information is useful, but it's hard to spot trends or see the </a:t>
+            </a:r>
+            <a:r>
+              <a:rPr lang="en-US" dirty="0" err="1"/>
+              <a:t>behaviour</a:t>
+            </a:r>
+            <a:r>
+              <a:rPr lang="en-US" dirty="0"/>
+              <a:t> over a period of time.</a:t>
+            </a:r>
+          </a:p>
+          <a:p>
             <a:endParaRPr lang="en-US" dirty="0"/>
           </a:p>
-        </p:txBody>
-      </p:sp>
-      <p:sp>
-        <p:nvSpPr>
-          <p:cNvPr id="3" name="Content Placeholder 2"/>
-          <p:cNvSpPr>
-            <a:spLocks noGrp="1"/>
-          </p:cNvSpPr>
-          <p:nvPr>
-            <p:ph idx="1"/>
-          </p:nvPr>
-        </p:nvSpPr>
-        <p:spPr/>
-        <p:txBody>
-          <a:bodyPr>
-            <a:normAutofit fontScale="62500" lnSpcReduction="20000"/>
-          </a:bodyPr>
-          <a:lstStyle/>
-          <a:p>
-            <a:pPr>
-              <a:buNone/>
-            </a:pPr>
-            <a:r>
-              <a:rPr lang="en-US" b="1" dirty="0"/>
-              <a:t>Problem</a:t>
-            </a:r>
-          </a:p>
-          <a:p>
-            <a:r>
-              <a:rPr lang="en-US" dirty="0"/>
-              <a:t>In </a:t>
-            </a:r>
-            <a:r>
-              <a:rPr lang="en-US" dirty="0" err="1"/>
-              <a:t>microservice</a:t>
-            </a:r>
-            <a:r>
-              <a:rPr lang="en-US" dirty="0"/>
-              <a:t> architecture, requests often span multiple services. Each service handles a request by performing one or more operations across multiple services. Then, how do we trace a request end-to-end to troubleshoot the problem?</a:t>
-            </a:r>
-          </a:p>
-          <a:p>
-            <a:pPr>
-              <a:buNone/>
-            </a:pPr>
-            <a:r>
-              <a:rPr lang="en-US" b="1" dirty="0"/>
-              <a:t>Solution</a:t>
-            </a:r>
-          </a:p>
-          <a:p>
-            <a:r>
-              <a:rPr lang="en-US" dirty="0"/>
-              <a:t>We need a service which</a:t>
-            </a:r>
-          </a:p>
-          <a:p>
-            <a:r>
-              <a:rPr lang="en-US" dirty="0"/>
-              <a:t>Assigns each external request a unique external request id.</a:t>
-            </a:r>
-          </a:p>
-          <a:p>
-            <a:r>
-              <a:rPr lang="en-US" dirty="0"/>
-              <a:t>Passes the external request id to all services.</a:t>
-            </a:r>
-          </a:p>
-          <a:p>
-            <a:r>
-              <a:rPr lang="en-US" dirty="0"/>
-              <a:t>Includes the external request id in all log messages.</a:t>
-            </a:r>
-          </a:p>
-          <a:p>
-            <a:r>
-              <a:rPr lang="en-US" dirty="0"/>
-              <a:t>Records information (e.g. start time, end time) about the requests and operations performed when handling an external request in a centralized service.</a:t>
-            </a:r>
-          </a:p>
-          <a:p>
-            <a:r>
-              <a:rPr lang="en-US" dirty="0"/>
-              <a:t>Spring Cloud </a:t>
-            </a:r>
-            <a:r>
-              <a:rPr lang="en-US" dirty="0" err="1"/>
-              <a:t>Slueth</a:t>
-            </a:r>
-            <a:r>
-              <a:rPr lang="en-US" dirty="0"/>
-              <a:t>, along with </a:t>
-            </a:r>
-            <a:r>
-              <a:rPr lang="en-US" dirty="0" err="1"/>
-              <a:t>Zipkin</a:t>
-            </a:r>
-            <a:r>
-              <a:rPr lang="en-US" dirty="0"/>
-              <a:t> server, is a common implementation.</a:t>
-            </a:r>
+          <a:p>
+            <a:endParaRPr lang="en-US" dirty="0"/>
+          </a:p>
+          <a:p>
+            <a:endParaRPr lang="en-IN" dirty="0"/>
           </a:p>
         </p:txBody>
       </p:sp>
     </p:spTree>
+    <p:extLst>
+      <p:ext uri="{BB962C8B-B14F-4D97-AF65-F5344CB8AC3E}">
+        <p14:creationId xmlns:p14="http://schemas.microsoft.com/office/powerpoint/2010/main" val="472641906"/>
+      </p:ext>
+    </p:extLst>
   </p:cSld>
   <p:clrMapOvr>
     <a:masterClrMapping/>
@@ -20111,7 +20542,13 @@
       </p:grpSpPr>
       <p:sp>
         <p:nvSpPr>
-          <p:cNvPr id="2" name="Title 1"/>
+          <p:cNvPr id="2" name="Title 1">
+            <a:extLst>
+              <a:ext uri="{FF2B5EF4-FFF2-40B4-BE49-F238E27FC236}">
+                <a16:creationId xmlns:a16="http://schemas.microsoft.com/office/drawing/2014/main" id="{5D3CC03D-B9BB-4FAC-9A0F-0BC58EF8860C}"/>
+              </a:ext>
+            </a:extLst>
+          </p:cNvPr>
           <p:cNvSpPr>
             <a:spLocks noGrp="1"/>
           </p:cNvSpPr>
@@ -20121,88 +20558,140 @@
         </p:nvSpPr>
         <p:spPr/>
         <p:txBody>
+          <a:bodyPr/>
+          <a:lstStyle/>
+          <a:p>
+            <a:r>
+              <a:rPr lang="en-IN" dirty="0"/>
+              <a:t>DEMO</a:t>
+            </a:r>
+          </a:p>
+        </p:txBody>
+      </p:sp>
+      <p:sp>
+        <p:nvSpPr>
+          <p:cNvPr id="3" name="Content Placeholder 2">
+            <a:extLst>
+              <a:ext uri="{FF2B5EF4-FFF2-40B4-BE49-F238E27FC236}">
+                <a16:creationId xmlns:a16="http://schemas.microsoft.com/office/drawing/2014/main" id="{6AEE99EF-2332-4DB1-5DD8-45FF83B5A3DD}"/>
+              </a:ext>
+            </a:extLst>
+          </p:cNvPr>
+          <p:cNvSpPr>
+            <a:spLocks noGrp="1"/>
+          </p:cNvSpPr>
+          <p:nvPr>
+            <p:ph idx="1"/>
+          </p:nvPr>
+        </p:nvSpPr>
+        <p:spPr/>
+        <p:txBody>
           <a:bodyPr>
-            <a:normAutofit fontScale="90000"/>
+            <a:normAutofit fontScale="70000" lnSpcReduction="20000"/>
           </a:bodyPr>
           <a:lstStyle/>
           <a:p>
+            <a:pPr marL="0" indent="0">
+              <a:buNone/>
+            </a:pPr>
             <a:r>
               <a:rPr lang="en-US" b="1" dirty="0"/>
-              <a:t>Health Check</a:t>
-            </a:r>
-            <a:br>
+              <a:t>Prometheus</a:t>
+            </a:r>
+          </a:p>
+          <a:p>
+            <a:pPr marL="0" indent="0">
+              <a:buNone/>
+            </a:pPr>
+            <a:r>
               <a:rPr lang="en-US" b="1" dirty="0"/>
-            </a:br>
+              <a:t>Prometheus</a:t>
+            </a:r>
+            <a:r>
+              <a:rPr lang="en-US" dirty="0"/>
+              <a:t> is an open-source system monitoring and alerting toolkit originally built at </a:t>
+            </a:r>
+            <a:r>
+              <a:rPr lang="en-US" b="1" dirty="0"/>
+              <a:t>SoundCloud</a:t>
+            </a:r>
+            <a:r>
+              <a:rPr lang="en-US" dirty="0"/>
+              <a:t> and now part of the </a:t>
+            </a:r>
+            <a:r>
+              <a:rPr lang="en-US" b="1" dirty="0"/>
+              <a:t>Cloud Native Computing Foundation</a:t>
+            </a:r>
+            <a:r>
+              <a:rPr lang="en-US" dirty="0"/>
+              <a:t>. Some of the features that appealed to us were:</a:t>
+            </a:r>
+          </a:p>
+          <a:p>
+            <a:pPr marL="0" indent="0">
+              <a:buNone/>
+            </a:pPr>
             <a:endParaRPr lang="en-US" dirty="0"/>
           </a:p>
-        </p:txBody>
-      </p:sp>
-      <p:sp>
-        <p:nvSpPr>
-          <p:cNvPr id="3" name="Content Placeholder 2"/>
-          <p:cNvSpPr>
-            <a:spLocks noGrp="1"/>
-          </p:cNvSpPr>
-          <p:nvPr>
-            <p:ph idx="1"/>
-          </p:nvPr>
-        </p:nvSpPr>
-        <p:spPr/>
-        <p:txBody>
-          <a:bodyPr>
-            <a:normAutofit fontScale="77500" lnSpcReduction="20000"/>
-          </a:bodyPr>
-          <a:lstStyle/>
-          <a:p>
-            <a:pPr>
-              <a:buNone/>
-            </a:pPr>
-            <a:r>
-              <a:rPr lang="en-US" b="1" dirty="0"/>
-              <a:t>Problem</a:t>
-            </a:r>
-          </a:p>
-          <a:p>
-            <a:r>
-              <a:rPr lang="en-US" dirty="0"/>
-              <a:t>When </a:t>
+          <a:p>
+            <a:r>
+              <a:rPr lang="en-US" dirty="0"/>
+              <a:t>No reliance on distributed storage; single server nodes are autonomous.</a:t>
+            </a:r>
+          </a:p>
+          <a:p>
+            <a:r>
+              <a:rPr lang="en-US" dirty="0"/>
+              <a:t>Time-series collection happens via a pull model over HTTP.</a:t>
+            </a:r>
+          </a:p>
+          <a:p>
+            <a:r>
+              <a:rPr lang="en-US" dirty="0"/>
+              <a:t>Targets are discovered via service discovery or static configuration.</a:t>
+            </a:r>
+          </a:p>
+          <a:p>
+            <a:r>
+              <a:rPr lang="en-US" dirty="0"/>
+              <a:t>Multiple modes of graphing and dashboarding support.</a:t>
+            </a:r>
+          </a:p>
+          <a:p>
+            <a:pPr marL="0" indent="0">
+              <a:buNone/>
+            </a:pPr>
+            <a:r>
+              <a:rPr lang="en-US" dirty="0"/>
+              <a:t>Prometheus uses a file called </a:t>
             </a:r>
             <a:r>
               <a:rPr lang="en-US" dirty="0" err="1"/>
-              <a:t>microservice</a:t>
-            </a:r>
-            <a:r>
-              <a:rPr lang="en-US" dirty="0"/>
-              <a:t> architecture has been implemented, there is a chance that a service might be up but not able to handle transactions. In that case, how do you ensure a request doesn't go to those failed instances? With a load balancing pattern implementation.</a:t>
-            </a:r>
-          </a:p>
-          <a:p>
-            <a:pPr>
-              <a:buNone/>
-            </a:pPr>
-            <a:r>
-              <a:rPr lang="en-US" b="1" dirty="0"/>
-              <a:t>Solution</a:t>
-            </a:r>
-          </a:p>
-          <a:p>
-            <a:r>
-              <a:rPr lang="en-US" dirty="0"/>
-              <a:t>Each service needs to have an endpoint which can be used to check the health of the application, such as /health. This API should o check the status of the host, the connection to other services/infrastructure, and any specific logic.</a:t>
-            </a:r>
-          </a:p>
-          <a:p>
-            <a:r>
-              <a:rPr lang="en-US" dirty="0"/>
-              <a:t>Spring Boot Actuator does implement a /health endpoint and the implementation can be customized, as well.</a:t>
+              <a:t>prometheus.yml</a:t>
+            </a:r>
+            <a:r>
+              <a:rPr lang="en-US" dirty="0"/>
+              <a:t> as its main configuration file. Within the configuration file, you can specify where it can find the targets it needs to monitor, specify recording rules and alerting rules.</a:t>
             </a:r>
           </a:p>
           <a:p>
             <a:endParaRPr lang="en-US" dirty="0"/>
           </a:p>
+          <a:p>
+            <a:endParaRPr lang="en-US" dirty="0"/>
+          </a:p>
+          <a:p>
+            <a:endParaRPr lang="en-IN" dirty="0"/>
+          </a:p>
         </p:txBody>
       </p:sp>
     </p:spTree>
+    <p:extLst>
+      <p:ext uri="{BB962C8B-B14F-4D97-AF65-F5344CB8AC3E}">
+        <p14:creationId xmlns:p14="http://schemas.microsoft.com/office/powerpoint/2010/main" val="2727863957"/>
+      </p:ext>
+    </p:extLst>
   </p:cSld>
   <p:clrMapOvr>
     <a:masterClrMapping/>
@@ -20229,7 +20718,13 @@
       </p:grpSpPr>
       <p:sp>
         <p:nvSpPr>
-          <p:cNvPr id="2" name="Title 1"/>
+          <p:cNvPr id="2" name="Title 1">
+            <a:extLst>
+              <a:ext uri="{FF2B5EF4-FFF2-40B4-BE49-F238E27FC236}">
+                <a16:creationId xmlns:a16="http://schemas.microsoft.com/office/drawing/2014/main" id="{5D3CC03D-B9BB-4FAC-9A0F-0BC58EF8860C}"/>
+              </a:ext>
+            </a:extLst>
+          </p:cNvPr>
           <p:cNvSpPr>
             <a:spLocks noGrp="1"/>
           </p:cNvSpPr>
@@ -20239,66 +20734,133 @@
         </p:nvSpPr>
         <p:spPr/>
         <p:txBody>
+          <a:bodyPr/>
+          <a:lstStyle/>
+          <a:p>
+            <a:r>
+              <a:rPr lang="en-IN" dirty="0"/>
+              <a:t>DEMO</a:t>
+            </a:r>
+          </a:p>
+        </p:txBody>
+      </p:sp>
+      <p:sp>
+        <p:nvSpPr>
+          <p:cNvPr id="3" name="Content Placeholder 2">
+            <a:extLst>
+              <a:ext uri="{FF2B5EF4-FFF2-40B4-BE49-F238E27FC236}">
+                <a16:creationId xmlns:a16="http://schemas.microsoft.com/office/drawing/2014/main" id="{6AEE99EF-2332-4DB1-5DD8-45FF83B5A3DD}"/>
+              </a:ext>
+            </a:extLst>
+          </p:cNvPr>
+          <p:cNvSpPr>
+            <a:spLocks noGrp="1"/>
+          </p:cNvSpPr>
+          <p:nvPr>
+            <p:ph idx="1"/>
+          </p:nvPr>
+        </p:nvSpPr>
+        <p:spPr/>
+        <p:txBody>
           <a:bodyPr>
-            <a:normAutofit fontScale="90000"/>
+            <a:normAutofit fontScale="62500" lnSpcReduction="20000"/>
           </a:bodyPr>
           <a:lstStyle/>
           <a:p>
+            <a:pPr marL="0" indent="0">
+              <a:buNone/>
+            </a:pPr>
             <a:r>
               <a:rPr lang="en-US" b="1" dirty="0"/>
-              <a:t>Cross-Cutting Concern Patterns</a:t>
-            </a:r>
-            <a:br>
-              <a:rPr lang="en-US" b="1" dirty="0"/>
-            </a:br>
+              <a:t>Prometheus</a:t>
+            </a:r>
+          </a:p>
+          <a:p>
+            <a:r>
+              <a:rPr lang="en-US" dirty="0"/>
+              <a:t>The following example shows a configuration with a set of statics targets for test and staging environments. You can decide to monitor all environments within one Prometheus instance, but you could of course also use a separate Prometheus instance for monitoring just the production environment.</a:t>
+            </a:r>
+          </a:p>
+          <a:p>
+            <a:r>
+              <a:rPr lang="en-US" dirty="0"/>
+              <a:t>Look </a:t>
+            </a:r>
+            <a:r>
+              <a:rPr lang="en-US" dirty="0" err="1"/>
+              <a:t>yaml</a:t>
+            </a:r>
+            <a:r>
+              <a:rPr lang="en-US" dirty="0"/>
+              <a:t> from project repo</a:t>
+            </a:r>
+          </a:p>
+          <a:p>
+            <a:r>
+              <a:rPr lang="en-US" dirty="0"/>
+              <a:t>As we can see the configuration is pretty simple. We can add specific labels to the targets which can, later on, be used for querying, filtering, and creating a dashboard based upon the information stored within Prometheus. If we want to get started quickly with Prometheus and have Docker on our environment we can use the official docker Prometheus image by running the following command and provide a custom configuration from your host machine by running:</a:t>
+            </a:r>
+          </a:p>
+          <a:p>
+            <a:r>
+              <a:rPr lang="en-US" b="1" i="1" dirty="0"/>
+              <a:t>$ docker run -p 9090:9090 -v /</a:t>
+            </a:r>
+            <a:r>
+              <a:rPr lang="en-US" b="1" i="1" dirty="0" err="1"/>
+              <a:t>tmp</a:t>
+            </a:r>
+            <a:r>
+              <a:rPr lang="en-US" b="1" i="1" dirty="0"/>
+              <a:t>/</a:t>
+            </a:r>
+            <a:r>
+              <a:rPr lang="en-US" b="1" i="1" dirty="0" err="1"/>
+              <a:t>prometheus.yml</a:t>
+            </a:r>
+            <a:r>
+              <a:rPr lang="en-US" b="1" i="1" dirty="0"/>
+              <a:t>:/</a:t>
+            </a:r>
+            <a:r>
+              <a:rPr lang="en-US" b="1" i="1" dirty="0" err="1"/>
+              <a:t>etc</a:t>
+            </a:r>
+            <a:r>
+              <a:rPr lang="en-US" b="1" i="1" dirty="0"/>
+              <a:t>/</a:t>
+            </a:r>
+            <a:r>
+              <a:rPr lang="en-US" b="1" i="1" dirty="0" err="1"/>
+              <a:t>prometheus</a:t>
+            </a:r>
+            <a:r>
+              <a:rPr lang="en-US" b="1" i="1" dirty="0"/>
+              <a:t>/</a:t>
+            </a:r>
+            <a:r>
+              <a:rPr lang="en-US" b="1" i="1" dirty="0" err="1"/>
+              <a:t>prometheus.yml</a:t>
+            </a:r>
+            <a:r>
+              <a:rPr lang="en-US" b="1" i="1" dirty="0"/>
+              <a:t> prom/prometheus:v2.24.1</a:t>
+            </a:r>
+          </a:p>
+          <a:p>
             <a:endParaRPr lang="en-US" dirty="0"/>
           </a:p>
-        </p:txBody>
-      </p:sp>
-      <p:sp>
-        <p:nvSpPr>
-          <p:cNvPr id="3" name="Content Placeholder 2"/>
-          <p:cNvSpPr>
-            <a:spLocks noGrp="1"/>
-          </p:cNvSpPr>
-          <p:nvPr>
-            <p:ph idx="1"/>
-          </p:nvPr>
-        </p:nvSpPr>
-        <p:spPr/>
-        <p:txBody>
-          <a:bodyPr/>
-          <a:lstStyle/>
-          <a:p>
-            <a:r>
-              <a:rPr lang="en-US" b="1" dirty="0"/>
-              <a:t>External Configuration</a:t>
-            </a:r>
-          </a:p>
-          <a:p>
-            <a:r>
-              <a:rPr lang="en-US" b="1" dirty="0"/>
-              <a:t>Service Discovery Pattern</a:t>
-            </a:r>
-          </a:p>
-          <a:p>
-            <a:r>
-              <a:rPr lang="en-US" b="1" dirty="0"/>
-              <a:t>Circuit Breaker Pattern</a:t>
-            </a:r>
-          </a:p>
-          <a:p>
-            <a:r>
-              <a:rPr lang="en-US" b="1" dirty="0"/>
-              <a:t>Blue-Green Deployment Pattern</a:t>
-            </a:r>
-          </a:p>
-          <a:p>
-            <a:endParaRPr lang="en-US" dirty="0"/>
+          <a:p>
+            <a:endParaRPr lang="en-IN" dirty="0"/>
           </a:p>
         </p:txBody>
       </p:sp>
     </p:spTree>
+    <p:extLst>
+      <p:ext uri="{BB962C8B-B14F-4D97-AF65-F5344CB8AC3E}">
+        <p14:creationId xmlns:p14="http://schemas.microsoft.com/office/powerpoint/2010/main" val="2058876812"/>
+      </p:ext>
+    </p:extLst>
   </p:cSld>
   <p:clrMapOvr>
     <a:masterClrMapping/>
@@ -20426,7 +20988,13 @@
       </p:grpSpPr>
       <p:sp>
         <p:nvSpPr>
-          <p:cNvPr id="2" name="Title 1"/>
+          <p:cNvPr id="2" name="Title 1">
+            <a:extLst>
+              <a:ext uri="{FF2B5EF4-FFF2-40B4-BE49-F238E27FC236}">
+                <a16:creationId xmlns:a16="http://schemas.microsoft.com/office/drawing/2014/main" id="{5D3CC03D-B9BB-4FAC-9A0F-0BC58EF8860C}"/>
+              </a:ext>
+            </a:extLst>
+          </p:cNvPr>
           <p:cNvSpPr>
             <a:spLocks noGrp="1"/>
           </p:cNvSpPr>
@@ -20436,96 +21004,115 @@
         </p:nvSpPr>
         <p:spPr/>
         <p:txBody>
+          <a:bodyPr/>
+          <a:lstStyle/>
+          <a:p>
+            <a:r>
+              <a:rPr lang="en-IN" dirty="0"/>
+              <a:t>DEMO</a:t>
+            </a:r>
+          </a:p>
+        </p:txBody>
+      </p:sp>
+      <p:sp>
+        <p:nvSpPr>
+          <p:cNvPr id="3" name="Content Placeholder 2">
+            <a:extLst>
+              <a:ext uri="{FF2B5EF4-FFF2-40B4-BE49-F238E27FC236}">
+                <a16:creationId xmlns:a16="http://schemas.microsoft.com/office/drawing/2014/main" id="{6AEE99EF-2332-4DB1-5DD8-45FF83B5A3DD}"/>
+              </a:ext>
+            </a:extLst>
+          </p:cNvPr>
+          <p:cNvSpPr>
+            <a:spLocks noGrp="1"/>
+          </p:cNvSpPr>
+          <p:nvPr>
+            <p:ph idx="1"/>
+          </p:nvPr>
+        </p:nvSpPr>
+        <p:spPr/>
+        <p:txBody>
           <a:bodyPr>
-            <a:normAutofit fontScale="90000"/>
+            <a:normAutofit/>
           </a:bodyPr>
           <a:lstStyle/>
           <a:p>
-            <a:r>
-              <a:rPr lang="en-US" b="1" dirty="0"/>
-              <a:t>External Configuration</a:t>
-            </a:r>
-            <a:br>
-              <a:rPr lang="en-US" b="1" dirty="0"/>
-            </a:br>
-            <a:endParaRPr lang="en-US" dirty="0"/>
-          </a:p>
-        </p:txBody>
-      </p:sp>
-      <p:sp>
-        <p:nvSpPr>
-          <p:cNvPr id="3" name="Content Placeholder 2"/>
-          <p:cNvSpPr>
-            <a:spLocks noGrp="1"/>
-          </p:cNvSpPr>
-          <p:nvPr>
-            <p:ph idx="1"/>
-          </p:nvPr>
-        </p:nvSpPr>
-        <p:spPr/>
-        <p:txBody>
-          <a:bodyPr>
-            <a:normAutofit fontScale="70000" lnSpcReduction="20000"/>
-          </a:bodyPr>
-          <a:lstStyle/>
-          <a:p>
-            <a:pPr>
-              <a:buNone/>
-            </a:pPr>
-            <a:r>
-              <a:rPr lang="en-US" b="1" dirty="0"/>
-              <a:t>Problem</a:t>
-            </a:r>
-          </a:p>
-          <a:p>
-            <a:r>
-              <a:rPr lang="en-US" dirty="0"/>
-              <a:t>A service typically calls other services and databases as well. For each environment like dev, QA, UAT, prod, the endpoint URL or some configuration properties might be different. A change in any of those properties might require a re-build and re-deploy of the service. How do we avoid code modification for configuration changes?</a:t>
-            </a:r>
-          </a:p>
-          <a:p>
-            <a:pPr>
-              <a:buNone/>
-            </a:pPr>
-            <a:r>
-              <a:rPr lang="en-US" b="1" dirty="0"/>
-              <a:t>Solution</a:t>
-            </a:r>
-          </a:p>
-          <a:p>
-            <a:r>
-              <a:rPr lang="en-US" dirty="0"/>
-              <a:t>Externalize all the configuration, including endpoint URLs and credentials. The application should load them either at startup or on the fly.</a:t>
-            </a:r>
-          </a:p>
-          <a:p>
-            <a:r>
-              <a:rPr lang="en-US" dirty="0"/>
-              <a:t>Spring Cloud </a:t>
-            </a:r>
-            <a:r>
-              <a:rPr lang="en-US" dirty="0" err="1"/>
-              <a:t>config</a:t>
-            </a:r>
-            <a:r>
-              <a:rPr lang="en-US" dirty="0"/>
-              <a:t> server provides the option to externalize the properties to </a:t>
-            </a:r>
-            <a:r>
-              <a:rPr lang="en-US" dirty="0" err="1"/>
-              <a:t>GitHub</a:t>
-            </a:r>
-            <a:r>
-              <a:rPr lang="en-US" dirty="0"/>
-              <a:t> and load them as environment properties. These can be accessed by the application on startup or can be refreshed without a server restart.</a:t>
-            </a:r>
-          </a:p>
-          <a:p>
-            <a:endParaRPr lang="en-US" dirty="0"/>
-          </a:p>
-        </p:txBody>
-      </p:sp>
+            <a:pPr marL="0" indent="0">
+              <a:buNone/>
+            </a:pPr>
+            <a:r>
+              <a:rPr lang="en-US" sz="1600" b="1" dirty="0"/>
+              <a:t>Prometheus</a:t>
+            </a:r>
+          </a:p>
+          <a:p>
+            <a:pPr algn="l"/>
+            <a:r>
+              <a:rPr lang="en-US" sz="1600" b="0" i="0" dirty="0">
+                <a:solidFill>
+                  <a:srgbClr val="222635"/>
+                </a:solidFill>
+                <a:effectLst/>
+              </a:rPr>
+              <a:t>In the  example, we bind-mount the main Prometheus configuration file from the host system.</a:t>
+            </a:r>
+          </a:p>
+          <a:p>
+            <a:pPr algn="l"/>
+            <a:r>
+              <a:rPr lang="en-US" sz="1600" b="0" i="0" dirty="0">
+                <a:solidFill>
+                  <a:srgbClr val="222635"/>
+                </a:solidFill>
+                <a:effectLst/>
+              </a:rPr>
+              <a:t>To get an overview of the toolset surrounding Prometheus, take a look at the following diagram.</a:t>
+            </a:r>
+          </a:p>
+          <a:p>
+            <a:endParaRPr lang="en-US" sz="1600" dirty="0"/>
+          </a:p>
+          <a:p>
+            <a:endParaRPr lang="en-IN" sz="1600" dirty="0"/>
+          </a:p>
+        </p:txBody>
+      </p:sp>
+      <p:pic>
+        <p:nvPicPr>
+          <p:cNvPr id="5" name="Picture 4">
+            <a:extLst>
+              <a:ext uri="{FF2B5EF4-FFF2-40B4-BE49-F238E27FC236}">
+                <a16:creationId xmlns:a16="http://schemas.microsoft.com/office/drawing/2014/main" id="{4760BE5D-39A6-65EA-041C-A0A58BBF3B6D}"/>
+              </a:ext>
+            </a:extLst>
+          </p:cNvPr>
+          <p:cNvPicPr>
+            <a:picLocks noChangeAspect="1"/>
+          </p:cNvPicPr>
+          <p:nvPr/>
+        </p:nvPicPr>
+        <p:blipFill>
+          <a:blip r:embed="rId3"/>
+          <a:stretch>
+            <a:fillRect/>
+          </a:stretch>
+        </p:blipFill>
+        <p:spPr>
+          <a:xfrm>
+            <a:off x="1835696" y="2839252"/>
+            <a:ext cx="6611221" cy="3968690"/>
+          </a:xfrm>
+          <a:prstGeom prst="rect">
+            <a:avLst/>
+          </a:prstGeom>
+        </p:spPr>
+      </p:pic>
     </p:spTree>
+    <p:extLst>
+      <p:ext uri="{BB962C8B-B14F-4D97-AF65-F5344CB8AC3E}">
+        <p14:creationId xmlns:p14="http://schemas.microsoft.com/office/powerpoint/2010/main" val="4137907027"/>
+      </p:ext>
+    </p:extLst>
   </p:cSld>
   <p:clrMapOvr>
     <a:masterClrMapping/>
@@ -20552,7 +21139,13 @@
       </p:grpSpPr>
       <p:sp>
         <p:nvSpPr>
-          <p:cNvPr id="2" name="Title 1"/>
+          <p:cNvPr id="2" name="Title 1">
+            <a:extLst>
+              <a:ext uri="{FF2B5EF4-FFF2-40B4-BE49-F238E27FC236}">
+                <a16:creationId xmlns:a16="http://schemas.microsoft.com/office/drawing/2014/main" id="{134E5F60-9DDB-D6E2-17DE-77EF0A7DCF7B}"/>
+              </a:ext>
+            </a:extLst>
+          </p:cNvPr>
           <p:cNvSpPr>
             <a:spLocks noGrp="1"/>
           </p:cNvSpPr>
@@ -20562,111 +21155,111 @@
         </p:nvSpPr>
         <p:spPr/>
         <p:txBody>
+          <a:bodyPr/>
+          <a:lstStyle/>
+          <a:p>
+            <a:r>
+              <a:rPr lang="en-IN" dirty="0"/>
+              <a:t>DEMO</a:t>
+            </a:r>
+          </a:p>
+        </p:txBody>
+      </p:sp>
+      <p:sp>
+        <p:nvSpPr>
+          <p:cNvPr id="3" name="Content Placeholder 2">
+            <a:extLst>
+              <a:ext uri="{FF2B5EF4-FFF2-40B4-BE49-F238E27FC236}">
+                <a16:creationId xmlns:a16="http://schemas.microsoft.com/office/drawing/2014/main" id="{74A5EEA2-B716-92A0-FCB5-CC26D83CE882}"/>
+              </a:ext>
+            </a:extLst>
+          </p:cNvPr>
+          <p:cNvSpPr>
+            <a:spLocks noGrp="1"/>
+          </p:cNvSpPr>
+          <p:nvPr>
+            <p:ph idx="1"/>
+          </p:nvPr>
+        </p:nvSpPr>
+        <p:spPr/>
+        <p:txBody>
           <a:bodyPr>
-            <a:normAutofit fontScale="90000"/>
+            <a:normAutofit fontScale="62500" lnSpcReduction="20000"/>
           </a:bodyPr>
           <a:lstStyle/>
           <a:p>
-            <a:r>
-              <a:rPr lang="en-US" b="1" dirty="0"/>
-              <a:t>Service Discovery Pattern</a:t>
-            </a:r>
-            <a:br>
-              <a:rPr lang="en-US" b="1" dirty="0"/>
-            </a:br>
+            <a:pPr marL="0" indent="0">
+              <a:buNone/>
+            </a:pPr>
+            <a:r>
+              <a:rPr lang="en-IN" b="1" dirty="0"/>
+              <a:t>Grafana</a:t>
+            </a:r>
+          </a:p>
+          <a:p>
+            <a:r>
+              <a:rPr lang="en-US" dirty="0"/>
+              <a:t>Grafana allows you to query, visualize, alert on and understand your metrics no matter where they are stored. Create, explore, and share dashboards with your team and foster a data-driven culture.</a:t>
+            </a:r>
+          </a:p>
+          <a:p>
             <a:endParaRPr lang="en-US" dirty="0"/>
           </a:p>
-        </p:txBody>
-      </p:sp>
-      <p:sp>
-        <p:nvSpPr>
-          <p:cNvPr id="3" name="Content Placeholder 2"/>
-          <p:cNvSpPr>
-            <a:spLocks noGrp="1"/>
-          </p:cNvSpPr>
-          <p:nvPr>
-            <p:ph idx="1"/>
-          </p:nvPr>
-        </p:nvSpPr>
-        <p:spPr>
-          <a:xfrm>
-            <a:off x="457200" y="1600200"/>
-            <a:ext cx="8507288" cy="4493095"/>
-          </a:xfrm>
-        </p:spPr>
-        <p:txBody>
-          <a:bodyPr>
-            <a:normAutofit fontScale="47500" lnSpcReduction="20000"/>
-          </a:bodyPr>
-          <a:lstStyle/>
-          <a:p>
-            <a:pPr>
-              <a:buNone/>
-            </a:pPr>
-            <a:r>
-              <a:rPr lang="en-US" b="1" dirty="0"/>
-              <a:t>Problem</a:t>
-            </a:r>
-          </a:p>
-          <a:p>
-            <a:r>
-              <a:rPr lang="en-US" dirty="0"/>
-              <a:t>When </a:t>
+          <a:p>
+            <a:r>
+              <a:rPr lang="en-US" dirty="0"/>
+              <a:t>The cool thing about Grafana is (next to the beautiful UI) that it's not tied to Prometheus as its single data source like for instance Kibana is tied to Elasticsearch. Grafana can have many different data sources like AWS </a:t>
             </a:r>
             <a:r>
               <a:rPr lang="en-US" dirty="0" err="1"/>
-              <a:t>microservices</a:t>
-            </a:r>
-            <a:r>
-              <a:rPr lang="en-US" dirty="0"/>
-              <a:t> come into the picture, we need to address a few issues in terms of calling services:</a:t>
-            </a:r>
-          </a:p>
-          <a:p>
-            <a:r>
-              <a:rPr lang="en-US" dirty="0"/>
-              <a:t>With container technology, IP addresses are dynamically allocated to the service instances. Every time the address changes, a consumer service can break and need manual changes.</a:t>
-            </a:r>
-          </a:p>
-          <a:p>
-            <a:r>
-              <a:rPr lang="en-US" dirty="0"/>
-              <a:t>Each service URL has to be remembered by the consumer and become tightly coupled.</a:t>
-            </a:r>
-          </a:p>
-          <a:p>
-            <a:r>
-              <a:rPr lang="en-US" dirty="0"/>
-              <a:t>So how does the consumer or router know all the available service instances and locations?</a:t>
+              <a:t>Cloudwatch</a:t>
+            </a:r>
+            <a:r>
+              <a:rPr lang="en-US" dirty="0"/>
+              <a:t>, Elasticsearch, </a:t>
+            </a:r>
+            <a:r>
+              <a:rPr lang="en-US" dirty="0" err="1"/>
+              <a:t>InfluxDB</a:t>
+            </a:r>
+            <a:r>
+              <a:rPr lang="en-US" dirty="0"/>
+              <a:t>, Prometheus, etc. This makes it a very good option for creating a monitoring dashboard. Grafana talks to Prometheus by using the </a:t>
+            </a:r>
+            <a:r>
+              <a:rPr lang="en-US" dirty="0" err="1"/>
+              <a:t>PromQL</a:t>
+            </a:r>
+            <a:r>
+              <a:rPr lang="en-US" dirty="0"/>
+              <a:t> query language.</a:t>
             </a:r>
           </a:p>
           <a:p>
             <a:endParaRPr lang="en-US" dirty="0"/>
           </a:p>
           <a:p>
-            <a:endParaRPr lang="en-US" dirty="0"/>
-          </a:p>
-          <a:p>
-            <a:pPr>
-              <a:buNone/>
-            </a:pPr>
-            <a:r>
-              <a:rPr lang="en-US" b="1" dirty="0"/>
-              <a:t>Solution</a:t>
-            </a:r>
-          </a:p>
-          <a:p>
-            <a:r>
-              <a:rPr lang="en-US" dirty="0"/>
-              <a:t>A service registry needs to be created which will keep the metadata of each producer service. A service instance should register to the registry when starting and should de-register when shutting down. The consumer or router should query the registry and find out the location of the service. The registry also needs to do a health check of the producer service to ensure that only working instances of the services are available to be consumed through it. There are two types of service discovery: client-side and server-side. An example of client-side discovery is Netflix Eureka and an example of server-side discovery is AWS ALB.</a:t>
-            </a:r>
-          </a:p>
-          <a:p>
-            <a:endParaRPr lang="en-US" dirty="0"/>
+            <a:r>
+              <a:rPr lang="en-US" dirty="0"/>
+              <a:t>For Grafana there is also an official Docker image available for you to use. You can get Grafana up and running with a simple command.</a:t>
+            </a:r>
+            <a:endParaRPr lang="sv-SE" dirty="0"/>
+          </a:p>
+          <a:p>
+            <a:r>
+              <a:rPr lang="sv-SE" dirty="0"/>
+              <a:t>$ docker run -p 3000:3000 grafana/grafana:5.4.3</a:t>
+            </a:r>
+            <a:endParaRPr lang="en-IN" dirty="0"/>
           </a:p>
         </p:txBody>
       </p:sp>
     </p:spTree>
+    <p:extLst>
+      <p:ext uri="{BB962C8B-B14F-4D97-AF65-F5344CB8AC3E}">
+        <p14:creationId xmlns:p14="http://schemas.microsoft.com/office/powerpoint/2010/main" val="656560026"/>
+      </p:ext>
+    </p:extLst>
   </p:cSld>
   <p:clrMapOvr>
     <a:masterClrMapping/>
@@ -20710,7 +21303,7 @@
           <a:p>
             <a:r>
               <a:rPr lang="en-US" b="1" dirty="0"/>
-              <a:t>Circuit Breaker Pattern</a:t>
+              <a:t>Distributed Tracing</a:t>
             </a:r>
             <a:br>
               <a:rPr lang="en-US" b="1" dirty="0"/>
@@ -20732,7 +21325,7 @@
         <p:spPr/>
         <p:txBody>
           <a:bodyPr>
-            <a:normAutofit fontScale="47500" lnSpcReduction="20000"/>
+            <a:normAutofit fontScale="62500" lnSpcReduction="20000"/>
           </a:bodyPr>
           <a:lstStyle/>
           <a:p>
@@ -20747,14 +21340,16 @@
           <a:p>
             <a:r>
               <a:rPr lang="en-US" dirty="0"/>
-              <a:t>A service generally calls other services to retrieve data, and there is the chance that the downstream service may be down. There are two problems with this: first, the request will keep going to the down service, exhausting network resources and slowing performance. Second, the user experience will be bad and unpredictable. How do we avoid cascading service failures and handle failures gracefully?</a:t>
-            </a:r>
-          </a:p>
-          <a:p>
-            <a:pPr>
-              <a:buNone/>
-            </a:pPr>
-            <a:endParaRPr lang="en-US" b="1" dirty="0"/>
+              <a:t>In </a:t>
+            </a:r>
+            <a:r>
+              <a:rPr lang="en-US" dirty="0" err="1"/>
+              <a:t>microservice</a:t>
+            </a:r>
+            <a:r>
+              <a:rPr lang="en-US" dirty="0"/>
+              <a:t> architecture, requests often span multiple services. Each service handles a request by performing one or more operations across multiple services. Then, how do we trace a request end-to-end to troubleshoot the problem?</a:t>
+            </a:r>
           </a:p>
           <a:p>
             <a:pPr>
@@ -20768,25 +21363,54 @@
           <a:p>
             <a:r>
               <a:rPr lang="en-US" dirty="0"/>
-              <a:t>The consumer should invoke a remote service via a proxy that behaves in a similar fashion to an electrical circuit breaker. When the number of consecutive failures crosses a threshold, the circuit breaker trips, and for the duration of a timeout period, all attempts to invoke the remote service will fail immediately. After the timeout expires the circuit breaker allows a limited number of test requests to pass through. If those requests succeed, the circuit breaker resumes normal operation. Otherwise, if there is a failure, the timeout period begins again.</a:t>
-            </a:r>
-          </a:p>
-          <a:p>
-            <a:r>
-              <a:rPr lang="en-US" dirty="0"/>
-              <a:t>Netflix </a:t>
+              <a:t>We need a service which</a:t>
+            </a:r>
+          </a:p>
+          <a:p>
+            <a:r>
+              <a:rPr lang="en-US" dirty="0"/>
+              <a:t>Assigns each external request a unique external request id.</a:t>
+            </a:r>
+          </a:p>
+          <a:p>
+            <a:r>
+              <a:rPr lang="en-US" dirty="0"/>
+              <a:t>Passes the external request id to all services.</a:t>
+            </a:r>
+          </a:p>
+          <a:p>
+            <a:r>
+              <a:rPr lang="en-US" dirty="0"/>
+              <a:t>Includes the external request id in all log messages.</a:t>
+            </a:r>
+          </a:p>
+          <a:p>
+            <a:r>
+              <a:rPr lang="en-US" dirty="0"/>
+              <a:t>Records information (e.g. start time, end time) about the requests and operations performed when handling an external request in a centralized service.</a:t>
+            </a:r>
+          </a:p>
+          <a:p>
+            <a:r>
+              <a:rPr lang="en-US" dirty="0"/>
+              <a:t>Spring Cloud </a:t>
             </a:r>
             <a:r>
               <a:rPr lang="en-US" dirty="0" err="1"/>
-              <a:t>Hystrix</a:t>
-            </a:r>
-            <a:r>
-              <a:rPr lang="en-US" dirty="0"/>
-              <a:t> is a good implementation of the circuit breaker pattern. It also helps you to define a fallback mechanism which can be used when the circuit breaker trips. That provides a better user experience.</a:t>
-            </a:r>
-          </a:p>
-          <a:p>
-            <a:endParaRPr lang="en-US" dirty="0"/>
+              <a:t>Slueth</a:t>
+            </a:r>
+            <a:r>
+              <a:rPr lang="en-US" dirty="0"/>
+              <a:t>, along with </a:t>
+            </a:r>
+            <a:r>
+              <a:rPr lang="en-US" dirty="0" err="1"/>
+              <a:t>Zipkin</a:t>
+            </a:r>
+            <a:r>
+              <a:rPr lang="en-US" dirty="0"/>
+              <a:t> server, is a common implementation.</a:t>
+            </a:r>
           </a:p>
         </p:txBody>
       </p:sp>
@@ -20817,7 +21441,13 @@
       </p:grpSpPr>
       <p:sp>
         <p:nvSpPr>
-          <p:cNvPr id="2" name="Title 1"/>
+          <p:cNvPr id="2" name="Title 1">
+            <a:extLst>
+              <a:ext uri="{FF2B5EF4-FFF2-40B4-BE49-F238E27FC236}">
+                <a16:creationId xmlns:a16="http://schemas.microsoft.com/office/drawing/2014/main" id="{85849248-66FB-4CED-FA20-09046ED8F0DC}"/>
+              </a:ext>
+            </a:extLst>
+          </p:cNvPr>
           <p:cNvSpPr>
             <a:spLocks noGrp="1"/>
           </p:cNvSpPr>
@@ -20827,19 +21457,191 @@
         </p:nvSpPr>
         <p:spPr/>
         <p:txBody>
-          <a:bodyPr/>
-          <a:lstStyle/>
-          <a:p>
-            <a:r>
-              <a:rPr lang="en-US" b="1" dirty="0"/>
-              <a:t>Blue-Green Deployment Pattern</a:t>
-            </a:r>
-          </a:p>
-        </p:txBody>
-      </p:sp>
-      <p:sp>
-        <p:nvSpPr>
-          <p:cNvPr id="3" name="Content Placeholder 2"/>
+          <a:bodyPr>
+            <a:normAutofit fontScale="90000"/>
+          </a:bodyPr>
+          <a:lstStyle/>
+          <a:p>
+            <a:r>
+              <a:rPr lang="en-US" dirty="0"/>
+              <a:t>Distributed Log Tracing using Sleuth and </a:t>
+            </a:r>
+            <a:r>
+              <a:rPr lang="en-US" dirty="0" err="1"/>
+              <a:t>Zipkin</a:t>
+            </a:r>
+            <a:r>
+              <a:rPr lang="en-US" dirty="0"/>
+              <a:t> Example</a:t>
+            </a:r>
+            <a:endParaRPr lang="en-IN" dirty="0"/>
+          </a:p>
+        </p:txBody>
+      </p:sp>
+      <p:sp>
+        <p:nvSpPr>
+          <p:cNvPr id="3" name="Content Placeholder 2">
+            <a:extLst>
+              <a:ext uri="{FF2B5EF4-FFF2-40B4-BE49-F238E27FC236}">
+                <a16:creationId xmlns:a16="http://schemas.microsoft.com/office/drawing/2014/main" id="{F49915F2-DB6B-B8E6-80F1-38571457634F}"/>
+              </a:ext>
+            </a:extLst>
+          </p:cNvPr>
+          <p:cNvSpPr>
+            <a:spLocks noGrp="1"/>
+          </p:cNvSpPr>
+          <p:nvPr>
+            <p:ph idx="1"/>
+          </p:nvPr>
+        </p:nvSpPr>
+        <p:spPr/>
+        <p:txBody>
+          <a:bodyPr>
+            <a:normAutofit/>
+          </a:bodyPr>
+          <a:lstStyle/>
+          <a:p>
+            <a:r>
+              <a:rPr lang="en-US" sz="1600" dirty="0"/>
+              <a:t>Microservices architecture involve multiple services which interact with each other. So a functionality may involve call to multiple microservices. Usually for systems developed using Microservices architecture, there are many microservices involved. These microservices collaborate with each other.</a:t>
+            </a:r>
+          </a:p>
+          <a:p>
+            <a:r>
+              <a:rPr lang="en-US" sz="1600" dirty="0"/>
+              <a:t>Consider the following microservices-</a:t>
+            </a:r>
+          </a:p>
+          <a:p>
+            <a:endParaRPr lang="en-IN" sz="1600" dirty="0"/>
+          </a:p>
+        </p:txBody>
+      </p:sp>
+      <p:pic>
+        <p:nvPicPr>
+          <p:cNvPr id="3074" name="Picture 2" descr="sprcloud_6-1">
+            <a:extLst>
+              <a:ext uri="{FF2B5EF4-FFF2-40B4-BE49-F238E27FC236}">
+                <a16:creationId xmlns:a16="http://schemas.microsoft.com/office/drawing/2014/main" id="{27C76F03-0FF5-C1AE-11DA-CB37334556F3}"/>
+              </a:ext>
+            </a:extLst>
+          </p:cNvPr>
+          <p:cNvPicPr>
+            <a:picLocks noChangeAspect="1" noChangeArrowheads="1"/>
+          </p:cNvPicPr>
+          <p:nvPr/>
+        </p:nvPicPr>
+        <p:blipFill>
+          <a:blip r:embed="rId2">
+            <a:extLst>
+              <a:ext uri="{28A0092B-C50C-407E-A947-70E740481C1C}">
+                <a14:useLocalDpi xmlns:a14="http://schemas.microsoft.com/office/drawing/2010/main" val="0"/>
+              </a:ext>
+            </a:extLst>
+          </a:blip>
+          <a:srcRect/>
+          <a:stretch>
+            <a:fillRect/>
+          </a:stretch>
+        </p:blipFill>
+        <p:spPr bwMode="auto">
+          <a:xfrm>
+            <a:off x="2195736" y="3039342"/>
+            <a:ext cx="5987380" cy="3051261"/>
+          </a:xfrm>
+          <a:prstGeom prst="rect">
+            <a:avLst/>
+          </a:prstGeom>
+          <a:noFill/>
+          <a:extLst>
+            <a:ext uri="{909E8E84-426E-40DD-AFC4-6F175D3DCCD1}">
+              <a14:hiddenFill xmlns:a14="http://schemas.microsoft.com/office/drawing/2010/main">
+                <a:solidFill>
+                  <a:srgbClr val="FFFFFF"/>
+                </a:solidFill>
+              </a14:hiddenFill>
+            </a:ext>
+          </a:extLst>
+        </p:spPr>
+      </p:pic>
+    </p:spTree>
+    <p:extLst>
+      <p:ext uri="{BB962C8B-B14F-4D97-AF65-F5344CB8AC3E}">
+        <p14:creationId xmlns:p14="http://schemas.microsoft.com/office/powerpoint/2010/main" val="2978534196"/>
+      </p:ext>
+    </p:extLst>
+  </p:cSld>
+  <p:clrMapOvr>
+    <a:masterClrMapping/>
+  </p:clrMapOvr>
+</p:sld>
+</file>
+
+<file path=ppt/slides/slide64.xml><?xml version="1.0" encoding="utf-8"?>
+<p:sld xmlns:a="http://schemas.openxmlformats.org/drawingml/2006/main" xmlns:r="http://schemas.openxmlformats.org/officeDocument/2006/relationships" xmlns:p="http://schemas.openxmlformats.org/presentationml/2006/main">
+  <p:cSld>
+    <p:spTree>
+      <p:nvGrpSpPr>
+        <p:cNvPr id="1" name=""/>
+        <p:cNvGrpSpPr/>
+        <p:nvPr/>
+      </p:nvGrpSpPr>
+      <p:grpSpPr>
+        <a:xfrm>
+          <a:off x="0" y="0"/>
+          <a:ext cx="0" cy="0"/>
+          <a:chOff x="0" y="0"/>
+          <a:chExt cx="0" cy="0"/>
+        </a:xfrm>
+      </p:grpSpPr>
+      <p:sp>
+        <p:nvSpPr>
+          <p:cNvPr id="2" name="Title 1">
+            <a:extLst>
+              <a:ext uri="{FF2B5EF4-FFF2-40B4-BE49-F238E27FC236}">
+                <a16:creationId xmlns:a16="http://schemas.microsoft.com/office/drawing/2014/main" id="{562B0EDF-B4C6-293F-5119-130DBBE4CFE0}"/>
+              </a:ext>
+            </a:extLst>
+          </p:cNvPr>
+          <p:cNvSpPr>
+            <a:spLocks noGrp="1"/>
+          </p:cNvSpPr>
+          <p:nvPr>
+            <p:ph type="title"/>
+          </p:nvPr>
+        </p:nvSpPr>
+        <p:spPr/>
+        <p:txBody>
+          <a:bodyPr>
+            <a:normAutofit fontScale="90000"/>
+          </a:bodyPr>
+          <a:lstStyle/>
+          <a:p>
+            <a:r>
+              <a:rPr lang="en-US" dirty="0"/>
+              <a:t>Distributed Log Tracing using Sleuth and </a:t>
+            </a:r>
+            <a:r>
+              <a:rPr lang="en-US" dirty="0" err="1"/>
+              <a:t>Zipkin</a:t>
+            </a:r>
+            <a:r>
+              <a:rPr lang="en-US" dirty="0"/>
+              <a:t> Example</a:t>
+            </a:r>
+            <a:endParaRPr lang="en-IN" dirty="0"/>
+          </a:p>
+        </p:txBody>
+      </p:sp>
+      <p:sp>
+        <p:nvSpPr>
+          <p:cNvPr id="3" name="Content Placeholder 2">
+            <a:extLst>
+              <a:ext uri="{FF2B5EF4-FFF2-40B4-BE49-F238E27FC236}">
+                <a16:creationId xmlns:a16="http://schemas.microsoft.com/office/drawing/2014/main" id="{C14218E0-9284-21CC-C462-71754B8D0F6E}"/>
+              </a:ext>
+            </a:extLst>
+          </p:cNvPr>
           <p:cNvSpPr>
             <a:spLocks noGrp="1"/>
           </p:cNvSpPr>
@@ -20854,6 +21656,361 @@
           </a:bodyPr>
           <a:lstStyle/>
           <a:p>
+            <a:r>
+              <a:rPr lang="en-US" dirty="0"/>
+              <a:t>If suppose during such calls there are some issues like exception has occurred. Or may be there are latency issues due to a particular service taking more than expected time. </a:t>
+            </a:r>
+          </a:p>
+          <a:p>
+            <a:r>
+              <a:rPr lang="en-US" dirty="0"/>
+              <a:t>How do we identify where the issue is occurring. In regular project we would have used logging to analyze the logs to know more about occurred exceptions and also performance timing. </a:t>
+            </a:r>
+          </a:p>
+          <a:p>
+            <a:r>
+              <a:rPr lang="en-US" dirty="0"/>
+              <a:t>But since microservices involves multiple services we cannot use regular logging. Each Service will be having its own separate logs. So we will need to go through the logs of each service. Also how do we correlate the logs to a request call chain </a:t>
+            </a:r>
+            <a:r>
+              <a:rPr lang="en-US" dirty="0" err="1"/>
+              <a:t>i.e</a:t>
+            </a:r>
+            <a:r>
+              <a:rPr lang="en-US" dirty="0"/>
+              <a:t> which logs of microservices are related to Request1, which are related to Request2. To resolve these issues we make use of </a:t>
+            </a:r>
+            <a:r>
+              <a:rPr lang="en-US" b="1" dirty="0"/>
+              <a:t>Spring Cloud Sleuth </a:t>
+            </a:r>
+            <a:r>
+              <a:rPr lang="en-US" dirty="0"/>
+              <a:t>and </a:t>
+            </a:r>
+            <a:r>
+              <a:rPr lang="en-US" b="1" dirty="0" err="1"/>
+              <a:t>Zipkin</a:t>
+            </a:r>
+            <a:endParaRPr lang="en-US" b="1" dirty="0"/>
+          </a:p>
+          <a:p>
+            <a:r>
+              <a:rPr lang="en-US" b="1" dirty="0"/>
+              <a:t>Spring Cloud Sleuth </a:t>
+            </a:r>
+            <a:r>
+              <a:rPr lang="en-US" dirty="0"/>
+              <a:t>is used to generate and attach the trace id, span id to the logs so that these can then be used by tools like </a:t>
+            </a:r>
+            <a:r>
+              <a:rPr lang="en-US" b="1" dirty="0" err="1"/>
+              <a:t>Zipkin</a:t>
+            </a:r>
+            <a:r>
+              <a:rPr lang="en-US" dirty="0"/>
+              <a:t> and </a:t>
+            </a:r>
+            <a:r>
+              <a:rPr lang="en-US" b="1" dirty="0"/>
+              <a:t>ELK</a:t>
+            </a:r>
+            <a:r>
+              <a:rPr lang="en-US" dirty="0"/>
+              <a:t> for storage and analysis</a:t>
+            </a:r>
+          </a:p>
+          <a:p>
+            <a:r>
+              <a:rPr lang="en-US" b="1" dirty="0" err="1"/>
+              <a:t>Zipkin</a:t>
+            </a:r>
+            <a:r>
+              <a:rPr lang="en-US" dirty="0"/>
+              <a:t> is a distributed tracing system. It helps gather timing data needed to troubleshoot latency problems in service architectures. Features include both the collection and lookup of this data</a:t>
+            </a:r>
+            <a:endParaRPr lang="en-IN" dirty="0"/>
+          </a:p>
+        </p:txBody>
+      </p:sp>
+    </p:spTree>
+    <p:extLst>
+      <p:ext uri="{BB962C8B-B14F-4D97-AF65-F5344CB8AC3E}">
+        <p14:creationId xmlns:p14="http://schemas.microsoft.com/office/powerpoint/2010/main" val="485650018"/>
+      </p:ext>
+    </p:extLst>
+  </p:cSld>
+  <p:clrMapOvr>
+    <a:masterClrMapping/>
+  </p:clrMapOvr>
+</p:sld>
+</file>
+
+<file path=ppt/slides/slide65.xml><?xml version="1.0" encoding="utf-8"?>
+<p:sld xmlns:a="http://schemas.openxmlformats.org/drawingml/2006/main" xmlns:r="http://schemas.openxmlformats.org/officeDocument/2006/relationships" xmlns:p="http://schemas.openxmlformats.org/presentationml/2006/main">
+  <p:cSld>
+    <p:spTree>
+      <p:nvGrpSpPr>
+        <p:cNvPr id="1" name=""/>
+        <p:cNvGrpSpPr/>
+        <p:nvPr/>
+      </p:nvGrpSpPr>
+      <p:grpSpPr>
+        <a:xfrm>
+          <a:off x="0" y="0"/>
+          <a:ext cx="0" cy="0"/>
+          <a:chOff x="0" y="0"/>
+          <a:chExt cx="0" cy="0"/>
+        </a:xfrm>
+      </p:grpSpPr>
+      <p:sp>
+        <p:nvSpPr>
+          <p:cNvPr id="2" name="Title 1">
+            <a:extLst>
+              <a:ext uri="{FF2B5EF4-FFF2-40B4-BE49-F238E27FC236}">
+                <a16:creationId xmlns:a16="http://schemas.microsoft.com/office/drawing/2014/main" id="{562B0EDF-B4C6-293F-5119-130DBBE4CFE0}"/>
+              </a:ext>
+            </a:extLst>
+          </p:cNvPr>
+          <p:cNvSpPr>
+            <a:spLocks noGrp="1"/>
+          </p:cNvSpPr>
+          <p:nvPr>
+            <p:ph type="title"/>
+          </p:nvPr>
+        </p:nvSpPr>
+        <p:spPr/>
+        <p:txBody>
+          <a:bodyPr>
+            <a:normAutofit fontScale="90000"/>
+          </a:bodyPr>
+          <a:lstStyle/>
+          <a:p>
+            <a:r>
+              <a:rPr lang="en-US" dirty="0"/>
+              <a:t>Distributed Log Tracing using Sleuth and </a:t>
+            </a:r>
+            <a:r>
+              <a:rPr lang="en-US" dirty="0" err="1"/>
+              <a:t>Zipkin</a:t>
+            </a:r>
+            <a:r>
+              <a:rPr lang="en-US" dirty="0"/>
+              <a:t> Example</a:t>
+            </a:r>
+            <a:endParaRPr lang="en-IN" dirty="0"/>
+          </a:p>
+        </p:txBody>
+      </p:sp>
+      <p:sp>
+        <p:nvSpPr>
+          <p:cNvPr id="3" name="Content Placeholder 2">
+            <a:extLst>
+              <a:ext uri="{FF2B5EF4-FFF2-40B4-BE49-F238E27FC236}">
+                <a16:creationId xmlns:a16="http://schemas.microsoft.com/office/drawing/2014/main" id="{C14218E0-9284-21CC-C462-71754B8D0F6E}"/>
+              </a:ext>
+            </a:extLst>
+          </p:cNvPr>
+          <p:cNvSpPr>
+            <a:spLocks noGrp="1"/>
+          </p:cNvSpPr>
+          <p:nvPr>
+            <p:ph idx="1"/>
+          </p:nvPr>
+        </p:nvSpPr>
+        <p:spPr/>
+        <p:txBody>
+          <a:bodyPr>
+            <a:normAutofit/>
+          </a:bodyPr>
+          <a:lstStyle/>
+          <a:p>
+            <a:pPr marL="0" indent="0">
+              <a:buNone/>
+            </a:pPr>
+            <a:r>
+              <a:rPr lang="en-US" sz="1800" dirty="0"/>
+              <a:t>Lets Begin-</a:t>
+            </a:r>
+          </a:p>
+          <a:p>
+            <a:r>
+              <a:rPr lang="en-US" sz="1800" dirty="0"/>
+              <a:t>We will be dividing this demo into 3 parts-</a:t>
+            </a:r>
+          </a:p>
+          <a:p>
+            <a:pPr lvl="1">
+              <a:buFont typeface="Arial" panose="020B0604020202020204" pitchFamily="34" charset="0"/>
+              <a:buChar char="•"/>
+            </a:pPr>
+            <a:r>
+              <a:rPr lang="en-US" sz="1800" dirty="0"/>
+              <a:t>Develop four Spring Boot Microservices modules which interact with each other.</a:t>
+            </a:r>
+          </a:p>
+          <a:p>
+            <a:pPr lvl="1">
+              <a:buFont typeface="Arial" panose="020B0604020202020204" pitchFamily="34" charset="0"/>
+              <a:buChar char="•"/>
+            </a:pPr>
+            <a:r>
+              <a:rPr lang="en-US" sz="1800" dirty="0"/>
+              <a:t>Implement distributed tracing using Spring Cloud Sleuth</a:t>
+            </a:r>
+          </a:p>
+          <a:p>
+            <a:pPr lvl="1">
+              <a:buFont typeface="Arial" panose="020B0604020202020204" pitchFamily="34" charset="0"/>
+              <a:buChar char="•"/>
+            </a:pPr>
+            <a:r>
+              <a:rPr lang="en-US" sz="1800" dirty="0"/>
+              <a:t>View distributed tracing using </a:t>
+            </a:r>
+            <a:r>
+              <a:rPr lang="en-US" sz="1800" dirty="0" err="1"/>
+              <a:t>Zipkin</a:t>
+            </a:r>
+            <a:endParaRPr lang="en-US" sz="1800" dirty="0"/>
+          </a:p>
+          <a:p>
+            <a:r>
+              <a:rPr lang="en-US" sz="1800" dirty="0"/>
+              <a:t>Develop four Spring Boot Microservices modules which interact with each other</a:t>
+            </a:r>
+          </a:p>
+          <a:p>
+            <a:r>
+              <a:rPr lang="en-US" sz="1800" dirty="0"/>
+              <a:t>We will be developing the spring boot microservices as follows-</a:t>
+            </a:r>
+            <a:endParaRPr lang="en-IN" sz="1800" dirty="0"/>
+          </a:p>
+        </p:txBody>
+      </p:sp>
+      <p:pic>
+        <p:nvPicPr>
+          <p:cNvPr id="4098" name="Picture 2" descr="Spring Cloud Sleuth Tutorial">
+            <a:extLst>
+              <a:ext uri="{FF2B5EF4-FFF2-40B4-BE49-F238E27FC236}">
+                <a16:creationId xmlns:a16="http://schemas.microsoft.com/office/drawing/2014/main" id="{054C43BE-F335-21D7-2CCB-7720FE79D15D}"/>
+              </a:ext>
+            </a:extLst>
+          </p:cNvPr>
+          <p:cNvPicPr>
+            <a:picLocks noChangeAspect="1" noChangeArrowheads="1"/>
+          </p:cNvPicPr>
+          <p:nvPr/>
+        </p:nvPicPr>
+        <p:blipFill>
+          <a:blip r:embed="rId2">
+            <a:extLst>
+              <a:ext uri="{28A0092B-C50C-407E-A947-70E740481C1C}">
+                <a14:useLocalDpi xmlns:a14="http://schemas.microsoft.com/office/drawing/2010/main" val="0"/>
+              </a:ext>
+            </a:extLst>
+          </a:blip>
+          <a:srcRect/>
+          <a:stretch>
+            <a:fillRect/>
+          </a:stretch>
+        </p:blipFill>
+        <p:spPr bwMode="auto">
+          <a:xfrm>
+            <a:off x="207268" y="4305300"/>
+            <a:ext cx="8953500" cy="1905000"/>
+          </a:xfrm>
+          <a:prstGeom prst="rect">
+            <a:avLst/>
+          </a:prstGeom>
+          <a:noFill/>
+          <a:extLst>
+            <a:ext uri="{909E8E84-426E-40DD-AFC4-6F175D3DCCD1}">
+              <a14:hiddenFill xmlns:a14="http://schemas.microsoft.com/office/drawing/2010/main">
+                <a:solidFill>
+                  <a:srgbClr val="FFFFFF"/>
+                </a:solidFill>
+              </a14:hiddenFill>
+            </a:ext>
+          </a:extLst>
+        </p:spPr>
+      </p:pic>
+    </p:spTree>
+    <p:extLst>
+      <p:ext uri="{BB962C8B-B14F-4D97-AF65-F5344CB8AC3E}">
+        <p14:creationId xmlns:p14="http://schemas.microsoft.com/office/powerpoint/2010/main" val="2106456421"/>
+      </p:ext>
+    </p:extLst>
+  </p:cSld>
+  <p:clrMapOvr>
+    <a:masterClrMapping/>
+  </p:clrMapOvr>
+</p:sld>
+</file>
+
+<file path=ppt/slides/slide66.xml><?xml version="1.0" encoding="utf-8"?>
+<p:sld xmlns:a="http://schemas.openxmlformats.org/drawingml/2006/main" xmlns:r="http://schemas.openxmlformats.org/officeDocument/2006/relationships" xmlns:p="http://schemas.openxmlformats.org/presentationml/2006/main">
+  <p:cSld>
+    <p:spTree>
+      <p:nvGrpSpPr>
+        <p:cNvPr id="1" name=""/>
+        <p:cNvGrpSpPr/>
+        <p:nvPr/>
+      </p:nvGrpSpPr>
+      <p:grpSpPr>
+        <a:xfrm>
+          <a:off x="0" y="0"/>
+          <a:ext cx="0" cy="0"/>
+          <a:chOff x="0" y="0"/>
+          <a:chExt cx="0" cy="0"/>
+        </a:xfrm>
+      </p:grpSpPr>
+      <p:sp>
+        <p:nvSpPr>
+          <p:cNvPr id="2" name="Title 1"/>
+          <p:cNvSpPr>
+            <a:spLocks noGrp="1"/>
+          </p:cNvSpPr>
+          <p:nvPr>
+            <p:ph type="title"/>
+          </p:nvPr>
+        </p:nvSpPr>
+        <p:spPr/>
+        <p:txBody>
+          <a:bodyPr>
+            <a:normAutofit fontScale="90000"/>
+          </a:bodyPr>
+          <a:lstStyle/>
+          <a:p>
+            <a:r>
+              <a:rPr lang="en-US" b="1" dirty="0"/>
+              <a:t>Health Check</a:t>
+            </a:r>
+            <a:br>
+              <a:rPr lang="en-US" b="1" dirty="0"/>
+            </a:br>
+            <a:endParaRPr lang="en-US" dirty="0"/>
+          </a:p>
+        </p:txBody>
+      </p:sp>
+      <p:sp>
+        <p:nvSpPr>
+          <p:cNvPr id="3" name="Content Placeholder 2"/>
+          <p:cNvSpPr>
+            <a:spLocks noGrp="1"/>
+          </p:cNvSpPr>
+          <p:nvPr>
+            <p:ph idx="1"/>
+          </p:nvPr>
+        </p:nvSpPr>
+        <p:spPr/>
+        <p:txBody>
+          <a:bodyPr>
+            <a:normAutofit fontScale="77500" lnSpcReduction="20000"/>
+          </a:bodyPr>
+          <a:lstStyle/>
+          <a:p>
             <a:pPr>
               <a:buNone/>
             </a:pPr>
@@ -20865,7 +22022,7 @@
           <a:p>
             <a:r>
               <a:rPr lang="en-US" dirty="0"/>
-              <a:t>With </a:t>
+              <a:t>When </a:t>
             </a:r>
             <a:r>
               <a:rPr lang="en-US" dirty="0" err="1"/>
@@ -20873,7 +22030,344 @@
             </a:r>
             <a:r>
               <a:rPr lang="en-US" dirty="0"/>
-              <a:t> architecture, one application can have many </a:t>
+              <a:t> architecture has been implemented, there is a chance that a service might be up but not able to handle transactions. In that case, how do you ensure a request doesn't go to those failed instances? With a load balancing pattern implementation.</a:t>
+            </a:r>
+          </a:p>
+          <a:p>
+            <a:pPr>
+              <a:buNone/>
+            </a:pPr>
+            <a:r>
+              <a:rPr lang="en-US" b="1" dirty="0"/>
+              <a:t>Solution</a:t>
+            </a:r>
+          </a:p>
+          <a:p>
+            <a:r>
+              <a:rPr lang="en-US" dirty="0"/>
+              <a:t>Each service needs to have an endpoint which can be used to check the health of the application, such as /health. This API should o check the status of the host, the connection to other services/infrastructure, and any specific logic.</a:t>
+            </a:r>
+          </a:p>
+          <a:p>
+            <a:r>
+              <a:rPr lang="en-US" dirty="0"/>
+              <a:t>Spring Boot Actuator does implement a /health endpoint and the implementation can be customized, as well.</a:t>
+            </a:r>
+          </a:p>
+          <a:p>
+            <a:endParaRPr lang="en-US" dirty="0"/>
+          </a:p>
+        </p:txBody>
+      </p:sp>
+    </p:spTree>
+  </p:cSld>
+  <p:clrMapOvr>
+    <a:masterClrMapping/>
+  </p:clrMapOvr>
+</p:sld>
+</file>
+
+<file path=ppt/slides/slide67.xml><?xml version="1.0" encoding="utf-8"?>
+<p:sld xmlns:a="http://schemas.openxmlformats.org/drawingml/2006/main" xmlns:r="http://schemas.openxmlformats.org/officeDocument/2006/relationships" xmlns:p="http://schemas.openxmlformats.org/presentationml/2006/main">
+  <p:cSld>
+    <p:spTree>
+      <p:nvGrpSpPr>
+        <p:cNvPr id="1" name=""/>
+        <p:cNvGrpSpPr/>
+        <p:nvPr/>
+      </p:nvGrpSpPr>
+      <p:grpSpPr>
+        <a:xfrm>
+          <a:off x="0" y="0"/>
+          <a:ext cx="0" cy="0"/>
+          <a:chOff x="0" y="0"/>
+          <a:chExt cx="0" cy="0"/>
+        </a:xfrm>
+      </p:grpSpPr>
+      <p:sp>
+        <p:nvSpPr>
+          <p:cNvPr id="2" name="Title 1"/>
+          <p:cNvSpPr>
+            <a:spLocks noGrp="1"/>
+          </p:cNvSpPr>
+          <p:nvPr>
+            <p:ph type="title"/>
+          </p:nvPr>
+        </p:nvSpPr>
+        <p:spPr/>
+        <p:txBody>
+          <a:bodyPr>
+            <a:normAutofit fontScale="90000"/>
+          </a:bodyPr>
+          <a:lstStyle/>
+          <a:p>
+            <a:r>
+              <a:rPr lang="en-US" b="1" dirty="0"/>
+              <a:t>Cross-Cutting Concern Patterns</a:t>
+            </a:r>
+            <a:br>
+              <a:rPr lang="en-US" b="1" dirty="0"/>
+            </a:br>
+            <a:endParaRPr lang="en-US" dirty="0"/>
+          </a:p>
+        </p:txBody>
+      </p:sp>
+      <p:sp>
+        <p:nvSpPr>
+          <p:cNvPr id="3" name="Content Placeholder 2"/>
+          <p:cNvSpPr>
+            <a:spLocks noGrp="1"/>
+          </p:cNvSpPr>
+          <p:nvPr>
+            <p:ph idx="1"/>
+          </p:nvPr>
+        </p:nvSpPr>
+        <p:spPr/>
+        <p:txBody>
+          <a:bodyPr/>
+          <a:lstStyle/>
+          <a:p>
+            <a:r>
+              <a:rPr lang="en-US" b="1" dirty="0"/>
+              <a:t>External Configuration</a:t>
+            </a:r>
+          </a:p>
+          <a:p>
+            <a:r>
+              <a:rPr lang="en-US" b="1" dirty="0"/>
+              <a:t>Service Discovery Pattern</a:t>
+            </a:r>
+          </a:p>
+          <a:p>
+            <a:r>
+              <a:rPr lang="en-US" b="1" dirty="0"/>
+              <a:t>Circuit Breaker Pattern</a:t>
+            </a:r>
+          </a:p>
+          <a:p>
+            <a:r>
+              <a:rPr lang="en-US" b="1" dirty="0"/>
+              <a:t>Blue-Green Deployment Pattern</a:t>
+            </a:r>
+          </a:p>
+          <a:p>
+            <a:endParaRPr lang="en-US" dirty="0"/>
+          </a:p>
+        </p:txBody>
+      </p:sp>
+    </p:spTree>
+  </p:cSld>
+  <p:clrMapOvr>
+    <a:masterClrMapping/>
+  </p:clrMapOvr>
+</p:sld>
+</file>
+
+<file path=ppt/slides/slide68.xml><?xml version="1.0" encoding="utf-8"?>
+<p:sld xmlns:a="http://schemas.openxmlformats.org/drawingml/2006/main" xmlns:r="http://schemas.openxmlformats.org/officeDocument/2006/relationships" xmlns:p="http://schemas.openxmlformats.org/presentationml/2006/main">
+  <p:cSld>
+    <p:spTree>
+      <p:nvGrpSpPr>
+        <p:cNvPr id="1" name=""/>
+        <p:cNvGrpSpPr/>
+        <p:nvPr/>
+      </p:nvGrpSpPr>
+      <p:grpSpPr>
+        <a:xfrm>
+          <a:off x="0" y="0"/>
+          <a:ext cx="0" cy="0"/>
+          <a:chOff x="0" y="0"/>
+          <a:chExt cx="0" cy="0"/>
+        </a:xfrm>
+      </p:grpSpPr>
+      <p:sp>
+        <p:nvSpPr>
+          <p:cNvPr id="2" name="Title 1"/>
+          <p:cNvSpPr>
+            <a:spLocks noGrp="1"/>
+          </p:cNvSpPr>
+          <p:nvPr>
+            <p:ph type="title"/>
+          </p:nvPr>
+        </p:nvSpPr>
+        <p:spPr/>
+        <p:txBody>
+          <a:bodyPr>
+            <a:normAutofit fontScale="90000"/>
+          </a:bodyPr>
+          <a:lstStyle/>
+          <a:p>
+            <a:r>
+              <a:rPr lang="en-US" b="1" dirty="0"/>
+              <a:t>External Configuration</a:t>
+            </a:r>
+            <a:br>
+              <a:rPr lang="en-US" b="1" dirty="0"/>
+            </a:br>
+            <a:endParaRPr lang="en-US" dirty="0"/>
+          </a:p>
+        </p:txBody>
+      </p:sp>
+      <p:sp>
+        <p:nvSpPr>
+          <p:cNvPr id="3" name="Content Placeholder 2"/>
+          <p:cNvSpPr>
+            <a:spLocks noGrp="1"/>
+          </p:cNvSpPr>
+          <p:nvPr>
+            <p:ph idx="1"/>
+          </p:nvPr>
+        </p:nvSpPr>
+        <p:spPr/>
+        <p:txBody>
+          <a:bodyPr>
+            <a:normAutofit fontScale="70000" lnSpcReduction="20000"/>
+          </a:bodyPr>
+          <a:lstStyle/>
+          <a:p>
+            <a:pPr>
+              <a:buNone/>
+            </a:pPr>
+            <a:r>
+              <a:rPr lang="en-US" b="1" dirty="0"/>
+              <a:t>Problem</a:t>
+            </a:r>
+          </a:p>
+          <a:p>
+            <a:r>
+              <a:rPr lang="en-US" dirty="0"/>
+              <a:t>A service typically calls other services and databases as well. For each environment like dev, QA, UAT, prod, the endpoint URL or some configuration properties might be different. A change in any of those properties might require a re-build and re-deploy of the service. How do we avoid code modification for configuration changes?</a:t>
+            </a:r>
+          </a:p>
+          <a:p>
+            <a:pPr>
+              <a:buNone/>
+            </a:pPr>
+            <a:r>
+              <a:rPr lang="en-US" b="1" dirty="0"/>
+              <a:t>Solution</a:t>
+            </a:r>
+          </a:p>
+          <a:p>
+            <a:r>
+              <a:rPr lang="en-US" dirty="0"/>
+              <a:t>Externalize all the configuration, including endpoint URLs and credentials. The application should load them either at startup or on the fly.</a:t>
+            </a:r>
+          </a:p>
+          <a:p>
+            <a:r>
+              <a:rPr lang="en-US" dirty="0"/>
+              <a:t>Spring Cloud </a:t>
+            </a:r>
+            <a:r>
+              <a:rPr lang="en-US" dirty="0" err="1"/>
+              <a:t>config</a:t>
+            </a:r>
+            <a:r>
+              <a:rPr lang="en-US" dirty="0"/>
+              <a:t> server provides the option to externalize the properties to </a:t>
+            </a:r>
+            <a:r>
+              <a:rPr lang="en-US" dirty="0" err="1"/>
+              <a:t>GitHub</a:t>
+            </a:r>
+            <a:r>
+              <a:rPr lang="en-US" dirty="0"/>
+              <a:t> and load them as environment properties. These can be accessed by the application on startup or can be refreshed without a server restart.</a:t>
+            </a:r>
+          </a:p>
+          <a:p>
+            <a:endParaRPr lang="en-US" dirty="0"/>
+          </a:p>
+        </p:txBody>
+      </p:sp>
+    </p:spTree>
+  </p:cSld>
+  <p:clrMapOvr>
+    <a:masterClrMapping/>
+  </p:clrMapOvr>
+</p:sld>
+</file>
+
+<file path=ppt/slides/slide69.xml><?xml version="1.0" encoding="utf-8"?>
+<p:sld xmlns:a="http://schemas.openxmlformats.org/drawingml/2006/main" xmlns:r="http://schemas.openxmlformats.org/officeDocument/2006/relationships" xmlns:p="http://schemas.openxmlformats.org/presentationml/2006/main">
+  <p:cSld>
+    <p:spTree>
+      <p:nvGrpSpPr>
+        <p:cNvPr id="1" name=""/>
+        <p:cNvGrpSpPr/>
+        <p:nvPr/>
+      </p:nvGrpSpPr>
+      <p:grpSpPr>
+        <a:xfrm>
+          <a:off x="0" y="0"/>
+          <a:ext cx="0" cy="0"/>
+          <a:chOff x="0" y="0"/>
+          <a:chExt cx="0" cy="0"/>
+        </a:xfrm>
+      </p:grpSpPr>
+      <p:sp>
+        <p:nvSpPr>
+          <p:cNvPr id="2" name="Title 1"/>
+          <p:cNvSpPr>
+            <a:spLocks noGrp="1"/>
+          </p:cNvSpPr>
+          <p:nvPr>
+            <p:ph type="title"/>
+          </p:nvPr>
+        </p:nvSpPr>
+        <p:spPr/>
+        <p:txBody>
+          <a:bodyPr>
+            <a:normAutofit fontScale="90000"/>
+          </a:bodyPr>
+          <a:lstStyle/>
+          <a:p>
+            <a:r>
+              <a:rPr lang="en-US" b="1" dirty="0"/>
+              <a:t>Service Discovery Pattern</a:t>
+            </a:r>
+            <a:br>
+              <a:rPr lang="en-US" b="1" dirty="0"/>
+            </a:br>
+            <a:endParaRPr lang="en-US" dirty="0"/>
+          </a:p>
+        </p:txBody>
+      </p:sp>
+      <p:sp>
+        <p:nvSpPr>
+          <p:cNvPr id="3" name="Content Placeholder 2"/>
+          <p:cNvSpPr>
+            <a:spLocks noGrp="1"/>
+          </p:cNvSpPr>
+          <p:nvPr>
+            <p:ph idx="1"/>
+          </p:nvPr>
+        </p:nvSpPr>
+        <p:spPr>
+          <a:xfrm>
+            <a:off x="457200" y="1600200"/>
+            <a:ext cx="8507288" cy="4493095"/>
+          </a:xfrm>
+        </p:spPr>
+        <p:txBody>
+          <a:bodyPr>
+            <a:normAutofit fontScale="47500" lnSpcReduction="20000"/>
+          </a:bodyPr>
+          <a:lstStyle/>
+          <a:p>
+            <a:pPr>
+              <a:buNone/>
+            </a:pPr>
+            <a:r>
+              <a:rPr lang="en-US" b="1" dirty="0"/>
+              <a:t>Problem</a:t>
+            </a:r>
+          </a:p>
+          <a:p>
+            <a:r>
+              <a:rPr lang="en-US" dirty="0"/>
+              <a:t>When </a:t>
             </a:r>
             <a:r>
               <a:rPr lang="en-US" dirty="0" err="1"/>
@@ -20881,8 +22375,32 @@
             </a:r>
             <a:r>
               <a:rPr lang="en-US" dirty="0"/>
-              <a:t>. If we stop all the services then deploy an enhanced version, the downtime will be huge and can impact the business. Also, the rollback will be a nightmare. How do we avoid or reduce downtime of the services during deployment?</a:t>
-            </a:r>
+              <a:t> come into the picture, we need to address a few issues in terms of calling services:</a:t>
+            </a:r>
+          </a:p>
+          <a:p>
+            <a:r>
+              <a:rPr lang="en-US" dirty="0"/>
+              <a:t>With container technology, IP addresses are dynamically allocated to the service instances. Every time the address changes, a consumer service can break and need manual changes.</a:t>
+            </a:r>
+          </a:p>
+          <a:p>
+            <a:r>
+              <a:rPr lang="en-US" dirty="0"/>
+              <a:t>Each service URL has to be remembered by the consumer and become tightly coupled.</a:t>
+            </a:r>
+          </a:p>
+          <a:p>
+            <a:r>
+              <a:rPr lang="en-US" dirty="0"/>
+              <a:t>So how does the consumer or router know all the available service instances and locations?</a:t>
+            </a:r>
+          </a:p>
+          <a:p>
+            <a:endParaRPr lang="en-US" dirty="0"/>
+          </a:p>
+          <a:p>
+            <a:endParaRPr lang="en-US" dirty="0"/>
           </a:p>
           <a:p>
             <a:pPr>
@@ -20896,59 +22414,7 @@
           <a:p>
             <a:r>
               <a:rPr lang="en-US" dirty="0"/>
-              <a:t>The blue-green deployment strategy can be implemented to reduce or remove downtime. It achieves this by running two identical production environments, Blue and Green. Let's assume Green is the existing live instance and Blue is the new version of the application. At any time, only one of the environments is live, with the live environment serving all production traffic. All cloud platforms provide options for implementing a blue-green deployment. </a:t>
-            </a:r>
-          </a:p>
-          <a:p>
-            <a:pPr>
-              <a:buNone/>
-            </a:pPr>
-            <a:endParaRPr lang="en-US" dirty="0"/>
-          </a:p>
-          <a:p>
-            <a:r>
-              <a:rPr lang="en-US" dirty="0"/>
-              <a:t>There are many other patterns used with </a:t>
-            </a:r>
-            <a:r>
-              <a:rPr lang="en-US" dirty="0" err="1"/>
-              <a:t>microservice</a:t>
-            </a:r>
-            <a:r>
-              <a:rPr lang="en-US" dirty="0"/>
-              <a:t> architecture, like Sidecar, Chained </a:t>
-            </a:r>
-            <a:r>
-              <a:rPr lang="en-US" dirty="0" err="1"/>
-              <a:t>Microservice</a:t>
-            </a:r>
-            <a:r>
-              <a:rPr lang="en-US" dirty="0"/>
-              <a:t>, Branch </a:t>
-            </a:r>
-            <a:r>
-              <a:rPr lang="en-US" dirty="0" err="1"/>
-              <a:t>Microservice</a:t>
-            </a:r>
-            <a:r>
-              <a:rPr lang="en-US" dirty="0"/>
-              <a:t>, Event Sourcing Pattern, Continuous Delivery Patterns, and more. The list keeps growing as we get more experience with </a:t>
-            </a:r>
-            <a:r>
-              <a:rPr lang="en-US" dirty="0" err="1"/>
-              <a:t>microservices</a:t>
-            </a:r>
-            <a:r>
-              <a:rPr lang="en-US" dirty="0"/>
-              <a:t>. I am stopping now to hear back from you on what </a:t>
-            </a:r>
-            <a:r>
-              <a:rPr lang="en-US" dirty="0" err="1"/>
-              <a:t>microservice</a:t>
-            </a:r>
-            <a:r>
-              <a:rPr lang="en-US" dirty="0"/>
-              <a:t> patterns you are using.</a:t>
+              <a:t>A service registry needs to be created which will keep the metadata of each producer service. A service instance should register to the registry when starting and should de-register when shutting down. The consumer or router should query the registry and find out the location of the service. The registry also needs to do a health check of the producer service to ensure that only working instances of the services are available to be consumed through it. There are two types of service discovery: client-side and server-side. An example of client-side discovery is Netflix Eureka and an example of server-side discovery is AWS ALB.</a:t>
             </a:r>
           </a:p>
           <a:p>
@@ -21063,6 +22529,296 @@
             <a:r>
               <a:rPr lang="en-US" dirty="0"/>
               <a:t>One strategy is to decompose by business capability. A business capability is something that a business does in order to generate value. The set of capabilities for a given business depend on the type of business. For example, the capabilities of an insurance company typically include sales, marketing, underwriting, claims processing, billing, compliance, etc. Each business capability can be thought of as a service, except it’s business-oriented rather than technical.</a:t>
+            </a:r>
+          </a:p>
+          <a:p>
+            <a:endParaRPr lang="en-US" dirty="0"/>
+          </a:p>
+        </p:txBody>
+      </p:sp>
+    </p:spTree>
+  </p:cSld>
+  <p:clrMapOvr>
+    <a:masterClrMapping/>
+  </p:clrMapOvr>
+</p:sld>
+</file>
+
+<file path=ppt/slides/slide70.xml><?xml version="1.0" encoding="utf-8"?>
+<p:sld xmlns:a="http://schemas.openxmlformats.org/drawingml/2006/main" xmlns:r="http://schemas.openxmlformats.org/officeDocument/2006/relationships" xmlns:p="http://schemas.openxmlformats.org/presentationml/2006/main">
+  <p:cSld>
+    <p:spTree>
+      <p:nvGrpSpPr>
+        <p:cNvPr id="1" name=""/>
+        <p:cNvGrpSpPr/>
+        <p:nvPr/>
+      </p:nvGrpSpPr>
+      <p:grpSpPr>
+        <a:xfrm>
+          <a:off x="0" y="0"/>
+          <a:ext cx="0" cy="0"/>
+          <a:chOff x="0" y="0"/>
+          <a:chExt cx="0" cy="0"/>
+        </a:xfrm>
+      </p:grpSpPr>
+      <p:sp>
+        <p:nvSpPr>
+          <p:cNvPr id="2" name="Title 1"/>
+          <p:cNvSpPr>
+            <a:spLocks noGrp="1"/>
+          </p:cNvSpPr>
+          <p:nvPr>
+            <p:ph type="title"/>
+          </p:nvPr>
+        </p:nvSpPr>
+        <p:spPr/>
+        <p:txBody>
+          <a:bodyPr>
+            <a:normAutofit fontScale="90000"/>
+          </a:bodyPr>
+          <a:lstStyle/>
+          <a:p>
+            <a:r>
+              <a:rPr lang="en-US" b="1" dirty="0"/>
+              <a:t>Circuit Breaker Pattern</a:t>
+            </a:r>
+            <a:br>
+              <a:rPr lang="en-US" b="1" dirty="0"/>
+            </a:br>
+            <a:endParaRPr lang="en-US" dirty="0"/>
+          </a:p>
+        </p:txBody>
+      </p:sp>
+      <p:sp>
+        <p:nvSpPr>
+          <p:cNvPr id="3" name="Content Placeholder 2"/>
+          <p:cNvSpPr>
+            <a:spLocks noGrp="1"/>
+          </p:cNvSpPr>
+          <p:nvPr>
+            <p:ph idx="1"/>
+          </p:nvPr>
+        </p:nvSpPr>
+        <p:spPr/>
+        <p:txBody>
+          <a:bodyPr>
+            <a:normAutofit fontScale="47500" lnSpcReduction="20000"/>
+          </a:bodyPr>
+          <a:lstStyle/>
+          <a:p>
+            <a:pPr>
+              <a:buNone/>
+            </a:pPr>
+            <a:r>
+              <a:rPr lang="en-US" b="1" dirty="0"/>
+              <a:t>Problem</a:t>
+            </a:r>
+          </a:p>
+          <a:p>
+            <a:r>
+              <a:rPr lang="en-US" dirty="0"/>
+              <a:t>A service generally calls other services to retrieve data, and there is the chance that the downstream service may be down. There are two problems with this: first, the request will keep going to the down service, exhausting network resources and slowing performance. Second, the user experience will be bad and unpredictable. How do we avoid cascading service failures and handle failures gracefully?</a:t>
+            </a:r>
+          </a:p>
+          <a:p>
+            <a:pPr>
+              <a:buNone/>
+            </a:pPr>
+            <a:endParaRPr lang="en-US" b="1" dirty="0"/>
+          </a:p>
+          <a:p>
+            <a:pPr>
+              <a:buNone/>
+            </a:pPr>
+            <a:r>
+              <a:rPr lang="en-US" b="1" dirty="0"/>
+              <a:t>Solution</a:t>
+            </a:r>
+          </a:p>
+          <a:p>
+            <a:r>
+              <a:rPr lang="en-US" dirty="0"/>
+              <a:t>The consumer should invoke a remote service via a proxy that behaves in a similar fashion to an electrical circuit breaker. When the number of consecutive failures crosses a threshold, the circuit breaker trips, and for the duration of a timeout period, all attempts to invoke the remote service will fail immediately. After the timeout expires the circuit breaker allows a limited number of test requests to pass through. If those requests succeed, the circuit breaker resumes normal operation. Otherwise, if there is a failure, the timeout period begins again.</a:t>
+            </a:r>
+          </a:p>
+          <a:p>
+            <a:r>
+              <a:rPr lang="en-US" dirty="0"/>
+              <a:t>Netflix </a:t>
+            </a:r>
+            <a:r>
+              <a:rPr lang="en-US" dirty="0" err="1"/>
+              <a:t>Hystrix</a:t>
+            </a:r>
+            <a:r>
+              <a:rPr lang="en-US" dirty="0"/>
+              <a:t> is a good implementation of the circuit breaker pattern. It also helps you to define a fallback mechanism which can be used when the circuit breaker trips. That provides a better user experience.</a:t>
+            </a:r>
+          </a:p>
+          <a:p>
+            <a:endParaRPr lang="en-US" dirty="0"/>
+          </a:p>
+        </p:txBody>
+      </p:sp>
+    </p:spTree>
+  </p:cSld>
+  <p:clrMapOvr>
+    <a:masterClrMapping/>
+  </p:clrMapOvr>
+</p:sld>
+</file>
+
+<file path=ppt/slides/slide71.xml><?xml version="1.0" encoding="utf-8"?>
+<p:sld xmlns:a="http://schemas.openxmlformats.org/drawingml/2006/main" xmlns:r="http://schemas.openxmlformats.org/officeDocument/2006/relationships" xmlns:p="http://schemas.openxmlformats.org/presentationml/2006/main">
+  <p:cSld>
+    <p:spTree>
+      <p:nvGrpSpPr>
+        <p:cNvPr id="1" name=""/>
+        <p:cNvGrpSpPr/>
+        <p:nvPr/>
+      </p:nvGrpSpPr>
+      <p:grpSpPr>
+        <a:xfrm>
+          <a:off x="0" y="0"/>
+          <a:ext cx="0" cy="0"/>
+          <a:chOff x="0" y="0"/>
+          <a:chExt cx="0" cy="0"/>
+        </a:xfrm>
+      </p:grpSpPr>
+      <p:sp>
+        <p:nvSpPr>
+          <p:cNvPr id="2" name="Title 1"/>
+          <p:cNvSpPr>
+            <a:spLocks noGrp="1"/>
+          </p:cNvSpPr>
+          <p:nvPr>
+            <p:ph type="title"/>
+          </p:nvPr>
+        </p:nvSpPr>
+        <p:spPr/>
+        <p:txBody>
+          <a:bodyPr/>
+          <a:lstStyle/>
+          <a:p>
+            <a:r>
+              <a:rPr lang="en-US" b="1" dirty="0"/>
+              <a:t>Blue-Green Deployment Pattern</a:t>
+            </a:r>
+          </a:p>
+        </p:txBody>
+      </p:sp>
+      <p:sp>
+        <p:nvSpPr>
+          <p:cNvPr id="3" name="Content Placeholder 2"/>
+          <p:cNvSpPr>
+            <a:spLocks noGrp="1"/>
+          </p:cNvSpPr>
+          <p:nvPr>
+            <p:ph idx="1"/>
+          </p:nvPr>
+        </p:nvSpPr>
+        <p:spPr/>
+        <p:txBody>
+          <a:bodyPr>
+            <a:normAutofit fontScale="55000" lnSpcReduction="20000"/>
+          </a:bodyPr>
+          <a:lstStyle/>
+          <a:p>
+            <a:pPr>
+              <a:buNone/>
+            </a:pPr>
+            <a:r>
+              <a:rPr lang="en-US" b="1" dirty="0"/>
+              <a:t>Problem</a:t>
+            </a:r>
+          </a:p>
+          <a:p>
+            <a:r>
+              <a:rPr lang="en-US" dirty="0"/>
+              <a:t>With </a:t>
+            </a:r>
+            <a:r>
+              <a:rPr lang="en-US" dirty="0" err="1"/>
+              <a:t>microservice</a:t>
+            </a:r>
+            <a:r>
+              <a:rPr lang="en-US" dirty="0"/>
+              <a:t> architecture, one application can have many </a:t>
+            </a:r>
+            <a:r>
+              <a:rPr lang="en-US" dirty="0" err="1"/>
+              <a:t>microservices</a:t>
+            </a:r>
+            <a:r>
+              <a:rPr lang="en-US" dirty="0"/>
+              <a:t>. If we stop all the services then deploy an enhanced version, the downtime will be huge and can impact the business. Also, the rollback will be a nightmare. How do we avoid or reduce downtime of the services during deployment?</a:t>
+            </a:r>
+          </a:p>
+          <a:p>
+            <a:pPr>
+              <a:buNone/>
+            </a:pPr>
+            <a:r>
+              <a:rPr lang="en-US" b="1" dirty="0"/>
+              <a:t>Solution</a:t>
+            </a:r>
+          </a:p>
+          <a:p>
+            <a:r>
+              <a:rPr lang="en-US" dirty="0"/>
+              <a:t>The blue-green deployment strategy can be implemented to reduce or remove downtime. It achieves this by running two identical production environments, Blue and Green. Let's assume Green is the existing live instance and Blue is the new version of the application. At any time, only one of the environments is live, with the live environment serving all production traffic. All cloud platforms provide options for implementing a blue-green deployment. </a:t>
+            </a:r>
+          </a:p>
+          <a:p>
+            <a:pPr>
+              <a:buNone/>
+            </a:pPr>
+            <a:endParaRPr lang="en-US" dirty="0"/>
+          </a:p>
+          <a:p>
+            <a:r>
+              <a:rPr lang="en-US" dirty="0"/>
+              <a:t>There are many other patterns used with </a:t>
+            </a:r>
+            <a:r>
+              <a:rPr lang="en-US" dirty="0" err="1"/>
+              <a:t>microservice</a:t>
+            </a:r>
+            <a:r>
+              <a:rPr lang="en-US" dirty="0"/>
+              <a:t> architecture, like Sidecar, Chained </a:t>
+            </a:r>
+            <a:r>
+              <a:rPr lang="en-US" dirty="0" err="1"/>
+              <a:t>Microservice</a:t>
+            </a:r>
+            <a:r>
+              <a:rPr lang="en-US" dirty="0"/>
+              <a:t>, Branch </a:t>
+            </a:r>
+            <a:r>
+              <a:rPr lang="en-US" dirty="0" err="1"/>
+              <a:t>Microservice</a:t>
+            </a:r>
+            <a:r>
+              <a:rPr lang="en-US" dirty="0"/>
+              <a:t>, Event Sourcing Pattern, Continuous Delivery Patterns, and more. The list keeps growing as we get more experience with </a:t>
+            </a:r>
+            <a:r>
+              <a:rPr lang="en-US" dirty="0" err="1"/>
+              <a:t>microservices</a:t>
+            </a:r>
+            <a:r>
+              <a:rPr lang="en-US" dirty="0"/>
+              <a:t>. I am stopping now to hear back from you on what </a:t>
+            </a:r>
+            <a:r>
+              <a:rPr lang="en-US" dirty="0" err="1"/>
+              <a:t>microservice</a:t>
+            </a:r>
+            <a:r>
+              <a:rPr lang="en-US" dirty="0"/>
+              <a:t> patterns you are using.</a:t>
             </a:r>
           </a:p>
           <a:p>

</xml_diff>